<commit_message>
Update docs (1 file draft-slide)
</commit_message>
<xml_diff>
--- a/docs/slide trình cô - bản 1.pptx
+++ b/docs/slide trình cô - bản 1.pptx
@@ -4,6 +4,9 @@
   <p:sldMasterIdLst>
     <p:sldMasterId id="2147483648" r:id="rId1"/>
   </p:sldMasterIdLst>
+  <p:notesMasterIdLst>
+    <p:notesMasterId r:id="rId6"/>
+  </p:notesMasterIdLst>
   <p:sldIdLst>
     <p:sldId id="256" r:id="rId2"/>
     <p:sldId id="257" r:id="rId3"/>
@@ -110,6 +113,820 @@
 </p:presentation>
 </file>
 
+<file path=ppt/notesMasters/notesMaster1.xml><?xml version="1.0" encoding="utf-8"?>
+<p:notesMaster xmlns:a="http://schemas.openxmlformats.org/drawingml/2006/main" xmlns:r="http://schemas.openxmlformats.org/officeDocument/2006/relationships" xmlns:p="http://schemas.openxmlformats.org/presentationml/2006/main">
+  <p:cSld>
+    <p:bg>
+      <p:bgRef idx="1001">
+        <a:schemeClr val="bg1"/>
+      </p:bgRef>
+    </p:bg>
+    <p:spTree>
+      <p:nvGrpSpPr>
+        <p:cNvPr id="1" name=""/>
+        <p:cNvGrpSpPr/>
+        <p:nvPr/>
+      </p:nvGrpSpPr>
+      <p:grpSpPr>
+        <a:xfrm>
+          <a:off x="0" y="0"/>
+          <a:ext cx="0" cy="0"/>
+          <a:chOff x="0" y="0"/>
+          <a:chExt cx="0" cy="0"/>
+        </a:xfrm>
+      </p:grpSpPr>
+      <p:sp>
+        <p:nvSpPr>
+          <p:cNvPr id="2" name="Header Placeholder 1"/>
+          <p:cNvSpPr>
+            <a:spLocks noGrp="1"/>
+          </p:cNvSpPr>
+          <p:nvPr>
+            <p:ph type="hdr" sz="quarter"/>
+          </p:nvPr>
+        </p:nvSpPr>
+        <p:spPr>
+          <a:xfrm>
+            <a:off x="0" y="0"/>
+            <a:ext cx="2971800" cy="458788"/>
+          </a:xfrm>
+          <a:prstGeom prst="rect">
+            <a:avLst/>
+          </a:prstGeom>
+        </p:spPr>
+        <p:txBody>
+          <a:bodyPr vert="horz" lIns="91440" tIns="45720" rIns="91440" bIns="45720" rtlCol="0"/>
+          <a:lstStyle>
+            <a:lvl1pPr algn="l">
+              <a:defRPr sz="1200"/>
+            </a:lvl1pPr>
+          </a:lstStyle>
+          <a:p>
+            <a:endParaRPr lang="en-US"/>
+          </a:p>
+        </p:txBody>
+      </p:sp>
+      <p:sp>
+        <p:nvSpPr>
+          <p:cNvPr id="3" name="Date Placeholder 2"/>
+          <p:cNvSpPr>
+            <a:spLocks noGrp="1"/>
+          </p:cNvSpPr>
+          <p:nvPr>
+            <p:ph type="dt" idx="1"/>
+          </p:nvPr>
+        </p:nvSpPr>
+        <p:spPr>
+          <a:xfrm>
+            <a:off x="3884613" y="0"/>
+            <a:ext cx="2971800" cy="458788"/>
+          </a:xfrm>
+          <a:prstGeom prst="rect">
+            <a:avLst/>
+          </a:prstGeom>
+        </p:spPr>
+        <p:txBody>
+          <a:bodyPr vert="horz" lIns="91440" tIns="45720" rIns="91440" bIns="45720" rtlCol="0"/>
+          <a:lstStyle>
+            <a:lvl1pPr algn="r">
+              <a:defRPr sz="1200"/>
+            </a:lvl1pPr>
+          </a:lstStyle>
+          <a:p>
+            <a:fld id="{A499EA4D-F3F8-4447-BB8C-18AA3C17C03E}" type="datetimeFigureOut">
+              <a:rPr lang="en-US" smtClean="0"/>
+              <a:t>5/15/2017</a:t>
+            </a:fld>
+            <a:endParaRPr lang="en-US"/>
+          </a:p>
+        </p:txBody>
+      </p:sp>
+      <p:sp>
+        <p:nvSpPr>
+          <p:cNvPr id="4" name="Slide Image Placeholder 3"/>
+          <p:cNvSpPr>
+            <a:spLocks noGrp="1" noRot="1" noChangeAspect="1"/>
+          </p:cNvSpPr>
+          <p:nvPr>
+            <p:ph type="sldImg" idx="2"/>
+          </p:nvPr>
+        </p:nvSpPr>
+        <p:spPr>
+          <a:xfrm>
+            <a:off x="685800" y="1143000"/>
+            <a:ext cx="5486400" cy="3086100"/>
+          </a:xfrm>
+          <a:prstGeom prst="rect">
+            <a:avLst/>
+          </a:prstGeom>
+          <a:noFill/>
+          <a:ln w="12700">
+            <a:solidFill>
+              <a:prstClr val="black"/>
+            </a:solidFill>
+          </a:ln>
+        </p:spPr>
+        <p:txBody>
+          <a:bodyPr vert="horz" lIns="91440" tIns="45720" rIns="91440" bIns="45720" rtlCol="0" anchor="ctr"/>
+          <a:lstStyle/>
+          <a:p>
+            <a:endParaRPr lang="en-US"/>
+          </a:p>
+        </p:txBody>
+      </p:sp>
+      <p:sp>
+        <p:nvSpPr>
+          <p:cNvPr id="5" name="Notes Placeholder 4"/>
+          <p:cNvSpPr>
+            <a:spLocks noGrp="1"/>
+          </p:cNvSpPr>
+          <p:nvPr>
+            <p:ph type="body" sz="quarter" idx="3"/>
+          </p:nvPr>
+        </p:nvSpPr>
+        <p:spPr>
+          <a:xfrm>
+            <a:off x="685800" y="4400550"/>
+            <a:ext cx="5486400" cy="3600450"/>
+          </a:xfrm>
+          <a:prstGeom prst="rect">
+            <a:avLst/>
+          </a:prstGeom>
+        </p:spPr>
+        <p:txBody>
+          <a:bodyPr vert="horz" lIns="91440" tIns="45720" rIns="91440" bIns="45720" rtlCol="0"/>
+          <a:lstStyle/>
+          <a:p>
+            <a:pPr lvl="0"/>
+            <a:r>
+              <a:rPr lang="en-US" smtClean="0"/>
+              <a:t>Click to edit Master text styles</a:t>
+            </a:r>
+          </a:p>
+          <a:p>
+            <a:pPr lvl="1"/>
+            <a:r>
+              <a:rPr lang="en-US" smtClean="0"/>
+              <a:t>Second level</a:t>
+            </a:r>
+          </a:p>
+          <a:p>
+            <a:pPr lvl="2"/>
+            <a:r>
+              <a:rPr lang="en-US" smtClean="0"/>
+              <a:t>Third level</a:t>
+            </a:r>
+          </a:p>
+          <a:p>
+            <a:pPr lvl="3"/>
+            <a:r>
+              <a:rPr lang="en-US" smtClean="0"/>
+              <a:t>Fourth level</a:t>
+            </a:r>
+          </a:p>
+          <a:p>
+            <a:pPr lvl="4"/>
+            <a:r>
+              <a:rPr lang="en-US" smtClean="0"/>
+              <a:t>Fifth level</a:t>
+            </a:r>
+            <a:endParaRPr lang="en-US"/>
+          </a:p>
+        </p:txBody>
+      </p:sp>
+      <p:sp>
+        <p:nvSpPr>
+          <p:cNvPr id="6" name="Footer Placeholder 5"/>
+          <p:cNvSpPr>
+            <a:spLocks noGrp="1"/>
+          </p:cNvSpPr>
+          <p:nvPr>
+            <p:ph type="ftr" sz="quarter" idx="4"/>
+          </p:nvPr>
+        </p:nvSpPr>
+        <p:spPr>
+          <a:xfrm>
+            <a:off x="0" y="8685213"/>
+            <a:ext cx="2971800" cy="458787"/>
+          </a:xfrm>
+          <a:prstGeom prst="rect">
+            <a:avLst/>
+          </a:prstGeom>
+        </p:spPr>
+        <p:txBody>
+          <a:bodyPr vert="horz" lIns="91440" tIns="45720" rIns="91440" bIns="45720" rtlCol="0" anchor="b"/>
+          <a:lstStyle>
+            <a:lvl1pPr algn="l">
+              <a:defRPr sz="1200"/>
+            </a:lvl1pPr>
+          </a:lstStyle>
+          <a:p>
+            <a:endParaRPr lang="en-US"/>
+          </a:p>
+        </p:txBody>
+      </p:sp>
+      <p:sp>
+        <p:nvSpPr>
+          <p:cNvPr id="7" name="Slide Number Placeholder 6"/>
+          <p:cNvSpPr>
+            <a:spLocks noGrp="1"/>
+          </p:cNvSpPr>
+          <p:nvPr>
+            <p:ph type="sldNum" sz="quarter" idx="5"/>
+          </p:nvPr>
+        </p:nvSpPr>
+        <p:spPr>
+          <a:xfrm>
+            <a:off x="3884613" y="8685213"/>
+            <a:ext cx="2971800" cy="458787"/>
+          </a:xfrm>
+          <a:prstGeom prst="rect">
+            <a:avLst/>
+          </a:prstGeom>
+        </p:spPr>
+        <p:txBody>
+          <a:bodyPr vert="horz" lIns="91440" tIns="45720" rIns="91440" bIns="45720" rtlCol="0" anchor="b"/>
+          <a:lstStyle>
+            <a:lvl1pPr algn="r">
+              <a:defRPr sz="1200"/>
+            </a:lvl1pPr>
+          </a:lstStyle>
+          <a:p>
+            <a:fld id="{BCE61933-B1A4-49F7-8FC7-4404562CCF99}" type="slidenum">
+              <a:rPr lang="en-US" smtClean="0"/>
+              <a:t>‹#›</a:t>
+            </a:fld>
+            <a:endParaRPr lang="en-US"/>
+          </a:p>
+        </p:txBody>
+      </p:sp>
+    </p:spTree>
+    <p:extLst>
+      <p:ext uri="{BB962C8B-B14F-4D97-AF65-F5344CB8AC3E}">
+        <p14:creationId xmlns:p14="http://schemas.microsoft.com/office/powerpoint/2010/main" val="2673228516"/>
+      </p:ext>
+    </p:extLst>
+  </p:cSld>
+  <p:clrMap bg1="lt1" tx1="dk1" bg2="lt2" tx2="dk2" accent1="accent1" accent2="accent2" accent3="accent3" accent4="accent4" accent5="accent5" accent6="accent6" hlink="hlink" folHlink="folHlink"/>
+  <p:notesStyle>
+    <a:lvl1pPr marL="0" algn="l" defTabSz="914400" rtl="0" eaLnBrk="1" latinLnBrk="0" hangingPunct="1">
+      <a:defRPr sz="1200" kern="1200">
+        <a:solidFill>
+          <a:schemeClr val="tx1"/>
+        </a:solidFill>
+        <a:latin typeface="+mn-lt"/>
+        <a:ea typeface="+mn-ea"/>
+        <a:cs typeface="+mn-cs"/>
+      </a:defRPr>
+    </a:lvl1pPr>
+    <a:lvl2pPr marL="457200" algn="l" defTabSz="914400" rtl="0" eaLnBrk="1" latinLnBrk="0" hangingPunct="1">
+      <a:defRPr sz="1200" kern="1200">
+        <a:solidFill>
+          <a:schemeClr val="tx1"/>
+        </a:solidFill>
+        <a:latin typeface="+mn-lt"/>
+        <a:ea typeface="+mn-ea"/>
+        <a:cs typeface="+mn-cs"/>
+      </a:defRPr>
+    </a:lvl2pPr>
+    <a:lvl3pPr marL="914400" algn="l" defTabSz="914400" rtl="0" eaLnBrk="1" latinLnBrk="0" hangingPunct="1">
+      <a:defRPr sz="1200" kern="1200">
+        <a:solidFill>
+          <a:schemeClr val="tx1"/>
+        </a:solidFill>
+        <a:latin typeface="+mn-lt"/>
+        <a:ea typeface="+mn-ea"/>
+        <a:cs typeface="+mn-cs"/>
+      </a:defRPr>
+    </a:lvl3pPr>
+    <a:lvl4pPr marL="1371600" algn="l" defTabSz="914400" rtl="0" eaLnBrk="1" latinLnBrk="0" hangingPunct="1">
+      <a:defRPr sz="1200" kern="1200">
+        <a:solidFill>
+          <a:schemeClr val="tx1"/>
+        </a:solidFill>
+        <a:latin typeface="+mn-lt"/>
+        <a:ea typeface="+mn-ea"/>
+        <a:cs typeface="+mn-cs"/>
+      </a:defRPr>
+    </a:lvl4pPr>
+    <a:lvl5pPr marL="1828800" algn="l" defTabSz="914400" rtl="0" eaLnBrk="1" latinLnBrk="0" hangingPunct="1">
+      <a:defRPr sz="1200" kern="1200">
+        <a:solidFill>
+          <a:schemeClr val="tx1"/>
+        </a:solidFill>
+        <a:latin typeface="+mn-lt"/>
+        <a:ea typeface="+mn-ea"/>
+        <a:cs typeface="+mn-cs"/>
+      </a:defRPr>
+    </a:lvl5pPr>
+    <a:lvl6pPr marL="2286000" algn="l" defTabSz="914400" rtl="0" eaLnBrk="1" latinLnBrk="0" hangingPunct="1">
+      <a:defRPr sz="1200" kern="1200">
+        <a:solidFill>
+          <a:schemeClr val="tx1"/>
+        </a:solidFill>
+        <a:latin typeface="+mn-lt"/>
+        <a:ea typeface="+mn-ea"/>
+        <a:cs typeface="+mn-cs"/>
+      </a:defRPr>
+    </a:lvl6pPr>
+    <a:lvl7pPr marL="2743200" algn="l" defTabSz="914400" rtl="0" eaLnBrk="1" latinLnBrk="0" hangingPunct="1">
+      <a:defRPr sz="1200" kern="1200">
+        <a:solidFill>
+          <a:schemeClr val="tx1"/>
+        </a:solidFill>
+        <a:latin typeface="+mn-lt"/>
+        <a:ea typeface="+mn-ea"/>
+        <a:cs typeface="+mn-cs"/>
+      </a:defRPr>
+    </a:lvl7pPr>
+    <a:lvl8pPr marL="3200400" algn="l" defTabSz="914400" rtl="0" eaLnBrk="1" latinLnBrk="0" hangingPunct="1">
+      <a:defRPr sz="1200" kern="1200">
+        <a:solidFill>
+          <a:schemeClr val="tx1"/>
+        </a:solidFill>
+        <a:latin typeface="+mn-lt"/>
+        <a:ea typeface="+mn-ea"/>
+        <a:cs typeface="+mn-cs"/>
+      </a:defRPr>
+    </a:lvl8pPr>
+    <a:lvl9pPr marL="3657600" algn="l" defTabSz="914400" rtl="0" eaLnBrk="1" latinLnBrk="0" hangingPunct="1">
+      <a:defRPr sz="1200" kern="1200">
+        <a:solidFill>
+          <a:schemeClr val="tx1"/>
+        </a:solidFill>
+        <a:latin typeface="+mn-lt"/>
+        <a:ea typeface="+mn-ea"/>
+        <a:cs typeface="+mn-cs"/>
+      </a:defRPr>
+    </a:lvl9pPr>
+  </p:notesStyle>
+</p:notesMaster>
+</file>
+
+<file path=ppt/notesSlides/notesSlide1.xml><?xml version="1.0" encoding="utf-8"?>
+<p:notes xmlns:a="http://schemas.openxmlformats.org/drawingml/2006/main" xmlns:r="http://schemas.openxmlformats.org/officeDocument/2006/relationships" xmlns:p="http://schemas.openxmlformats.org/presentationml/2006/main">
+  <p:cSld>
+    <p:spTree>
+      <p:nvGrpSpPr>
+        <p:cNvPr id="1" name=""/>
+        <p:cNvGrpSpPr/>
+        <p:nvPr/>
+      </p:nvGrpSpPr>
+      <p:grpSpPr>
+        <a:xfrm>
+          <a:off x="0" y="0"/>
+          <a:ext cx="0" cy="0"/>
+          <a:chOff x="0" y="0"/>
+          <a:chExt cx="0" cy="0"/>
+        </a:xfrm>
+      </p:grpSpPr>
+      <p:sp>
+        <p:nvSpPr>
+          <p:cNvPr id="2" name="Slide Image Placeholder 1"/>
+          <p:cNvSpPr>
+            <a:spLocks noGrp="1" noRot="1" noChangeAspect="1"/>
+          </p:cNvSpPr>
+          <p:nvPr>
+            <p:ph type="sldImg"/>
+          </p:nvPr>
+        </p:nvSpPr>
+        <p:spPr/>
+      </p:sp>
+      <p:sp>
+        <p:nvSpPr>
+          <p:cNvPr id="3" name="Notes Placeholder 2"/>
+          <p:cNvSpPr>
+            <a:spLocks noGrp="1"/>
+          </p:cNvSpPr>
+          <p:nvPr>
+            <p:ph type="body" idx="1"/>
+          </p:nvPr>
+        </p:nvSpPr>
+        <p:spPr/>
+        <p:txBody>
+          <a:bodyPr/>
+          <a:lstStyle/>
+          <a:p>
+            <a:r>
+              <a:rPr lang="en-US" err="1" smtClean="0"/>
+              <a:t>Giới</a:t>
+            </a:r>
+            <a:r>
+              <a:rPr lang="en-US" baseline="0" smtClean="0"/>
+              <a:t> </a:t>
+            </a:r>
+            <a:r>
+              <a:rPr lang="en-US" baseline="0" err="1" smtClean="0"/>
+              <a:t>thiệu</a:t>
+            </a:r>
+            <a:r>
+              <a:rPr lang="en-US" baseline="0" smtClean="0"/>
+              <a:t> </a:t>
+            </a:r>
+            <a:r>
+              <a:rPr lang="en-US" baseline="0" err="1" smtClean="0"/>
+              <a:t>đề</a:t>
+            </a:r>
+            <a:r>
+              <a:rPr lang="en-US" baseline="0" smtClean="0"/>
+              <a:t> </a:t>
+            </a:r>
+            <a:r>
+              <a:rPr lang="en-US" baseline="0" err="1" smtClean="0"/>
+              <a:t>tài</a:t>
+            </a:r>
+            <a:r>
+              <a:rPr lang="en-US" baseline="0" smtClean="0"/>
+              <a:t>: </a:t>
+            </a:r>
+            <a:r>
+              <a:rPr lang="en-US" baseline="0" err="1" smtClean="0"/>
+              <a:t>nêu</a:t>
+            </a:r>
+            <a:r>
+              <a:rPr lang="en-US" baseline="0" smtClean="0"/>
+              <a:t> qua </a:t>
+            </a:r>
+            <a:r>
+              <a:rPr lang="en-US" baseline="0" err="1" smtClean="0"/>
+              <a:t>về</a:t>
+            </a:r>
+            <a:r>
+              <a:rPr lang="en-US" baseline="0" smtClean="0"/>
+              <a:t> </a:t>
+            </a:r>
+            <a:r>
+              <a:rPr lang="en-US" baseline="0" err="1" smtClean="0"/>
+              <a:t>đề</a:t>
+            </a:r>
+            <a:r>
+              <a:rPr lang="en-US" baseline="0" smtClean="0"/>
+              <a:t> </a:t>
+            </a:r>
+            <a:r>
+              <a:rPr lang="en-US" baseline="0" err="1" smtClean="0"/>
+              <a:t>tài</a:t>
+            </a:r>
+            <a:r>
+              <a:rPr lang="en-US" baseline="0" smtClean="0"/>
+              <a:t> </a:t>
+            </a:r>
+            <a:r>
+              <a:rPr lang="en-US" baseline="0" err="1" smtClean="0"/>
+              <a:t>làm</a:t>
+            </a:r>
+            <a:r>
+              <a:rPr lang="en-US" baseline="0" smtClean="0"/>
+              <a:t> </a:t>
+            </a:r>
+            <a:r>
+              <a:rPr lang="en-US" baseline="0" err="1" smtClean="0"/>
+              <a:t>về</a:t>
+            </a:r>
+            <a:r>
+              <a:rPr lang="en-US" baseline="0" smtClean="0"/>
+              <a:t> </a:t>
+            </a:r>
+            <a:r>
+              <a:rPr lang="en-US" baseline="0" err="1" smtClean="0"/>
+              <a:t>lĩnh</a:t>
+            </a:r>
+            <a:r>
+              <a:rPr lang="en-US" baseline="0" smtClean="0"/>
+              <a:t> </a:t>
+            </a:r>
+            <a:r>
+              <a:rPr lang="en-US" baseline="0" err="1" smtClean="0"/>
+              <a:t>vực</a:t>
+            </a:r>
+            <a:r>
+              <a:rPr lang="en-US" baseline="0" smtClean="0"/>
+              <a:t> </a:t>
+            </a:r>
+            <a:r>
+              <a:rPr lang="en-US" baseline="0" err="1" smtClean="0"/>
+              <a:t>gì</a:t>
+            </a:r>
+            <a:r>
+              <a:rPr lang="en-US" baseline="0" smtClean="0"/>
+              <a:t>, </a:t>
+            </a:r>
+            <a:r>
+              <a:rPr lang="en-US" baseline="0" err="1" smtClean="0"/>
+              <a:t>lý</a:t>
+            </a:r>
+            <a:r>
+              <a:rPr lang="en-US" baseline="0" smtClean="0"/>
+              <a:t> do lựa </a:t>
+            </a:r>
+            <a:r>
+              <a:rPr lang="en-US" baseline="0" err="1" smtClean="0"/>
+              <a:t>chọn</a:t>
+            </a:r>
+            <a:r>
+              <a:rPr lang="en-US" baseline="0" smtClean="0"/>
+              <a:t> </a:t>
+            </a:r>
+            <a:r>
+              <a:rPr lang="en-US" baseline="0" err="1" smtClean="0"/>
+              <a:t>đề</a:t>
+            </a:r>
+            <a:r>
+              <a:rPr lang="en-US" baseline="0" smtClean="0"/>
+              <a:t> </a:t>
+            </a:r>
+            <a:r>
+              <a:rPr lang="en-US" baseline="0" err="1" smtClean="0"/>
+              <a:t>tài</a:t>
+            </a:r>
+            <a:r>
+              <a:rPr lang="en-US" baseline="0" smtClean="0"/>
+              <a:t>?</a:t>
+            </a:r>
+          </a:p>
+          <a:p>
+            <a:r>
+              <a:rPr lang="en-US" baseline="0" err="1" smtClean="0"/>
+              <a:t>Mô</a:t>
+            </a:r>
+            <a:r>
+              <a:rPr lang="en-US" baseline="0" smtClean="0"/>
+              <a:t> </a:t>
+            </a:r>
+            <a:r>
+              <a:rPr lang="en-US" baseline="0" err="1" smtClean="0"/>
+              <a:t>tả</a:t>
+            </a:r>
+            <a:r>
+              <a:rPr lang="en-US" baseline="0" smtClean="0"/>
+              <a:t> </a:t>
+            </a:r>
+            <a:r>
+              <a:rPr lang="en-US" baseline="0" err="1" smtClean="0"/>
+              <a:t>nghiệp</a:t>
+            </a:r>
+            <a:r>
+              <a:rPr lang="en-US" baseline="0" smtClean="0"/>
+              <a:t> </a:t>
+            </a:r>
+            <a:r>
+              <a:rPr lang="en-US" baseline="0" err="1" smtClean="0"/>
+              <a:t>vụ</a:t>
+            </a:r>
+            <a:r>
+              <a:rPr lang="en-US" baseline="0" smtClean="0"/>
+              <a:t>: </a:t>
+            </a:r>
+            <a:r>
+              <a:rPr lang="en-US" baseline="0" err="1" smtClean="0"/>
+              <a:t>chủ</a:t>
+            </a:r>
+            <a:r>
+              <a:rPr lang="en-US" baseline="0" smtClean="0"/>
+              <a:t> </a:t>
+            </a:r>
+            <a:r>
+              <a:rPr lang="en-US" baseline="0" err="1" smtClean="0"/>
+              <a:t>yếu</a:t>
+            </a:r>
+            <a:r>
+              <a:rPr lang="en-US" baseline="0" smtClean="0"/>
+              <a:t> show </a:t>
+            </a:r>
+            <a:r>
+              <a:rPr lang="en-US" baseline="0" err="1" smtClean="0"/>
+              <a:t>ra</a:t>
+            </a:r>
+            <a:r>
+              <a:rPr lang="en-US" baseline="0" smtClean="0"/>
+              <a:t> flow chart.</a:t>
+            </a:r>
+          </a:p>
+          <a:p>
+            <a:r>
+              <a:rPr lang="en-US" baseline="0" err="1" smtClean="0"/>
+              <a:t>Phân</a:t>
+            </a:r>
+            <a:r>
+              <a:rPr lang="en-US" baseline="0" smtClean="0"/>
+              <a:t> </a:t>
+            </a:r>
+            <a:r>
+              <a:rPr lang="en-US" baseline="0" err="1" smtClean="0"/>
+              <a:t>tích</a:t>
+            </a:r>
+            <a:r>
+              <a:rPr lang="en-US" baseline="0" smtClean="0"/>
+              <a:t> </a:t>
+            </a:r>
+            <a:r>
+              <a:rPr lang="en-US" baseline="0" err="1" smtClean="0"/>
+              <a:t>yêu</a:t>
+            </a:r>
+            <a:r>
+              <a:rPr lang="en-US" baseline="0" smtClean="0"/>
+              <a:t> </a:t>
+            </a:r>
+            <a:r>
+              <a:rPr lang="en-US" baseline="0" err="1" smtClean="0"/>
+              <a:t>cầu</a:t>
+            </a:r>
+            <a:r>
+              <a:rPr lang="en-US" baseline="0" smtClean="0"/>
+              <a:t>: </a:t>
+            </a:r>
+            <a:r>
+              <a:rPr lang="en-US" baseline="0" err="1" smtClean="0"/>
+              <a:t>Nhấn</a:t>
+            </a:r>
+            <a:r>
+              <a:rPr lang="en-US" baseline="0" smtClean="0"/>
+              <a:t> </a:t>
+            </a:r>
+            <a:r>
+              <a:rPr lang="en-US" baseline="0" err="1" smtClean="0"/>
+              <a:t>mạnh</a:t>
+            </a:r>
+            <a:r>
+              <a:rPr lang="en-US" baseline="0" smtClean="0"/>
+              <a:t> </a:t>
+            </a:r>
+            <a:r>
+              <a:rPr lang="en-US" baseline="0" err="1" smtClean="0"/>
+              <a:t>hệ</a:t>
+            </a:r>
+            <a:r>
+              <a:rPr lang="en-US" baseline="0" smtClean="0"/>
+              <a:t> </a:t>
+            </a:r>
+            <a:r>
+              <a:rPr lang="en-US" baseline="0" err="1" smtClean="0"/>
+              <a:t>thống</a:t>
+            </a:r>
+            <a:r>
+              <a:rPr lang="en-US" baseline="0" smtClean="0"/>
+              <a:t> </a:t>
+            </a:r>
+            <a:r>
+              <a:rPr lang="en-US" baseline="0" err="1" smtClean="0"/>
+              <a:t>cũ</a:t>
+            </a:r>
+            <a:r>
+              <a:rPr lang="en-US" baseline="0" smtClean="0"/>
+              <a:t> </a:t>
+            </a:r>
+            <a:r>
+              <a:rPr lang="en-US" baseline="0" err="1" smtClean="0"/>
+              <a:t>đã</a:t>
+            </a:r>
+            <a:r>
+              <a:rPr lang="en-US" baseline="0" smtClean="0"/>
+              <a:t> </a:t>
+            </a:r>
+            <a:r>
+              <a:rPr lang="en-US" baseline="0" err="1" smtClean="0"/>
+              <a:t>làm</a:t>
+            </a:r>
+            <a:r>
+              <a:rPr lang="en-US" baseline="0" smtClean="0"/>
+              <a:t> </a:t>
+            </a:r>
+            <a:r>
+              <a:rPr lang="en-US" baseline="0" err="1" smtClean="0"/>
+              <a:t>gì</a:t>
+            </a:r>
+            <a:r>
+              <a:rPr lang="en-US" baseline="0" smtClean="0"/>
+              <a:t>, </a:t>
+            </a:r>
+            <a:r>
+              <a:rPr lang="en-US" baseline="0" err="1" smtClean="0"/>
+              <a:t>nhiệm</a:t>
+            </a:r>
+            <a:r>
+              <a:rPr lang="en-US" baseline="0" smtClean="0"/>
+              <a:t> </a:t>
+            </a:r>
+            <a:r>
+              <a:rPr lang="en-US" baseline="0" err="1" smtClean="0"/>
+              <a:t>vụ</a:t>
+            </a:r>
+            <a:r>
+              <a:rPr lang="en-US" baseline="0" smtClean="0"/>
+              <a:t> </a:t>
+            </a:r>
+            <a:r>
+              <a:rPr lang="en-US" baseline="0" err="1" smtClean="0"/>
+              <a:t>của</a:t>
+            </a:r>
+            <a:r>
+              <a:rPr lang="en-US" baseline="0" smtClean="0"/>
+              <a:t> </a:t>
+            </a:r>
+            <a:r>
+              <a:rPr lang="en-US" baseline="0" err="1" smtClean="0"/>
+              <a:t>luân</a:t>
+            </a:r>
+            <a:r>
+              <a:rPr lang="en-US" baseline="0" smtClean="0"/>
+              <a:t> </a:t>
+            </a:r>
+            <a:r>
+              <a:rPr lang="en-US" baseline="0" err="1" smtClean="0"/>
+              <a:t>văn</a:t>
+            </a:r>
+            <a:r>
+              <a:rPr lang="en-US" baseline="0" smtClean="0"/>
+              <a:t> </a:t>
+            </a:r>
+            <a:r>
+              <a:rPr lang="en-US" baseline="0" err="1" smtClean="0"/>
+              <a:t>lần</a:t>
+            </a:r>
+            <a:r>
+              <a:rPr lang="en-US" baseline="0" smtClean="0"/>
+              <a:t> </a:t>
+            </a:r>
+            <a:r>
+              <a:rPr lang="en-US" baseline="0" err="1" smtClean="0"/>
+              <a:t>này</a:t>
+            </a:r>
+            <a:r>
+              <a:rPr lang="en-US" baseline="0" smtClean="0"/>
+              <a:t>.</a:t>
+            </a:r>
+          </a:p>
+          <a:p>
+            <a:r>
+              <a:rPr lang="en-US" baseline="0" smtClean="0"/>
+              <a:t>Thiết kế hệ thống: chỉ ra đã chọn lựa framework gì? Tại sao có rất nhiều framework nhưng lại lựa chọn nó mà không phải là những cái khác?</a:t>
+            </a:r>
+          </a:p>
+          <a:p>
+            <a:r>
+              <a:rPr lang="en-US" baseline="0" smtClean="0"/>
+              <a:t>Thực hiện hệ thống: kiến trúc MVC, thiết kế ERD</a:t>
+            </a:r>
+          </a:p>
+          <a:p>
+            <a:r>
+              <a:rPr lang="en-US" baseline="0" smtClean="0"/>
+              <a:t>Demo: show từng yêu cầu ra, và demo những gì đã làm với yêu cầu đó</a:t>
+            </a:r>
+          </a:p>
+          <a:p>
+            <a:r>
+              <a:rPr lang="en-US" baseline="0" smtClean="0"/>
+              <a:t>Đánh giá hệ thống: cái cũ đã làm gì? Yêu cầu của đề luận văn là gì? Đã hoàn thành được như thế nào? Còn khuyết điểm gì? Và hướng phát triển sau này?</a:t>
+            </a:r>
+          </a:p>
+          <a:p>
+            <a:r>
+              <a:rPr lang="en-US" baseline="0" smtClean="0"/>
+              <a:t>Tổng kết: đã học được gì qua luận văn? Cách phân tích yêu cầu và qui trình làm việc. Cách làm việc nhóm, làm việc với source control. Kiến thức học được về frame work, cách đọc tài liệu. Cách viết docs. Cách báo cáo thuyết trình.</a:t>
+            </a:r>
+          </a:p>
+          <a:p>
+            <a:endParaRPr lang="en-US"/>
+          </a:p>
+        </p:txBody>
+      </p:sp>
+      <p:sp>
+        <p:nvSpPr>
+          <p:cNvPr id="4" name="Slide Number Placeholder 3"/>
+          <p:cNvSpPr>
+            <a:spLocks noGrp="1"/>
+          </p:cNvSpPr>
+          <p:nvPr>
+            <p:ph type="sldNum" sz="quarter" idx="10"/>
+          </p:nvPr>
+        </p:nvSpPr>
+        <p:spPr/>
+        <p:txBody>
+          <a:bodyPr/>
+          <a:lstStyle/>
+          <a:p>
+            <a:fld id="{BCE61933-B1A4-49F7-8FC7-4404562CCF99}" type="slidenum">
+              <a:rPr lang="en-US" smtClean="0"/>
+              <a:t>2</a:t>
+            </a:fld>
+            <a:endParaRPr lang="en-US"/>
+          </a:p>
+        </p:txBody>
+      </p:sp>
+    </p:spTree>
+    <p:extLst>
+      <p:ext uri="{BB962C8B-B14F-4D97-AF65-F5344CB8AC3E}">
+        <p14:creationId xmlns:p14="http://schemas.microsoft.com/office/powerpoint/2010/main" val="1945062865"/>
+      </p:ext>
+    </p:extLst>
+  </p:cSld>
+  <p:clrMapOvr>
+    <a:masterClrMapping/>
+  </p:clrMapOvr>
+</p:notes>
+</file>
+
 <file path=ppt/slideLayouts/slideLayout1.xml><?xml version="1.0" encoding="utf-8"?>
 <p:sldLayout xmlns:a="http://schemas.openxmlformats.org/drawingml/2006/main" xmlns:r="http://schemas.openxmlformats.org/officeDocument/2006/relationships" xmlns:p="http://schemas.openxmlformats.org/presentationml/2006/main" type="title" preserve="1">
   <p:cSld name="Title Slide">
@@ -297,11 +1114,11 @@
           <a:lstStyle/>
           <a:p>
             <a:fld id="{B61BEF0D-F0BB-DE4B-95CE-6DB70DBA9567}" type="datetimeFigureOut">
-              <a:rPr lang="en-US" dirty="0"/>
+              <a:rPr lang="en-US"/>
               <a:pPr/>
               <a:t>5/15/2017</a:t>
             </a:fld>
-            <a:endParaRPr lang="en-US" dirty="0"/>
+            <a:endParaRPr lang="en-US"/>
           </a:p>
         </p:txBody>
       </p:sp>
@@ -320,7 +1137,7 @@
           <a:bodyPr/>
           <a:lstStyle/>
           <a:p>
-            <a:endParaRPr lang="en-US" dirty="0"/>
+            <a:endParaRPr lang="en-US"/>
           </a:p>
         </p:txBody>
       </p:sp>
@@ -427,11 +1244,11 @@
           <a:lstStyle/>
           <a:p>
             <a:fld id="{D57F1E4F-1CFF-5643-939E-217C01CDF565}" type="slidenum">
-              <a:rPr lang="en-US" dirty="0"/>
+              <a:rPr lang="en-US"/>
               <a:pPr/>
               <a:t>‹#›</a:t>
             </a:fld>
-            <a:endParaRPr lang="en-US" dirty="0"/>
+            <a:endParaRPr lang="en-US"/>
           </a:p>
         </p:txBody>
       </p:sp>
@@ -632,11 +1449,11 @@
           <a:lstStyle/>
           <a:p>
             <a:fld id="{B61BEF0D-F0BB-DE4B-95CE-6DB70DBA9567}" type="datetimeFigureOut">
-              <a:rPr lang="en-US" dirty="0"/>
+              <a:rPr lang="en-US"/>
               <a:pPr/>
               <a:t>5/15/2017</a:t>
             </a:fld>
-            <a:endParaRPr lang="en-US" dirty="0"/>
+            <a:endParaRPr lang="en-US"/>
           </a:p>
         </p:txBody>
       </p:sp>
@@ -655,7 +1472,7 @@
           <a:bodyPr/>
           <a:lstStyle/>
           <a:p>
-            <a:endParaRPr lang="en-US" dirty="0"/>
+            <a:endParaRPr lang="en-US"/>
           </a:p>
         </p:txBody>
       </p:sp>
@@ -762,11 +1579,11 @@
           <a:lstStyle/>
           <a:p>
             <a:fld id="{D57F1E4F-1CFF-5643-939E-217C01CDF565}" type="slidenum">
-              <a:rPr lang="en-US" dirty="0"/>
+              <a:rPr lang="en-US"/>
               <a:pPr/>
               <a:t>‹#›</a:t>
             </a:fld>
-            <a:endParaRPr lang="en-US" dirty="0"/>
+            <a:endParaRPr lang="en-US"/>
           </a:p>
         </p:txBody>
       </p:sp>
@@ -1030,11 +1847,11 @@
           <a:lstStyle/>
           <a:p>
             <a:fld id="{B61BEF0D-F0BB-DE4B-95CE-6DB70DBA9567}" type="datetimeFigureOut">
-              <a:rPr lang="en-US" dirty="0"/>
+              <a:rPr lang="en-US"/>
               <a:pPr/>
               <a:t>5/15/2017</a:t>
             </a:fld>
-            <a:endParaRPr lang="en-US" dirty="0"/>
+            <a:endParaRPr lang="en-US"/>
           </a:p>
         </p:txBody>
       </p:sp>
@@ -1053,7 +1870,7 @@
           <a:bodyPr/>
           <a:lstStyle/>
           <a:p>
-            <a:endParaRPr lang="en-US" dirty="0"/>
+            <a:endParaRPr lang="en-US"/>
           </a:p>
         </p:txBody>
       </p:sp>
@@ -1160,11 +1977,11 @@
           <a:lstStyle/>
           <a:p>
             <a:fld id="{D57F1E4F-1CFF-5643-939E-217C01CDF565}" type="slidenum">
-              <a:rPr lang="en-US" dirty="0"/>
+              <a:rPr lang="en-US"/>
               <a:pPr/>
               <a:t>‹#›</a:t>
             </a:fld>
-            <a:endParaRPr lang="en-US" dirty="0"/>
+            <a:endParaRPr lang="en-US"/>
           </a:p>
         </p:txBody>
       </p:sp>
@@ -1191,7 +2008,7 @@
           <a:p>
             <a:pPr lvl="0"/>
             <a:r>
-              <a:rPr lang="en-US" sz="8000" baseline="0" dirty="0">
+              <a:rPr lang="en-US" sz="8000" baseline="0">
                 <a:ln w="3175" cmpd="sng">
                   <a:noFill/>
                 </a:ln>
@@ -1229,7 +2046,7 @@
           <a:p>
             <a:pPr lvl="0"/>
             <a:r>
-              <a:rPr lang="en-US" sz="8000" baseline="0" dirty="0">
+              <a:rPr lang="en-US" sz="8000" baseline="0">
                 <a:ln w="3175" cmpd="sng">
                   <a:noFill/>
                 </a:ln>
@@ -1363,11 +2180,11 @@
           <a:lstStyle/>
           <a:p>
             <a:fld id="{B61BEF0D-F0BB-DE4B-95CE-6DB70DBA9567}" type="datetimeFigureOut">
-              <a:rPr lang="en-US" dirty="0"/>
+              <a:rPr lang="en-US"/>
               <a:pPr/>
               <a:t>5/15/2017</a:t>
             </a:fld>
-            <a:endParaRPr lang="en-US" dirty="0"/>
+            <a:endParaRPr lang="en-US"/>
           </a:p>
         </p:txBody>
       </p:sp>
@@ -1386,7 +2203,7 @@
           <a:bodyPr/>
           <a:lstStyle/>
           <a:p>
-            <a:endParaRPr lang="en-US" dirty="0"/>
+            <a:endParaRPr lang="en-US"/>
           </a:p>
         </p:txBody>
       </p:sp>
@@ -1493,11 +2310,11 @@
           <a:lstStyle/>
           <a:p>
             <a:fld id="{D57F1E4F-1CFF-5643-939E-217C01CDF565}" type="slidenum">
-              <a:rPr lang="en-US" dirty="0"/>
+              <a:rPr lang="en-US"/>
               <a:pPr/>
               <a:t>‹#›</a:t>
             </a:fld>
-            <a:endParaRPr lang="en-US" dirty="0"/>
+            <a:endParaRPr lang="en-US"/>
           </a:p>
         </p:txBody>
       </p:sp>
@@ -1680,11 +2497,11 @@
           <a:lstStyle/>
           <a:p>
             <a:fld id="{B61BEF0D-F0BB-DE4B-95CE-6DB70DBA9567}" type="datetimeFigureOut">
-              <a:rPr lang="en-US" dirty="0"/>
+              <a:rPr lang="en-US"/>
               <a:pPr/>
               <a:t>5/15/2017</a:t>
             </a:fld>
-            <a:endParaRPr lang="en-US" dirty="0"/>
+            <a:endParaRPr lang="en-US"/>
           </a:p>
         </p:txBody>
       </p:sp>
@@ -1703,7 +2520,7 @@
           <a:bodyPr/>
           <a:lstStyle/>
           <a:p>
-            <a:endParaRPr lang="en-US" dirty="0"/>
+            <a:endParaRPr lang="en-US"/>
           </a:p>
         </p:txBody>
       </p:sp>
@@ -1810,11 +2627,11 @@
           <a:lstStyle/>
           <a:p>
             <a:fld id="{D57F1E4F-1CFF-5643-939E-217C01CDF565}" type="slidenum">
-              <a:rPr lang="en-US" dirty="0"/>
+              <a:rPr lang="en-US"/>
               <a:pPr/>
               <a:t>‹#›</a:t>
             </a:fld>
-            <a:endParaRPr lang="en-US" dirty="0"/>
+            <a:endParaRPr lang="en-US"/>
           </a:p>
         </p:txBody>
       </p:sp>
@@ -1841,7 +2658,7 @@
           <a:p>
             <a:pPr lvl="0"/>
             <a:r>
-              <a:rPr lang="en-US" sz="8000" baseline="0" dirty="0">
+              <a:rPr lang="en-US" sz="8000" baseline="0">
                 <a:ln w="3175" cmpd="sng">
                   <a:noFill/>
                 </a:ln>
@@ -1879,7 +2696,7 @@
           <a:p>
             <a:pPr lvl="0"/>
             <a:r>
-              <a:rPr lang="en-US" sz="8000" baseline="0" dirty="0">
+              <a:rPr lang="en-US" sz="8000" baseline="0">
                 <a:ln w="3175" cmpd="sng">
                   <a:noFill/>
                 </a:ln>
@@ -2073,11 +2890,11 @@
           <a:lstStyle/>
           <a:p>
             <a:fld id="{B61BEF0D-F0BB-DE4B-95CE-6DB70DBA9567}" type="datetimeFigureOut">
-              <a:rPr lang="en-US" dirty="0"/>
+              <a:rPr lang="en-US"/>
               <a:pPr/>
               <a:t>5/15/2017</a:t>
             </a:fld>
-            <a:endParaRPr lang="en-US" dirty="0"/>
+            <a:endParaRPr lang="en-US"/>
           </a:p>
         </p:txBody>
       </p:sp>
@@ -2096,7 +2913,7 @@
           <a:bodyPr/>
           <a:lstStyle/>
           <a:p>
-            <a:endParaRPr lang="en-US" dirty="0"/>
+            <a:endParaRPr lang="en-US"/>
           </a:p>
         </p:txBody>
       </p:sp>
@@ -2203,11 +3020,11 @@
           <a:lstStyle/>
           <a:p>
             <a:fld id="{D57F1E4F-1CFF-5643-939E-217C01CDF565}" type="slidenum">
-              <a:rPr lang="en-US" dirty="0"/>
+              <a:rPr lang="en-US"/>
               <a:pPr/>
               <a:t>‹#›</a:t>
             </a:fld>
-            <a:endParaRPr lang="en-US" dirty="0"/>
+            <a:endParaRPr lang="en-US"/>
           </a:p>
         </p:txBody>
       </p:sp>
@@ -2327,11 +3144,11 @@
           <a:lstStyle/>
           <a:p>
             <a:fld id="{B61BEF0D-F0BB-DE4B-95CE-6DB70DBA9567}" type="datetimeFigureOut">
-              <a:rPr lang="en-US" dirty="0"/>
+              <a:rPr lang="en-US"/>
               <a:pPr/>
               <a:t>5/15/2017</a:t>
             </a:fld>
-            <a:endParaRPr lang="en-US" dirty="0"/>
+            <a:endParaRPr lang="en-US"/>
           </a:p>
         </p:txBody>
       </p:sp>
@@ -2350,7 +3167,7 @@
           <a:bodyPr/>
           <a:lstStyle/>
           <a:p>
-            <a:endParaRPr lang="en-US" dirty="0"/>
+            <a:endParaRPr lang="en-US"/>
           </a:p>
         </p:txBody>
       </p:sp>
@@ -2452,11 +3269,11 @@
           <a:lstStyle/>
           <a:p>
             <a:fld id="{D57F1E4F-1CFF-5643-939E-217C01CDF565}" type="slidenum">
-              <a:rPr lang="en-US" dirty="0"/>
+              <a:rPr lang="en-US"/>
               <a:pPr/>
               <a:t>‹#›</a:t>
             </a:fld>
-            <a:endParaRPr lang="en-US" dirty="0"/>
+            <a:endParaRPr lang="en-US"/>
           </a:p>
         </p:txBody>
       </p:sp>
@@ -2586,11 +3403,11 @@
           <a:lstStyle/>
           <a:p>
             <a:fld id="{B61BEF0D-F0BB-DE4B-95CE-6DB70DBA9567}" type="datetimeFigureOut">
-              <a:rPr lang="en-US" dirty="0"/>
+              <a:rPr lang="en-US"/>
               <a:pPr/>
               <a:t>5/15/2017</a:t>
             </a:fld>
-            <a:endParaRPr lang="en-US" dirty="0"/>
+            <a:endParaRPr lang="en-US"/>
           </a:p>
         </p:txBody>
       </p:sp>
@@ -2609,7 +3426,7 @@
           <a:bodyPr/>
           <a:lstStyle/>
           <a:p>
-            <a:endParaRPr lang="en-US" dirty="0"/>
+            <a:endParaRPr lang="en-US"/>
           </a:p>
         </p:txBody>
       </p:sp>
@@ -2711,11 +3528,11 @@
           <a:lstStyle/>
           <a:p>
             <a:fld id="{D57F1E4F-1CFF-5643-939E-217C01CDF565}" type="slidenum">
-              <a:rPr lang="en-US" dirty="0"/>
+              <a:rPr lang="en-US"/>
               <a:pPr/>
               <a:t>‹#›</a:t>
             </a:fld>
-            <a:endParaRPr lang="en-US" dirty="0"/>
+            <a:endParaRPr lang="en-US"/>
           </a:p>
         </p:txBody>
       </p:sp>
@@ -2845,11 +3662,11 @@
           <a:lstStyle/>
           <a:p>
             <a:fld id="{B61BEF0D-F0BB-DE4B-95CE-6DB70DBA9567}" type="datetimeFigureOut">
-              <a:rPr lang="en-US" dirty="0"/>
+              <a:rPr lang="en-US"/>
               <a:pPr/>
               <a:t>5/15/2017</a:t>
             </a:fld>
-            <a:endParaRPr lang="en-US" dirty="0"/>
+            <a:endParaRPr lang="en-US"/>
           </a:p>
         </p:txBody>
       </p:sp>
@@ -2868,7 +3685,7 @@
           <a:bodyPr/>
           <a:lstStyle/>
           <a:p>
-            <a:endParaRPr lang="en-US" dirty="0"/>
+            <a:endParaRPr lang="en-US"/>
           </a:p>
         </p:txBody>
       </p:sp>
@@ -2970,11 +3787,11 @@
           <a:lstStyle/>
           <a:p>
             <a:fld id="{D57F1E4F-1CFF-5643-939E-217C01CDF565}" type="slidenum">
-              <a:rPr lang="en-US" dirty="0"/>
+              <a:rPr lang="en-US"/>
               <a:pPr/>
               <a:t>‹#›</a:t>
             </a:fld>
-            <a:endParaRPr lang="en-US" dirty="0"/>
+            <a:endParaRPr lang="en-US"/>
           </a:p>
         </p:txBody>
       </p:sp>
@@ -3171,11 +3988,11 @@
           <a:lstStyle/>
           <a:p>
             <a:fld id="{B61BEF0D-F0BB-DE4B-95CE-6DB70DBA9567}" type="datetimeFigureOut">
-              <a:rPr lang="en-US" dirty="0"/>
+              <a:rPr lang="en-US"/>
               <a:pPr/>
               <a:t>5/15/2017</a:t>
             </a:fld>
-            <a:endParaRPr lang="en-US" dirty="0"/>
+            <a:endParaRPr lang="en-US"/>
           </a:p>
         </p:txBody>
       </p:sp>
@@ -3194,7 +4011,7 @@
           <a:bodyPr/>
           <a:lstStyle/>
           <a:p>
-            <a:endParaRPr lang="en-US" dirty="0"/>
+            <a:endParaRPr lang="en-US"/>
           </a:p>
         </p:txBody>
       </p:sp>
@@ -3301,11 +4118,11 @@
           <a:lstStyle/>
           <a:p>
             <a:fld id="{D57F1E4F-1CFF-5643-939E-217C01CDF565}" type="slidenum">
-              <a:rPr lang="en-US" dirty="0"/>
+              <a:rPr lang="en-US"/>
               <a:pPr/>
               <a:t>‹#›</a:t>
             </a:fld>
-            <a:endParaRPr lang="en-US" dirty="0"/>
+            <a:endParaRPr lang="en-US"/>
           </a:p>
         </p:txBody>
       </p:sp>
@@ -3491,11 +4308,11 @@
           <a:lstStyle/>
           <a:p>
             <a:fld id="{B61BEF0D-F0BB-DE4B-95CE-6DB70DBA9567}" type="datetimeFigureOut">
-              <a:rPr lang="en-US" dirty="0"/>
+              <a:rPr lang="en-US"/>
               <a:pPr/>
               <a:t>5/15/2017</a:t>
             </a:fld>
-            <a:endParaRPr lang="en-US" dirty="0"/>
+            <a:endParaRPr lang="en-US"/>
           </a:p>
         </p:txBody>
       </p:sp>
@@ -3514,7 +4331,7 @@
           <a:bodyPr/>
           <a:lstStyle/>
           <a:p>
-            <a:endParaRPr lang="en-US" dirty="0"/>
+            <a:endParaRPr lang="en-US"/>
           </a:p>
         </p:txBody>
       </p:sp>
@@ -3621,11 +4438,11 @@
           <a:lstStyle/>
           <a:p>
             <a:fld id="{D57F1E4F-1CFF-5643-939E-217C01CDF565}" type="slidenum">
-              <a:rPr lang="en-US" dirty="0"/>
+              <a:rPr lang="en-US"/>
               <a:pPr/>
               <a:t>‹#›</a:t>
             </a:fld>
-            <a:endParaRPr lang="en-US" dirty="0"/>
+            <a:endParaRPr lang="en-US"/>
           </a:p>
         </p:txBody>
       </p:sp>
@@ -3945,11 +4762,11 @@
           <a:lstStyle/>
           <a:p>
             <a:fld id="{B61BEF0D-F0BB-DE4B-95CE-6DB70DBA9567}" type="datetimeFigureOut">
-              <a:rPr lang="en-US" dirty="0"/>
+              <a:rPr lang="en-US"/>
               <a:pPr/>
               <a:t>5/15/2017</a:t>
             </a:fld>
-            <a:endParaRPr lang="en-US" dirty="0"/>
+            <a:endParaRPr lang="en-US"/>
           </a:p>
         </p:txBody>
       </p:sp>
@@ -3968,7 +4785,7 @@
           <a:bodyPr/>
           <a:lstStyle/>
           <a:p>
-            <a:endParaRPr lang="en-US" dirty="0"/>
+            <a:endParaRPr lang="en-US"/>
           </a:p>
         </p:txBody>
       </p:sp>
@@ -4075,11 +4892,11 @@
           <a:lstStyle/>
           <a:p>
             <a:fld id="{D57F1E4F-1CFF-5643-939E-217C01CDF565}" type="slidenum">
-              <a:rPr lang="en-US" dirty="0"/>
+              <a:rPr lang="en-US"/>
               <a:pPr/>
               <a:t>‹#›</a:t>
             </a:fld>
-            <a:endParaRPr lang="en-US" dirty="0"/>
+            <a:endParaRPr lang="en-US"/>
           </a:p>
         </p:txBody>
       </p:sp>
@@ -4147,11 +4964,11 @@
           <a:lstStyle/>
           <a:p>
             <a:fld id="{B61BEF0D-F0BB-DE4B-95CE-6DB70DBA9567}" type="datetimeFigureOut">
-              <a:rPr lang="en-US" dirty="0"/>
+              <a:rPr lang="en-US"/>
               <a:pPr/>
               <a:t>5/15/2017</a:t>
             </a:fld>
-            <a:endParaRPr lang="en-US" dirty="0"/>
+            <a:endParaRPr lang="en-US"/>
           </a:p>
         </p:txBody>
       </p:sp>
@@ -4170,7 +4987,7 @@
           <a:bodyPr/>
           <a:lstStyle/>
           <a:p>
-            <a:endParaRPr lang="en-US" dirty="0"/>
+            <a:endParaRPr lang="en-US"/>
           </a:p>
         </p:txBody>
       </p:sp>
@@ -4272,11 +5089,11 @@
           <a:lstStyle/>
           <a:p>
             <a:fld id="{D57F1E4F-1CFF-5643-939E-217C01CDF565}" type="slidenum">
-              <a:rPr lang="en-US" dirty="0"/>
+              <a:rPr lang="en-US"/>
               <a:pPr/>
               <a:t>‹#›</a:t>
             </a:fld>
-            <a:endParaRPr lang="en-US" dirty="0"/>
+            <a:endParaRPr lang="en-US"/>
           </a:p>
         </p:txBody>
       </p:sp>
@@ -4321,11 +5138,11 @@
           <a:lstStyle/>
           <a:p>
             <a:fld id="{B61BEF0D-F0BB-DE4B-95CE-6DB70DBA9567}" type="datetimeFigureOut">
-              <a:rPr lang="en-US" dirty="0"/>
+              <a:rPr lang="en-US"/>
               <a:pPr/>
               <a:t>5/15/2017</a:t>
             </a:fld>
-            <a:endParaRPr lang="en-US" dirty="0"/>
+            <a:endParaRPr lang="en-US"/>
           </a:p>
         </p:txBody>
       </p:sp>
@@ -4344,7 +5161,7 @@
           <a:bodyPr/>
           <a:lstStyle/>
           <a:p>
-            <a:endParaRPr lang="en-US" dirty="0"/>
+            <a:endParaRPr lang="en-US"/>
           </a:p>
         </p:txBody>
       </p:sp>
@@ -4446,11 +5263,11 @@
           <a:lstStyle/>
           <a:p>
             <a:fld id="{D57F1E4F-1CFF-5643-939E-217C01CDF565}" type="slidenum">
-              <a:rPr lang="en-US" dirty="0"/>
+              <a:rPr lang="en-US"/>
               <a:pPr/>
               <a:t>‹#›</a:t>
             </a:fld>
-            <a:endParaRPr lang="en-US" dirty="0"/>
+            <a:endParaRPr lang="en-US"/>
           </a:p>
         </p:txBody>
       </p:sp>
@@ -4651,11 +5468,11 @@
           <a:lstStyle/>
           <a:p>
             <a:fld id="{B61BEF0D-F0BB-DE4B-95CE-6DB70DBA9567}" type="datetimeFigureOut">
-              <a:rPr lang="en-US" dirty="0"/>
+              <a:rPr lang="en-US"/>
               <a:pPr/>
               <a:t>5/15/2017</a:t>
             </a:fld>
-            <a:endParaRPr lang="en-US" dirty="0"/>
+            <a:endParaRPr lang="en-US"/>
           </a:p>
         </p:txBody>
       </p:sp>
@@ -4674,7 +5491,7 @@
           <a:bodyPr/>
           <a:lstStyle/>
           <a:p>
-            <a:endParaRPr lang="en-US" dirty="0"/>
+            <a:endParaRPr lang="en-US"/>
           </a:p>
         </p:txBody>
       </p:sp>
@@ -4776,11 +5593,11 @@
           <a:lstStyle/>
           <a:p>
             <a:fld id="{D57F1E4F-1CFF-5643-939E-217C01CDF565}" type="slidenum">
-              <a:rPr lang="en-US" dirty="0"/>
+              <a:rPr lang="en-US"/>
               <a:pPr/>
               <a:t>‹#›</a:t>
             </a:fld>
-            <a:endParaRPr lang="en-US" dirty="0"/>
+            <a:endParaRPr lang="en-US"/>
           </a:p>
         </p:txBody>
       </p:sp>
@@ -4906,7 +5723,7 @@
               <a:rPr lang="en-US" smtClean="0"/>
               <a:t>Click icon to add picture</a:t>
             </a:r>
-            <a:endParaRPr lang="en-US" dirty="0"/>
+            <a:endParaRPr lang="en-US"/>
           </a:p>
         </p:txBody>
       </p:sp>
@@ -4993,11 +5810,11 @@
           <a:lstStyle/>
           <a:p>
             <a:fld id="{B61BEF0D-F0BB-DE4B-95CE-6DB70DBA9567}" type="datetimeFigureOut">
-              <a:rPr lang="en-US" dirty="0"/>
+              <a:rPr lang="en-US"/>
               <a:pPr/>
               <a:t>5/15/2017</a:t>
             </a:fld>
-            <a:endParaRPr lang="en-US" dirty="0"/>
+            <a:endParaRPr lang="en-US"/>
           </a:p>
         </p:txBody>
       </p:sp>
@@ -5016,7 +5833,7 @@
           <a:bodyPr/>
           <a:lstStyle/>
           <a:p>
-            <a:endParaRPr lang="en-US" dirty="0"/>
+            <a:endParaRPr lang="en-US"/>
           </a:p>
         </p:txBody>
       </p:sp>
@@ -5123,11 +5940,11 @@
           <a:lstStyle/>
           <a:p>
             <a:fld id="{D57F1E4F-1CFF-5643-939E-217C01CDF565}" type="slidenum">
-              <a:rPr lang="en-US" dirty="0"/>
+              <a:rPr lang="en-US"/>
               <a:pPr/>
               <a:t>‹#›</a:t>
             </a:fld>
-            <a:endParaRPr lang="en-US" dirty="0"/>
+            <a:endParaRPr lang="en-US"/>
           </a:p>
         </p:txBody>
       </p:sp>
@@ -7107,11 +7924,11 @@
           </a:lstStyle>
           <a:p>
             <a:fld id="{B61BEF0D-F0BB-DE4B-95CE-6DB70DBA9567}" type="datetimeFigureOut">
-              <a:rPr lang="en-US" dirty="0"/>
+              <a:rPr lang="en-US"/>
               <a:pPr/>
               <a:t>5/15/2017</a:t>
             </a:fld>
-            <a:endParaRPr lang="en-US" dirty="0"/>
+            <a:endParaRPr lang="en-US"/>
           </a:p>
         </p:txBody>
       </p:sp>
@@ -7148,7 +7965,7 @@
             </a:lvl1pPr>
           </a:lstStyle>
           <a:p>
-            <a:endParaRPr lang="en-US" dirty="0"/>
+            <a:endParaRPr lang="en-US"/>
           </a:p>
         </p:txBody>
       </p:sp>
@@ -7184,11 +8001,11 @@
           </a:lstStyle>
           <a:p>
             <a:fld id="{D57F1E4F-1CFF-5643-939E-217C01CDF565}" type="slidenum">
-              <a:rPr lang="en-US" dirty="0"/>
+              <a:rPr lang="en-US"/>
               <a:pPr/>
               <a:t>‹#›</a:t>
             </a:fld>
-            <a:endParaRPr lang="en-US" dirty="0"/>
+            <a:endParaRPr lang="en-US"/>
           </a:p>
         </p:txBody>
       </p:sp>
@@ -7646,177 +8463,177 @@
           <a:lstStyle/>
           <a:p>
             <a:r>
-              <a:rPr lang="en-US" dirty="0" err="1"/>
+              <a:rPr lang="en-US" err="1"/>
               <a:t>Đề</a:t>
             </a:r>
             <a:r>
-              <a:rPr lang="en-US" dirty="0"/>
+              <a:rPr lang="en-US"/>
               <a:t> </a:t>
             </a:r>
             <a:r>
-              <a:rPr lang="en-US" dirty="0" err="1"/>
+              <a:rPr lang="en-US" err="1"/>
               <a:t>tài</a:t>
             </a:r>
             <a:r>
-              <a:rPr lang="en-US" dirty="0"/>
+              <a:rPr lang="en-US"/>
               <a:t> </a:t>
             </a:r>
             <a:r>
-              <a:rPr lang="en-US" dirty="0" err="1"/>
+              <a:rPr lang="en-US" err="1"/>
               <a:t>luận</a:t>
             </a:r>
             <a:r>
-              <a:rPr lang="en-US" dirty="0"/>
+              <a:rPr lang="en-US"/>
               <a:t> </a:t>
             </a:r>
             <a:r>
-              <a:rPr lang="en-US" dirty="0" err="1"/>
+              <a:rPr lang="en-US" err="1"/>
               <a:t>văn</a:t>
             </a:r>
             <a:r>
-              <a:rPr lang="en-US" dirty="0"/>
+              <a:rPr lang="en-US"/>
               <a:t> </a:t>
             </a:r>
             <a:r>
-              <a:rPr lang="en-US" dirty="0" err="1"/>
+              <a:rPr lang="en-US" err="1"/>
               <a:t>số</a:t>
             </a:r>
             <a:r>
-              <a:rPr lang="en-US" dirty="0"/>
+              <a:rPr lang="en-US"/>
               <a:t> 31</a:t>
             </a:r>
             <a:r>
-              <a:rPr lang="en-US" dirty="0" smtClean="0"/>
+              <a:rPr lang="en-US" smtClean="0"/>
               <a:t>:</a:t>
             </a:r>
             <a:br>
-              <a:rPr lang="en-US" dirty="0" smtClean="0"/>
+              <a:rPr lang="en-US" smtClean="0"/>
             </a:br>
             <a:r>
-              <a:rPr lang="en-US" dirty="0" smtClean="0"/>
+              <a:rPr lang="en-US" smtClean="0"/>
               <a:t>	</a:t>
             </a:r>
             <a:r>
-              <a:rPr lang="en-US" sz="4400" dirty="0" err="1" smtClean="0"/>
+              <a:rPr lang="en-US" sz="4400" err="1" smtClean="0"/>
               <a:t>Xây</a:t>
             </a:r>
             <a:r>
-              <a:rPr lang="en-US" sz="4400" dirty="0" smtClean="0"/>
+              <a:rPr lang="en-US" sz="4400" smtClean="0"/>
               <a:t> </a:t>
             </a:r>
             <a:r>
-              <a:rPr lang="en-US" sz="4400" dirty="0" err="1"/>
+              <a:rPr lang="en-US" sz="4400" err="1"/>
               <a:t>dựng</a:t>
             </a:r>
             <a:r>
-              <a:rPr lang="en-US" sz="4400" dirty="0"/>
+              <a:rPr lang="en-US" sz="4400"/>
               <a:t> </a:t>
             </a:r>
             <a:r>
-              <a:rPr lang="en-US" sz="4400" dirty="0" err="1"/>
+              <a:rPr lang="en-US" sz="4400" err="1"/>
               <a:t>hệ</a:t>
             </a:r>
             <a:r>
-              <a:rPr lang="en-US" sz="4400" dirty="0"/>
+              <a:rPr lang="en-US" sz="4400"/>
               <a:t> </a:t>
             </a:r>
             <a:r>
-              <a:rPr lang="en-US" sz="4400" dirty="0" err="1"/>
+              <a:rPr lang="en-US" sz="4400" err="1"/>
               <a:t>thống</a:t>
             </a:r>
             <a:r>
-              <a:rPr lang="en-US" sz="4400" dirty="0"/>
+              <a:rPr lang="en-US" sz="4400"/>
               <a:t> </a:t>
             </a:r>
             <a:r>
-              <a:rPr lang="en-US" sz="4400" dirty="0" err="1"/>
+              <a:rPr lang="en-US" sz="4400" err="1"/>
               <a:t>quản</a:t>
             </a:r>
             <a:r>
-              <a:rPr lang="en-US" sz="4400" dirty="0"/>
+              <a:rPr lang="en-US" sz="4400"/>
               <a:t> </a:t>
             </a:r>
             <a:r>
-              <a:rPr lang="en-US" sz="4400" dirty="0" err="1"/>
+              <a:rPr lang="en-US" sz="4400" err="1"/>
               <a:t>lý</a:t>
             </a:r>
             <a:r>
-              <a:rPr lang="en-US" sz="4400" dirty="0"/>
+              <a:rPr lang="en-US" sz="4400"/>
               <a:t> </a:t>
             </a:r>
             <a:r>
-              <a:rPr lang="en-US" sz="4400" dirty="0" err="1"/>
+              <a:rPr lang="en-US" sz="4400" err="1"/>
               <a:t>thông</a:t>
             </a:r>
             <a:r>
-              <a:rPr lang="en-US" sz="4400" dirty="0"/>
+              <a:rPr lang="en-US" sz="4400"/>
               <a:t> tin </a:t>
             </a:r>
             <a:r>
-              <a:rPr lang="en-US" sz="4400" dirty="0" err="1" smtClean="0"/>
+              <a:rPr lang="en-US" sz="4400" err="1" smtClean="0"/>
               <a:t>bán</a:t>
             </a:r>
             <a:r>
-              <a:rPr lang="en-US" sz="4400" dirty="0" smtClean="0"/>
+              <a:rPr lang="en-US" sz="4400" smtClean="0"/>
               <a:t> </a:t>
             </a:r>
             <a:r>
-              <a:rPr lang="en-US" sz="4400" dirty="0" err="1"/>
+              <a:rPr lang="en-US" sz="4400" err="1"/>
               <a:t>hàng</a:t>
             </a:r>
             <a:r>
-              <a:rPr lang="en-US" sz="4400" dirty="0"/>
+              <a:rPr lang="en-US" sz="4400"/>
               <a:t> </a:t>
             </a:r>
             <a:r>
-              <a:rPr lang="en-US" sz="4400" dirty="0" err="1"/>
+              <a:rPr lang="en-US" sz="4400" err="1"/>
               <a:t>cho</a:t>
             </a:r>
             <a:r>
-              <a:rPr lang="en-US" sz="4400" dirty="0"/>
+              <a:rPr lang="en-US" sz="4400"/>
               <a:t> </a:t>
             </a:r>
             <a:r>
-              <a:rPr lang="en-US" sz="4400" dirty="0" err="1"/>
+              <a:rPr lang="en-US" sz="4400" err="1"/>
               <a:t>doanh</a:t>
             </a:r>
             <a:r>
-              <a:rPr lang="en-US" sz="4400" dirty="0"/>
+              <a:rPr lang="en-US" sz="4400"/>
               <a:t> </a:t>
             </a:r>
             <a:r>
-              <a:rPr lang="en-US" sz="4400" dirty="0" err="1"/>
+              <a:rPr lang="en-US" sz="4400" err="1"/>
               <a:t>nghiệp</a:t>
             </a:r>
             <a:r>
-              <a:rPr lang="en-US" sz="4400" dirty="0"/>
+              <a:rPr lang="en-US" sz="4400"/>
               <a:t> </a:t>
             </a:r>
             <a:r>
-              <a:rPr lang="en-US" sz="4400" dirty="0" err="1"/>
+              <a:rPr lang="en-US" sz="4400" err="1"/>
               <a:t>sản</a:t>
             </a:r>
             <a:r>
-              <a:rPr lang="en-US" sz="4400" dirty="0"/>
+              <a:rPr lang="en-US" sz="4400"/>
               <a:t> </a:t>
             </a:r>
             <a:r>
-              <a:rPr lang="en-US" sz="4400" dirty="0" err="1"/>
+              <a:rPr lang="en-US" sz="4400" err="1"/>
               <a:t>xuất</a:t>
             </a:r>
             <a:r>
-              <a:rPr lang="en-US" sz="4400" dirty="0"/>
+              <a:rPr lang="en-US" sz="4400"/>
               <a:t> </a:t>
             </a:r>
             <a:r>
-              <a:rPr lang="en-US" sz="4400" dirty="0" err="1"/>
+              <a:rPr lang="en-US" sz="4400" err="1"/>
               <a:t>vải</a:t>
             </a:r>
             <a:r>
-              <a:rPr lang="en-US" sz="4400" dirty="0"/>
+              <a:rPr lang="en-US" sz="4400"/>
               <a:t>.</a:t>
             </a:r>
-            <a:endParaRPr lang="en-US" dirty="0"/>
+            <a:endParaRPr lang="en-US"/>
           </a:p>
         </p:txBody>
       </p:sp>
@@ -7843,193 +8660,193 @@
           <a:lstStyle/>
           <a:p>
             <a:r>
-              <a:rPr lang="en-US" dirty="0" smtClean="0"/>
+              <a:rPr lang="en-US" smtClean="0"/>
               <a:t>GVHD: </a:t>
             </a:r>
             <a:r>
-              <a:rPr lang="en-US" dirty="0" err="1" smtClean="0"/>
+              <a:rPr lang="en-US" err="1" smtClean="0"/>
               <a:t>ThS</a:t>
             </a:r>
             <a:r>
-              <a:rPr lang="en-US" dirty="0" smtClean="0"/>
+              <a:rPr lang="en-US" smtClean="0"/>
               <a:t> </a:t>
             </a:r>
             <a:r>
-              <a:rPr lang="en-US" dirty="0" err="1" smtClean="0"/>
+              <a:rPr lang="en-US" err="1" smtClean="0"/>
               <a:t>Nguyễn</a:t>
             </a:r>
             <a:r>
-              <a:rPr lang="en-US" dirty="0" smtClean="0"/>
+              <a:rPr lang="en-US" smtClean="0"/>
               <a:t> </a:t>
             </a:r>
             <a:r>
-              <a:rPr lang="en-US" dirty="0" err="1" smtClean="0"/>
+              <a:rPr lang="en-US" err="1" smtClean="0"/>
               <a:t>Thị</a:t>
             </a:r>
             <a:r>
-              <a:rPr lang="en-US" dirty="0" smtClean="0"/>
+              <a:rPr lang="en-US" smtClean="0"/>
               <a:t> </a:t>
             </a:r>
             <a:r>
-              <a:rPr lang="en-US" dirty="0" err="1" smtClean="0"/>
+              <a:rPr lang="en-US" err="1" smtClean="0"/>
               <a:t>Ái</a:t>
             </a:r>
             <a:r>
-              <a:rPr lang="en-US" dirty="0" smtClean="0"/>
+              <a:rPr lang="en-US" smtClean="0"/>
               <a:t> </a:t>
             </a:r>
             <a:r>
-              <a:rPr lang="en-US" dirty="0" err="1" smtClean="0"/>
+              <a:rPr lang="en-US" err="1" smtClean="0"/>
               <a:t>Thảo</a:t>
             </a:r>
-            <a:endParaRPr lang="en-US" dirty="0" smtClean="0"/>
-          </a:p>
-          <a:p>
-            <a:r>
-              <a:rPr lang="en-US" dirty="0" smtClean="0"/>
+            <a:endParaRPr lang="en-US" smtClean="0"/>
+          </a:p>
+          <a:p>
+            <a:r>
+              <a:rPr lang="en-US" smtClean="0"/>
               <a:t>GVPB: </a:t>
             </a:r>
             <a:r>
-              <a:rPr lang="en-US" dirty="0" err="1" smtClean="0"/>
+              <a:rPr lang="en-US" err="1" smtClean="0"/>
               <a:t>ThS</a:t>
             </a:r>
             <a:r>
-              <a:rPr lang="en-US" dirty="0" smtClean="0"/>
+              <a:rPr lang="en-US" smtClean="0"/>
               <a:t> </a:t>
             </a:r>
             <a:r>
-              <a:rPr lang="en-US" dirty="0" err="1" smtClean="0"/>
+              <a:rPr lang="en-US" err="1" smtClean="0"/>
               <a:t>Trần</a:t>
             </a:r>
             <a:r>
-              <a:rPr lang="en-US" dirty="0" smtClean="0"/>
+              <a:rPr lang="en-US" smtClean="0"/>
               <a:t> </a:t>
             </a:r>
             <a:r>
-              <a:rPr lang="en-US" dirty="0" err="1" smtClean="0"/>
+              <a:rPr lang="en-US" err="1" smtClean="0"/>
               <a:t>Thị</a:t>
             </a:r>
             <a:r>
-              <a:rPr lang="en-US" dirty="0" smtClean="0"/>
+              <a:rPr lang="en-US" smtClean="0"/>
               <a:t> </a:t>
             </a:r>
             <a:r>
-              <a:rPr lang="en-US" dirty="0" err="1" smtClean="0"/>
+              <a:rPr lang="en-US" err="1" smtClean="0"/>
               <a:t>Quế</a:t>
             </a:r>
             <a:r>
-              <a:rPr lang="en-US" dirty="0" smtClean="0"/>
+              <a:rPr lang="en-US" smtClean="0"/>
               <a:t> </a:t>
             </a:r>
             <a:r>
-              <a:rPr lang="en-US" dirty="0" err="1" smtClean="0"/>
+              <a:rPr lang="en-US" err="1" smtClean="0"/>
               <a:t>Nguyệt</a:t>
             </a:r>
-            <a:endParaRPr lang="en-US" dirty="0" smtClean="0"/>
-          </a:p>
-          <a:p>
-            <a:r>
-              <a:rPr lang="en-US" dirty="0" err="1" smtClean="0"/>
+            <a:endParaRPr lang="en-US" smtClean="0"/>
+          </a:p>
+          <a:p>
+            <a:r>
+              <a:rPr lang="en-US" err="1" smtClean="0"/>
               <a:t>Danh</a:t>
             </a:r>
             <a:r>
-              <a:rPr lang="en-US" dirty="0" smtClean="0"/>
+              <a:rPr lang="en-US" smtClean="0"/>
               <a:t> </a:t>
             </a:r>
             <a:r>
-              <a:rPr lang="en-US" dirty="0" err="1" smtClean="0"/>
+              <a:rPr lang="en-US" err="1" smtClean="0"/>
               <a:t>sách</a:t>
             </a:r>
             <a:r>
-              <a:rPr lang="en-US" dirty="0" smtClean="0"/>
+              <a:rPr lang="en-US" smtClean="0"/>
               <a:t> </a:t>
             </a:r>
             <a:r>
-              <a:rPr lang="en-US" dirty="0" err="1" smtClean="0"/>
+              <a:rPr lang="en-US" err="1" smtClean="0"/>
               <a:t>nhóm</a:t>
             </a:r>
             <a:r>
-              <a:rPr lang="en-US" dirty="0" smtClean="0"/>
+              <a:rPr lang="en-US" smtClean="0"/>
               <a:t> </a:t>
             </a:r>
             <a:r>
-              <a:rPr lang="en-US" dirty="0" err="1" smtClean="0"/>
+              <a:rPr lang="en-US" err="1" smtClean="0"/>
               <a:t>thực</a:t>
             </a:r>
             <a:r>
-              <a:rPr lang="en-US" dirty="0" smtClean="0"/>
+              <a:rPr lang="en-US" smtClean="0"/>
               <a:t> </a:t>
             </a:r>
             <a:r>
-              <a:rPr lang="en-US" dirty="0" err="1" smtClean="0"/>
+              <a:rPr lang="en-US" err="1" smtClean="0"/>
               <a:t>hiện</a:t>
             </a:r>
             <a:r>
-              <a:rPr lang="en-US" dirty="0" smtClean="0"/>
+              <a:rPr lang="en-US" smtClean="0"/>
               <a:t>:</a:t>
             </a:r>
           </a:p>
           <a:p>
             <a:r>
-              <a:rPr lang="en-US" dirty="0"/>
+              <a:rPr lang="en-US"/>
               <a:t>	</a:t>
             </a:r>
             <a:r>
-              <a:rPr lang="en-US" dirty="0" smtClean="0"/>
+              <a:rPr lang="en-US" smtClean="0"/>
               <a:t>- </a:t>
             </a:r>
             <a:r>
-              <a:rPr lang="en-US" dirty="0" err="1" smtClean="0"/>
+              <a:rPr lang="en-US" err="1" smtClean="0"/>
               <a:t>Vũ</a:t>
             </a:r>
             <a:r>
-              <a:rPr lang="en-US" dirty="0" smtClean="0"/>
+              <a:rPr lang="en-US" smtClean="0"/>
               <a:t> </a:t>
             </a:r>
             <a:r>
-              <a:rPr lang="en-US" dirty="0" err="1" smtClean="0"/>
+              <a:rPr lang="en-US" err="1" smtClean="0"/>
               <a:t>Duy</a:t>
             </a:r>
             <a:r>
-              <a:rPr lang="en-US" dirty="0" smtClean="0"/>
+              <a:rPr lang="en-US" smtClean="0"/>
               <a:t> </a:t>
             </a:r>
             <a:r>
-              <a:rPr lang="en-US" dirty="0" err="1" smtClean="0"/>
+              <a:rPr lang="en-US" err="1" smtClean="0"/>
               <a:t>Trúc</a:t>
             </a:r>
-            <a:endParaRPr lang="en-US" dirty="0" smtClean="0"/>
-          </a:p>
-          <a:p>
-            <a:r>
-              <a:rPr lang="en-US" dirty="0"/>
+            <a:endParaRPr lang="en-US" smtClean="0"/>
+          </a:p>
+          <a:p>
+            <a:r>
+              <a:rPr lang="en-US"/>
               <a:t>	</a:t>
             </a:r>
             <a:r>
-              <a:rPr lang="en-US" dirty="0" smtClean="0"/>
+              <a:rPr lang="en-US" smtClean="0"/>
               <a:t>- </a:t>
             </a:r>
             <a:r>
-              <a:rPr lang="en-US" dirty="0" err="1" smtClean="0"/>
+              <a:rPr lang="en-US" err="1" smtClean="0"/>
               <a:t>Lê</a:t>
             </a:r>
             <a:r>
-              <a:rPr lang="en-US" dirty="0" smtClean="0"/>
+              <a:rPr lang="en-US" smtClean="0"/>
               <a:t> </a:t>
             </a:r>
             <a:r>
-              <a:rPr lang="en-US" dirty="0" err="1" smtClean="0"/>
+              <a:rPr lang="en-US" err="1" smtClean="0"/>
               <a:t>Công</a:t>
             </a:r>
             <a:r>
-              <a:rPr lang="en-US" dirty="0" smtClean="0"/>
+              <a:rPr lang="en-US" smtClean="0"/>
               <a:t> </a:t>
             </a:r>
             <a:r>
-              <a:rPr lang="en-US" dirty="0" err="1" smtClean="0"/>
+              <a:rPr lang="en-US" err="1" smtClean="0"/>
               <a:t>Doãn</a:t>
             </a:r>
-            <a:endParaRPr lang="en-US" dirty="0"/>
+            <a:endParaRPr lang="en-US"/>
           </a:p>
         </p:txBody>
       </p:sp>
@@ -8065,15 +8882,32 @@
       </p:grpSpPr>
       <p:sp>
         <p:nvSpPr>
-          <p:cNvPr id="2" name="Title 1"/>
-          <p:cNvSpPr>
-            <a:spLocks noGrp="1"/>
-          </p:cNvSpPr>
-          <p:nvPr>
-            <p:ph type="title"/>
-          </p:nvPr>
-        </p:nvSpPr>
-        <p:spPr/>
+          <p:cNvPr id="4" name="Line 2"/>
+          <p:cNvSpPr>
+            <a:spLocks noChangeShapeType="1"/>
+          </p:cNvSpPr>
+          <p:nvPr/>
+        </p:nvSpPr>
+        <p:spPr bwMode="auto">
+          <a:xfrm flipV="1">
+            <a:off x="4558756" y="748938"/>
+            <a:ext cx="381000" cy="381000"/>
+          </a:xfrm>
+          <a:prstGeom prst="line">
+            <a:avLst/>
+          </a:prstGeom>
+          <a:noFill/>
+          <a:ln w="12700" cap="rnd">
+            <a:solidFill>
+              <a:srgbClr val="003366"/>
+            </a:solidFill>
+            <a:prstDash val="sysDot"/>
+            <a:round/>
+            <a:headEnd/>
+            <a:tailEnd/>
+          </a:ln>
+          <a:effectLst/>
+        </p:spPr>
         <p:txBody>
           <a:bodyPr/>
           <a:lstStyle/>
@@ -8084,20 +8918,1805 @@
       </p:sp>
       <p:sp>
         <p:nvSpPr>
-          <p:cNvPr id="3" name="Content Placeholder 2"/>
-          <p:cNvSpPr>
-            <a:spLocks noGrp="1"/>
-          </p:cNvSpPr>
-          <p:nvPr>
-            <p:ph idx="1"/>
-          </p:nvPr>
-        </p:nvSpPr>
-        <p:spPr/>
+          <p:cNvPr id="5" name="Line 3"/>
+          <p:cNvSpPr>
+            <a:spLocks noChangeShapeType="1"/>
+          </p:cNvSpPr>
+          <p:nvPr/>
+        </p:nvSpPr>
+        <p:spPr bwMode="auto">
+          <a:xfrm>
+            <a:off x="4482556" y="3415938"/>
+            <a:ext cx="457200" cy="304800"/>
+          </a:xfrm>
+          <a:prstGeom prst="line">
+            <a:avLst/>
+          </a:prstGeom>
+          <a:noFill/>
+          <a:ln w="12700" cap="rnd">
+            <a:solidFill>
+              <a:srgbClr val="003366"/>
+            </a:solidFill>
+            <a:prstDash val="sysDot"/>
+            <a:round/>
+            <a:headEnd/>
+            <a:tailEnd/>
+          </a:ln>
+          <a:effectLst/>
+        </p:spPr>
         <p:txBody>
           <a:bodyPr/>
           <a:lstStyle/>
           <a:p>
             <a:endParaRPr lang="en-US"/>
+          </a:p>
+        </p:txBody>
+      </p:sp>
+      <p:sp>
+        <p:nvSpPr>
+          <p:cNvPr id="6" name="Line 4"/>
+          <p:cNvSpPr>
+            <a:spLocks noChangeShapeType="1"/>
+          </p:cNvSpPr>
+          <p:nvPr/>
+        </p:nvSpPr>
+        <p:spPr bwMode="auto">
+          <a:xfrm>
+            <a:off x="4939756" y="748938"/>
+            <a:ext cx="609600" cy="0"/>
+          </a:xfrm>
+          <a:prstGeom prst="line">
+            <a:avLst/>
+          </a:prstGeom>
+          <a:noFill/>
+          <a:ln w="12700" cap="rnd">
+            <a:solidFill>
+              <a:srgbClr val="003366"/>
+            </a:solidFill>
+            <a:prstDash val="sysDot"/>
+            <a:round/>
+            <a:headEnd/>
+            <a:tailEnd/>
+          </a:ln>
+          <a:effectLst/>
+        </p:spPr>
+        <p:txBody>
+          <a:bodyPr/>
+          <a:lstStyle/>
+          <a:p>
+            <a:endParaRPr lang="en-US"/>
+          </a:p>
+        </p:txBody>
+      </p:sp>
+      <p:sp>
+        <p:nvSpPr>
+          <p:cNvPr id="7" name="Line 5"/>
+          <p:cNvSpPr>
+            <a:spLocks noChangeShapeType="1"/>
+          </p:cNvSpPr>
+          <p:nvPr/>
+        </p:nvSpPr>
+        <p:spPr bwMode="auto">
+          <a:xfrm>
+            <a:off x="4939756" y="3720738"/>
+            <a:ext cx="609600" cy="0"/>
+          </a:xfrm>
+          <a:prstGeom prst="line">
+            <a:avLst/>
+          </a:prstGeom>
+          <a:noFill/>
+          <a:ln w="12700" cap="rnd">
+            <a:solidFill>
+              <a:srgbClr val="003366"/>
+            </a:solidFill>
+            <a:prstDash val="sysDot"/>
+            <a:round/>
+            <a:headEnd/>
+            <a:tailEnd/>
+          </a:ln>
+          <a:effectLst/>
+        </p:spPr>
+        <p:txBody>
+          <a:bodyPr/>
+          <a:lstStyle/>
+          <a:p>
+            <a:endParaRPr lang="en-US"/>
+          </a:p>
+        </p:txBody>
+      </p:sp>
+      <p:sp>
+        <p:nvSpPr>
+          <p:cNvPr id="8" name="Line 6"/>
+          <p:cNvSpPr>
+            <a:spLocks noChangeShapeType="1"/>
+          </p:cNvSpPr>
+          <p:nvPr/>
+        </p:nvSpPr>
+        <p:spPr bwMode="auto">
+          <a:xfrm flipV="1">
+            <a:off x="4863556" y="1510938"/>
+            <a:ext cx="685800" cy="0"/>
+          </a:xfrm>
+          <a:prstGeom prst="line">
+            <a:avLst/>
+          </a:prstGeom>
+          <a:noFill/>
+          <a:ln w="12700" cap="rnd">
+            <a:solidFill>
+              <a:srgbClr val="003366"/>
+            </a:solidFill>
+            <a:prstDash val="sysDot"/>
+            <a:round/>
+            <a:headEnd/>
+            <a:tailEnd/>
+          </a:ln>
+          <a:effectLst/>
+        </p:spPr>
+        <p:txBody>
+          <a:bodyPr/>
+          <a:lstStyle/>
+          <a:p>
+            <a:endParaRPr lang="en-US"/>
+          </a:p>
+        </p:txBody>
+      </p:sp>
+      <p:sp>
+        <p:nvSpPr>
+          <p:cNvPr id="9" name="Line 7"/>
+          <p:cNvSpPr>
+            <a:spLocks noChangeShapeType="1"/>
+          </p:cNvSpPr>
+          <p:nvPr/>
+        </p:nvSpPr>
+        <p:spPr bwMode="auto">
+          <a:xfrm>
+            <a:off x="4939756" y="2272938"/>
+            <a:ext cx="609600" cy="0"/>
+          </a:xfrm>
+          <a:prstGeom prst="line">
+            <a:avLst/>
+          </a:prstGeom>
+          <a:noFill/>
+          <a:ln w="12700" cap="rnd">
+            <a:solidFill>
+              <a:srgbClr val="003366"/>
+            </a:solidFill>
+            <a:prstDash val="sysDot"/>
+            <a:round/>
+            <a:headEnd/>
+            <a:tailEnd/>
+          </a:ln>
+          <a:effectLst/>
+        </p:spPr>
+        <p:txBody>
+          <a:bodyPr/>
+          <a:lstStyle/>
+          <a:p>
+            <a:endParaRPr lang="en-US"/>
+          </a:p>
+        </p:txBody>
+      </p:sp>
+      <p:sp>
+        <p:nvSpPr>
+          <p:cNvPr id="10" name="Line 8"/>
+          <p:cNvSpPr>
+            <a:spLocks noChangeShapeType="1"/>
+          </p:cNvSpPr>
+          <p:nvPr/>
+        </p:nvSpPr>
+        <p:spPr bwMode="auto">
+          <a:xfrm flipV="1">
+            <a:off x="4863556" y="2958738"/>
+            <a:ext cx="685800" cy="0"/>
+          </a:xfrm>
+          <a:prstGeom prst="line">
+            <a:avLst/>
+          </a:prstGeom>
+          <a:noFill/>
+          <a:ln w="12700" cap="rnd">
+            <a:solidFill>
+              <a:srgbClr val="003366"/>
+            </a:solidFill>
+            <a:prstDash val="sysDot"/>
+            <a:round/>
+            <a:headEnd/>
+            <a:tailEnd/>
+          </a:ln>
+          <a:effectLst/>
+        </p:spPr>
+        <p:txBody>
+          <a:bodyPr/>
+          <a:lstStyle/>
+          <a:p>
+            <a:endParaRPr lang="en-US"/>
+          </a:p>
+        </p:txBody>
+      </p:sp>
+      <p:sp>
+        <p:nvSpPr>
+          <p:cNvPr id="11" name="AutoShape 20"/>
+          <p:cNvSpPr>
+            <a:spLocks noChangeArrowheads="1"/>
+          </p:cNvSpPr>
+          <p:nvPr/>
+        </p:nvSpPr>
+        <p:spPr bwMode="gray">
+          <a:xfrm>
+            <a:off x="5543006" y="520338"/>
+            <a:ext cx="5105400" cy="488950"/>
+          </a:xfrm>
+          <a:prstGeom prst="roundRect">
+            <a:avLst>
+              <a:gd name="adj" fmla="val 50000"/>
+            </a:avLst>
+          </a:prstGeom>
+          <a:gradFill rotWithShape="1">
+            <a:gsLst>
+              <a:gs pos="0">
+                <a:srgbClr val="F8F8F8"/>
+              </a:gs>
+              <a:gs pos="100000">
+                <a:srgbClr val="F8F8F8">
+                  <a:gamma/>
+                  <a:shade val="76471"/>
+                  <a:invGamma/>
+                </a:srgbClr>
+              </a:gs>
+            </a:gsLst>
+            <a:lin ang="5400000" scaled="1"/>
+          </a:gradFill>
+          <a:ln w="19050">
+            <a:solidFill>
+              <a:srgbClr val="C0C0C0"/>
+            </a:solidFill>
+            <a:round/>
+            <a:headEnd/>
+            <a:tailEnd/>
+          </a:ln>
+          <a:effectLst>
+            <a:outerShdw dist="53882" dir="2700000" algn="ctr" rotWithShape="0">
+              <a:srgbClr val="292929">
+                <a:alpha val="50000"/>
+              </a:srgbClr>
+            </a:outerShdw>
+          </a:effectLst>
+        </p:spPr>
+        <p:txBody>
+          <a:bodyPr wrap="none" anchor="ctr"/>
+          <a:lstStyle/>
+          <a:p>
+            <a:endParaRPr lang="en-US"/>
+          </a:p>
+        </p:txBody>
+      </p:sp>
+      <p:sp>
+        <p:nvSpPr>
+          <p:cNvPr id="12" name="Rectangle 21"/>
+          <p:cNvSpPr>
+            <a:spLocks noChangeArrowheads="1"/>
+          </p:cNvSpPr>
+          <p:nvPr/>
+        </p:nvSpPr>
+        <p:spPr bwMode="auto">
+          <a:xfrm>
+            <a:off x="6946356" y="596538"/>
+            <a:ext cx="1810111" cy="369332"/>
+          </a:xfrm>
+          <a:prstGeom prst="rect">
+            <a:avLst/>
+          </a:prstGeom>
+          <a:noFill/>
+          <a:ln w="9525">
+            <a:noFill/>
+            <a:miter lim="800000"/>
+            <a:headEnd/>
+            <a:tailEnd/>
+          </a:ln>
+          <a:effectLst/>
+        </p:spPr>
+        <p:txBody>
+          <a:bodyPr wrap="none">
+            <a:spAutoFit/>
+          </a:bodyPr>
+          <a:lstStyle/>
+          <a:p>
+            <a:r>
+              <a:rPr lang="en-US" err="1"/>
+              <a:t>Giới</a:t>
+            </a:r>
+            <a:r>
+              <a:rPr lang="en-US"/>
+              <a:t> </a:t>
+            </a:r>
+            <a:r>
+              <a:rPr lang="en-US" err="1"/>
+              <a:t>thiệu</a:t>
+            </a:r>
+            <a:r>
+              <a:rPr lang="en-US"/>
+              <a:t> </a:t>
+            </a:r>
+            <a:r>
+              <a:rPr lang="en-US" err="1"/>
+              <a:t>đề</a:t>
+            </a:r>
+            <a:r>
+              <a:rPr lang="en-US"/>
+              <a:t> </a:t>
+            </a:r>
+            <a:r>
+              <a:rPr lang="en-US" err="1"/>
+              <a:t>tài</a:t>
+            </a:r>
+            <a:endParaRPr lang="en-US"/>
+          </a:p>
+        </p:txBody>
+      </p:sp>
+      <p:sp>
+        <p:nvSpPr>
+          <p:cNvPr id="13" name="AutoShape 22"/>
+          <p:cNvSpPr>
+            <a:spLocks noChangeArrowheads="1"/>
+          </p:cNvSpPr>
+          <p:nvPr/>
+        </p:nvSpPr>
+        <p:spPr bwMode="gray">
+          <a:xfrm>
+            <a:off x="5543006" y="1269638"/>
+            <a:ext cx="5105400" cy="488950"/>
+          </a:xfrm>
+          <a:prstGeom prst="roundRect">
+            <a:avLst>
+              <a:gd name="adj" fmla="val 50000"/>
+            </a:avLst>
+          </a:prstGeom>
+          <a:gradFill rotWithShape="1">
+            <a:gsLst>
+              <a:gs pos="0">
+                <a:srgbClr val="F8F8F8"/>
+              </a:gs>
+              <a:gs pos="100000">
+                <a:srgbClr val="F8F8F8">
+                  <a:gamma/>
+                  <a:shade val="76471"/>
+                  <a:invGamma/>
+                </a:srgbClr>
+              </a:gs>
+            </a:gsLst>
+            <a:lin ang="5400000" scaled="1"/>
+          </a:gradFill>
+          <a:ln w="19050">
+            <a:solidFill>
+              <a:srgbClr val="C0C0C0"/>
+            </a:solidFill>
+            <a:round/>
+            <a:headEnd/>
+            <a:tailEnd/>
+          </a:ln>
+          <a:effectLst>
+            <a:outerShdw dist="53882" dir="2700000" algn="ctr" rotWithShape="0">
+              <a:srgbClr val="292929">
+                <a:alpha val="50000"/>
+              </a:srgbClr>
+            </a:outerShdw>
+          </a:effectLst>
+        </p:spPr>
+        <p:txBody>
+          <a:bodyPr wrap="none" anchor="ctr"/>
+          <a:lstStyle/>
+          <a:p>
+            <a:endParaRPr lang="en-US"/>
+          </a:p>
+        </p:txBody>
+      </p:sp>
+      <p:sp>
+        <p:nvSpPr>
+          <p:cNvPr id="14" name="Rectangle 23"/>
+          <p:cNvSpPr>
+            <a:spLocks noChangeArrowheads="1"/>
+          </p:cNvSpPr>
+          <p:nvPr/>
+        </p:nvSpPr>
+        <p:spPr bwMode="auto">
+          <a:xfrm>
+            <a:off x="6946356" y="1345838"/>
+            <a:ext cx="1838965" cy="369332"/>
+          </a:xfrm>
+          <a:prstGeom prst="rect">
+            <a:avLst/>
+          </a:prstGeom>
+          <a:noFill/>
+          <a:ln w="9525">
+            <a:noFill/>
+            <a:miter lim="800000"/>
+            <a:headEnd/>
+            <a:tailEnd/>
+          </a:ln>
+          <a:effectLst/>
+        </p:spPr>
+        <p:txBody>
+          <a:bodyPr wrap="none">
+            <a:spAutoFit/>
+          </a:bodyPr>
+          <a:lstStyle/>
+          <a:p>
+            <a:r>
+              <a:rPr lang="en-US" err="1" smtClean="0"/>
+              <a:t>Mô</a:t>
+            </a:r>
+            <a:r>
+              <a:rPr lang="en-US" smtClean="0"/>
+              <a:t> </a:t>
+            </a:r>
+            <a:r>
+              <a:rPr lang="en-US" err="1" smtClean="0"/>
+              <a:t>tả</a:t>
+            </a:r>
+            <a:r>
+              <a:rPr lang="en-US" smtClean="0"/>
+              <a:t> </a:t>
+            </a:r>
+            <a:r>
+              <a:rPr lang="en-US" err="1" smtClean="0"/>
+              <a:t>nghiệp</a:t>
+            </a:r>
+            <a:r>
+              <a:rPr lang="en-US" smtClean="0"/>
+              <a:t> </a:t>
+            </a:r>
+            <a:r>
+              <a:rPr lang="en-US" err="1" smtClean="0"/>
+              <a:t>vụ</a:t>
+            </a:r>
+            <a:endParaRPr lang="en-US"/>
+          </a:p>
+        </p:txBody>
+      </p:sp>
+      <p:sp>
+        <p:nvSpPr>
+          <p:cNvPr id="15" name="AutoShape 24"/>
+          <p:cNvSpPr>
+            <a:spLocks noChangeArrowheads="1"/>
+          </p:cNvSpPr>
+          <p:nvPr/>
+        </p:nvSpPr>
+        <p:spPr bwMode="gray">
+          <a:xfrm>
+            <a:off x="5539831" y="2012588"/>
+            <a:ext cx="5105400" cy="488950"/>
+          </a:xfrm>
+          <a:prstGeom prst="roundRect">
+            <a:avLst>
+              <a:gd name="adj" fmla="val 50000"/>
+            </a:avLst>
+          </a:prstGeom>
+          <a:gradFill rotWithShape="1">
+            <a:gsLst>
+              <a:gs pos="0">
+                <a:srgbClr val="F8F8F8"/>
+              </a:gs>
+              <a:gs pos="100000">
+                <a:srgbClr val="F8F8F8">
+                  <a:gamma/>
+                  <a:shade val="76471"/>
+                  <a:invGamma/>
+                </a:srgbClr>
+              </a:gs>
+            </a:gsLst>
+            <a:lin ang="5400000" scaled="1"/>
+          </a:gradFill>
+          <a:ln w="19050">
+            <a:solidFill>
+              <a:srgbClr val="C0C0C0"/>
+            </a:solidFill>
+            <a:round/>
+            <a:headEnd/>
+            <a:tailEnd/>
+          </a:ln>
+          <a:effectLst>
+            <a:outerShdw dist="53882" dir="2700000" algn="ctr" rotWithShape="0">
+              <a:srgbClr val="292929">
+                <a:alpha val="50000"/>
+              </a:srgbClr>
+            </a:outerShdw>
+          </a:effectLst>
+        </p:spPr>
+        <p:txBody>
+          <a:bodyPr wrap="none" anchor="ctr"/>
+          <a:lstStyle/>
+          <a:p>
+            <a:endParaRPr lang="en-US"/>
+          </a:p>
+        </p:txBody>
+      </p:sp>
+      <p:sp>
+        <p:nvSpPr>
+          <p:cNvPr id="16" name="Rectangle 25"/>
+          <p:cNvSpPr>
+            <a:spLocks noChangeArrowheads="1"/>
+          </p:cNvSpPr>
+          <p:nvPr/>
+        </p:nvSpPr>
+        <p:spPr bwMode="auto">
+          <a:xfrm>
+            <a:off x="6943181" y="2088788"/>
+            <a:ext cx="2031325" cy="369332"/>
+          </a:xfrm>
+          <a:prstGeom prst="rect">
+            <a:avLst/>
+          </a:prstGeom>
+          <a:noFill/>
+          <a:ln w="9525">
+            <a:noFill/>
+            <a:miter lim="800000"/>
+            <a:headEnd/>
+            <a:tailEnd/>
+          </a:ln>
+          <a:effectLst/>
+        </p:spPr>
+        <p:txBody>
+          <a:bodyPr wrap="none">
+            <a:spAutoFit/>
+          </a:bodyPr>
+          <a:lstStyle/>
+          <a:p>
+            <a:pPr eaLnBrk="0" hangingPunct="0"/>
+            <a:r>
+              <a:rPr lang="en-US" err="1" smtClean="0"/>
+              <a:t>Phân</a:t>
+            </a:r>
+            <a:r>
+              <a:rPr lang="en-US" smtClean="0"/>
+              <a:t> </a:t>
+            </a:r>
+            <a:r>
+              <a:rPr lang="en-US" err="1" smtClean="0"/>
+              <a:t>tích</a:t>
+            </a:r>
+            <a:r>
+              <a:rPr lang="en-US" smtClean="0"/>
+              <a:t> </a:t>
+            </a:r>
+            <a:r>
+              <a:rPr lang="en-US" err="1" smtClean="0"/>
+              <a:t>yêu</a:t>
+            </a:r>
+            <a:r>
+              <a:rPr lang="en-US" smtClean="0"/>
+              <a:t> </a:t>
+            </a:r>
+            <a:r>
+              <a:rPr lang="en-US" err="1" smtClean="0"/>
+              <a:t>cầu</a:t>
+            </a:r>
+            <a:endParaRPr lang="en-US">
+              <a:solidFill>
+                <a:srgbClr val="000000"/>
+              </a:solidFill>
+            </a:endParaRPr>
+          </a:p>
+        </p:txBody>
+      </p:sp>
+      <p:sp>
+        <p:nvSpPr>
+          <p:cNvPr id="17" name="Oval 26"/>
+          <p:cNvSpPr>
+            <a:spLocks noChangeArrowheads="1"/>
+          </p:cNvSpPr>
+          <p:nvPr/>
+        </p:nvSpPr>
+        <p:spPr bwMode="gray">
+          <a:xfrm>
+            <a:off x="5454106" y="637813"/>
+            <a:ext cx="228600" cy="228600"/>
+          </a:xfrm>
+          <a:prstGeom prst="ellipse">
+            <a:avLst/>
+          </a:prstGeom>
+          <a:gradFill rotWithShape="1">
+            <a:gsLst>
+              <a:gs pos="0">
+                <a:srgbClr val="E96E29"/>
+              </a:gs>
+              <a:gs pos="100000">
+                <a:srgbClr val="E96E29">
+                  <a:gamma/>
+                  <a:shade val="66667"/>
+                  <a:invGamma/>
+                </a:srgbClr>
+              </a:gs>
+            </a:gsLst>
+            <a:path path="shape">
+              <a:fillToRect l="50000" t="50000" r="50000" b="50000"/>
+            </a:path>
+          </a:gradFill>
+          <a:ln w="19050">
+            <a:solidFill>
+              <a:srgbClr val="FFFFFF"/>
+            </a:solidFill>
+            <a:round/>
+            <a:headEnd/>
+            <a:tailEnd/>
+          </a:ln>
+          <a:effectLst>
+            <a:outerShdw dist="63500" dir="2212194" algn="ctr" rotWithShape="0">
+              <a:schemeClr val="bg2">
+                <a:alpha val="50000"/>
+              </a:schemeClr>
+            </a:outerShdw>
+          </a:effectLst>
+        </p:spPr>
+        <p:txBody>
+          <a:bodyPr wrap="none" anchor="ctr"/>
+          <a:lstStyle/>
+          <a:p>
+            <a:endParaRPr lang="en-US"/>
+          </a:p>
+        </p:txBody>
+      </p:sp>
+      <p:sp>
+        <p:nvSpPr>
+          <p:cNvPr id="18" name="Oval 27"/>
+          <p:cNvSpPr>
+            <a:spLocks noChangeArrowheads="1"/>
+          </p:cNvSpPr>
+          <p:nvPr/>
+        </p:nvSpPr>
+        <p:spPr bwMode="gray">
+          <a:xfrm>
+            <a:off x="5466806" y="1402988"/>
+            <a:ext cx="228600" cy="228600"/>
+          </a:xfrm>
+          <a:prstGeom prst="ellipse">
+            <a:avLst/>
+          </a:prstGeom>
+          <a:gradFill rotWithShape="1">
+            <a:gsLst>
+              <a:gs pos="0">
+                <a:srgbClr val="DCDC48"/>
+              </a:gs>
+              <a:gs pos="100000">
+                <a:srgbClr val="DCDC48">
+                  <a:gamma/>
+                  <a:shade val="66667"/>
+                  <a:invGamma/>
+                </a:srgbClr>
+              </a:gs>
+            </a:gsLst>
+            <a:path path="shape">
+              <a:fillToRect l="50000" t="50000" r="50000" b="50000"/>
+            </a:path>
+          </a:gradFill>
+          <a:ln w="19050">
+            <a:solidFill>
+              <a:srgbClr val="FFFFFF"/>
+            </a:solidFill>
+            <a:round/>
+            <a:headEnd/>
+            <a:tailEnd/>
+          </a:ln>
+          <a:effectLst>
+            <a:outerShdw dist="63500" dir="2212194" algn="ctr" rotWithShape="0">
+              <a:schemeClr val="bg2">
+                <a:alpha val="50000"/>
+              </a:schemeClr>
+            </a:outerShdw>
+          </a:effectLst>
+        </p:spPr>
+        <p:txBody>
+          <a:bodyPr wrap="none" anchor="ctr"/>
+          <a:lstStyle/>
+          <a:p>
+            <a:endParaRPr lang="en-US"/>
+          </a:p>
+        </p:txBody>
+      </p:sp>
+      <p:sp>
+        <p:nvSpPr>
+          <p:cNvPr id="19" name="Oval 28"/>
+          <p:cNvSpPr>
+            <a:spLocks noChangeArrowheads="1"/>
+          </p:cNvSpPr>
+          <p:nvPr/>
+        </p:nvSpPr>
+        <p:spPr bwMode="gray">
+          <a:xfrm>
+            <a:off x="5466806" y="2158638"/>
+            <a:ext cx="228600" cy="228600"/>
+          </a:xfrm>
+          <a:prstGeom prst="ellipse">
+            <a:avLst/>
+          </a:prstGeom>
+          <a:gradFill rotWithShape="1">
+            <a:gsLst>
+              <a:gs pos="0">
+                <a:schemeClr val="accent2"/>
+              </a:gs>
+              <a:gs pos="100000">
+                <a:schemeClr val="accent2">
+                  <a:gamma/>
+                  <a:shade val="66667"/>
+                  <a:invGamma/>
+                </a:schemeClr>
+              </a:gs>
+            </a:gsLst>
+            <a:path path="shape">
+              <a:fillToRect l="50000" t="50000" r="50000" b="50000"/>
+            </a:path>
+          </a:gradFill>
+          <a:ln w="19050">
+            <a:solidFill>
+              <a:srgbClr val="FFFFFF"/>
+            </a:solidFill>
+            <a:round/>
+            <a:headEnd/>
+            <a:tailEnd/>
+          </a:ln>
+          <a:effectLst>
+            <a:outerShdw dist="63500" dir="2212194" algn="ctr" rotWithShape="0">
+              <a:schemeClr val="bg2">
+                <a:alpha val="50000"/>
+              </a:schemeClr>
+            </a:outerShdw>
+          </a:effectLst>
+        </p:spPr>
+        <p:txBody>
+          <a:bodyPr wrap="none" anchor="ctr"/>
+          <a:lstStyle/>
+          <a:p>
+            <a:endParaRPr lang="en-US"/>
+          </a:p>
+        </p:txBody>
+      </p:sp>
+      <p:sp>
+        <p:nvSpPr>
+          <p:cNvPr id="20" name="AutoShape 29"/>
+          <p:cNvSpPr>
+            <a:spLocks noChangeArrowheads="1"/>
+          </p:cNvSpPr>
+          <p:nvPr/>
+        </p:nvSpPr>
+        <p:spPr bwMode="gray">
+          <a:xfrm>
+            <a:off x="5543006" y="2744426"/>
+            <a:ext cx="5105400" cy="488950"/>
+          </a:xfrm>
+          <a:prstGeom prst="roundRect">
+            <a:avLst>
+              <a:gd name="adj" fmla="val 50000"/>
+            </a:avLst>
+          </a:prstGeom>
+          <a:gradFill rotWithShape="1">
+            <a:gsLst>
+              <a:gs pos="0">
+                <a:srgbClr val="F8F8F8"/>
+              </a:gs>
+              <a:gs pos="100000">
+                <a:srgbClr val="F8F8F8">
+                  <a:gamma/>
+                  <a:shade val="76471"/>
+                  <a:invGamma/>
+                </a:srgbClr>
+              </a:gs>
+            </a:gsLst>
+            <a:lin ang="5400000" scaled="1"/>
+          </a:gradFill>
+          <a:ln w="19050">
+            <a:solidFill>
+              <a:srgbClr val="C0C0C0"/>
+            </a:solidFill>
+            <a:round/>
+            <a:headEnd/>
+            <a:tailEnd/>
+          </a:ln>
+          <a:effectLst>
+            <a:outerShdw dist="53882" dir="2700000" algn="ctr" rotWithShape="0">
+              <a:srgbClr val="292929">
+                <a:alpha val="50000"/>
+              </a:srgbClr>
+            </a:outerShdw>
+          </a:effectLst>
+        </p:spPr>
+        <p:txBody>
+          <a:bodyPr wrap="none" anchor="ctr"/>
+          <a:lstStyle/>
+          <a:p>
+            <a:endParaRPr lang="en-US"/>
+          </a:p>
+        </p:txBody>
+      </p:sp>
+      <p:sp>
+        <p:nvSpPr>
+          <p:cNvPr id="21" name="Oval 31"/>
+          <p:cNvSpPr>
+            <a:spLocks noChangeArrowheads="1"/>
+          </p:cNvSpPr>
+          <p:nvPr/>
+        </p:nvSpPr>
+        <p:spPr bwMode="gray">
+          <a:xfrm>
+            <a:off x="5454106" y="2882538"/>
+            <a:ext cx="228600" cy="228600"/>
+          </a:xfrm>
+          <a:prstGeom prst="ellipse">
+            <a:avLst/>
+          </a:prstGeom>
+          <a:gradFill rotWithShape="1">
+            <a:gsLst>
+              <a:gs pos="0">
+                <a:srgbClr val="E96E29"/>
+              </a:gs>
+              <a:gs pos="100000">
+                <a:srgbClr val="E96E29">
+                  <a:gamma/>
+                  <a:shade val="66667"/>
+                  <a:invGamma/>
+                </a:srgbClr>
+              </a:gs>
+            </a:gsLst>
+            <a:path path="shape">
+              <a:fillToRect l="50000" t="50000" r="50000" b="50000"/>
+            </a:path>
+          </a:gradFill>
+          <a:ln w="19050">
+            <a:solidFill>
+              <a:srgbClr val="FFFFFF"/>
+            </a:solidFill>
+            <a:round/>
+            <a:headEnd/>
+            <a:tailEnd/>
+          </a:ln>
+          <a:effectLst>
+            <a:outerShdw dist="63500" dir="2212194" algn="ctr" rotWithShape="0">
+              <a:schemeClr val="bg2">
+                <a:alpha val="50000"/>
+              </a:schemeClr>
+            </a:outerShdw>
+          </a:effectLst>
+        </p:spPr>
+        <p:txBody>
+          <a:bodyPr wrap="none" anchor="ctr"/>
+          <a:lstStyle/>
+          <a:p>
+            <a:endParaRPr lang="en-US"/>
+          </a:p>
+        </p:txBody>
+      </p:sp>
+      <p:sp>
+        <p:nvSpPr>
+          <p:cNvPr id="22" name="AutoShape 32"/>
+          <p:cNvSpPr>
+            <a:spLocks noChangeArrowheads="1"/>
+          </p:cNvSpPr>
+          <p:nvPr/>
+        </p:nvSpPr>
+        <p:spPr bwMode="gray">
+          <a:xfrm>
+            <a:off x="5543006" y="3533413"/>
+            <a:ext cx="5105400" cy="488950"/>
+          </a:xfrm>
+          <a:prstGeom prst="roundRect">
+            <a:avLst>
+              <a:gd name="adj" fmla="val 50000"/>
+            </a:avLst>
+          </a:prstGeom>
+          <a:gradFill rotWithShape="1">
+            <a:gsLst>
+              <a:gs pos="0">
+                <a:srgbClr val="F8F8F8"/>
+              </a:gs>
+              <a:gs pos="100000">
+                <a:srgbClr val="F8F8F8">
+                  <a:gamma/>
+                  <a:shade val="76471"/>
+                  <a:invGamma/>
+                </a:srgbClr>
+              </a:gs>
+            </a:gsLst>
+            <a:lin ang="5400000" scaled="1"/>
+          </a:gradFill>
+          <a:ln w="19050">
+            <a:solidFill>
+              <a:srgbClr val="C0C0C0"/>
+            </a:solidFill>
+            <a:round/>
+            <a:headEnd/>
+            <a:tailEnd/>
+          </a:ln>
+          <a:effectLst>
+            <a:outerShdw dist="53882" dir="2700000" algn="ctr" rotWithShape="0">
+              <a:srgbClr val="292929">
+                <a:alpha val="50000"/>
+              </a:srgbClr>
+            </a:outerShdw>
+          </a:effectLst>
+        </p:spPr>
+        <p:txBody>
+          <a:bodyPr wrap="none" anchor="ctr"/>
+          <a:lstStyle/>
+          <a:p>
+            <a:endParaRPr lang="en-US"/>
+          </a:p>
+        </p:txBody>
+      </p:sp>
+      <p:sp>
+        <p:nvSpPr>
+          <p:cNvPr id="23" name="Rectangle 33"/>
+          <p:cNvSpPr>
+            <a:spLocks noChangeArrowheads="1"/>
+          </p:cNvSpPr>
+          <p:nvPr/>
+        </p:nvSpPr>
+        <p:spPr bwMode="auto">
+          <a:xfrm>
+            <a:off x="6946356" y="3609613"/>
+            <a:ext cx="2954655" cy="369332"/>
+          </a:xfrm>
+          <a:prstGeom prst="rect">
+            <a:avLst/>
+          </a:prstGeom>
+          <a:noFill/>
+          <a:ln w="9525">
+            <a:noFill/>
+            <a:miter lim="800000"/>
+            <a:headEnd/>
+            <a:tailEnd/>
+          </a:ln>
+          <a:effectLst/>
+        </p:spPr>
+        <p:txBody>
+          <a:bodyPr wrap="none">
+            <a:spAutoFit/>
+          </a:bodyPr>
+          <a:lstStyle/>
+          <a:p>
+            <a:pPr eaLnBrk="0" hangingPunct="0"/>
+            <a:r>
+              <a:rPr lang="en-US" smtClean="0">
+                <a:solidFill>
+                  <a:srgbClr val="000000"/>
+                </a:solidFill>
+              </a:rPr>
+              <a:t>Hiện thực hệ thống	</a:t>
+            </a:r>
+            <a:endParaRPr lang="en-US">
+              <a:solidFill>
+                <a:srgbClr val="000000"/>
+              </a:solidFill>
+            </a:endParaRPr>
+          </a:p>
+        </p:txBody>
+      </p:sp>
+      <p:sp>
+        <p:nvSpPr>
+          <p:cNvPr id="24" name="Oval 34"/>
+          <p:cNvSpPr>
+            <a:spLocks noChangeArrowheads="1"/>
+          </p:cNvSpPr>
+          <p:nvPr/>
+        </p:nvSpPr>
+        <p:spPr bwMode="gray">
+          <a:xfrm>
+            <a:off x="5466806" y="3666763"/>
+            <a:ext cx="228600" cy="228600"/>
+          </a:xfrm>
+          <a:prstGeom prst="ellipse">
+            <a:avLst/>
+          </a:prstGeom>
+          <a:solidFill>
+            <a:srgbClr val="FF0000"/>
+          </a:solidFill>
+          <a:ln w="19050">
+            <a:solidFill>
+              <a:srgbClr val="FFFFFF"/>
+            </a:solidFill>
+            <a:round/>
+            <a:headEnd/>
+            <a:tailEnd/>
+          </a:ln>
+          <a:effectLst>
+            <a:outerShdw dist="63500" dir="2212194" algn="ctr" rotWithShape="0">
+              <a:schemeClr val="bg2">
+                <a:alpha val="50000"/>
+              </a:schemeClr>
+            </a:outerShdw>
+          </a:effectLst>
+        </p:spPr>
+        <p:txBody>
+          <a:bodyPr wrap="none" anchor="ctr"/>
+          <a:lstStyle/>
+          <a:p>
+            <a:endParaRPr lang="en-US"/>
+          </a:p>
+        </p:txBody>
+      </p:sp>
+      <p:sp>
+        <p:nvSpPr>
+          <p:cNvPr id="25" name="Rectangle 33"/>
+          <p:cNvSpPr>
+            <a:spLocks noChangeArrowheads="1"/>
+          </p:cNvSpPr>
+          <p:nvPr/>
+        </p:nvSpPr>
+        <p:spPr bwMode="auto">
+          <a:xfrm>
+            <a:off x="6943181" y="2812172"/>
+            <a:ext cx="2123923" cy="369332"/>
+          </a:xfrm>
+          <a:prstGeom prst="rect">
+            <a:avLst/>
+          </a:prstGeom>
+          <a:noFill/>
+          <a:ln w="9525">
+            <a:noFill/>
+            <a:miter lim="800000"/>
+            <a:headEnd/>
+            <a:tailEnd/>
+          </a:ln>
+          <a:effectLst/>
+        </p:spPr>
+        <p:txBody>
+          <a:bodyPr wrap="square">
+            <a:spAutoFit/>
+          </a:bodyPr>
+          <a:lstStyle/>
+          <a:p>
+            <a:pPr eaLnBrk="0" hangingPunct="0"/>
+            <a:r>
+              <a:rPr lang="en-US" err="1"/>
+              <a:t>Thiết</a:t>
+            </a:r>
+            <a:r>
+              <a:rPr lang="en-US"/>
+              <a:t> </a:t>
+            </a:r>
+            <a:r>
+              <a:rPr lang="en-US" err="1"/>
+              <a:t>kế</a:t>
+            </a:r>
+            <a:r>
+              <a:rPr lang="en-US"/>
+              <a:t> </a:t>
+            </a:r>
+            <a:r>
+              <a:rPr lang="en-US" err="1"/>
+              <a:t>hệ</a:t>
+            </a:r>
+            <a:r>
+              <a:rPr lang="en-US"/>
+              <a:t> </a:t>
+            </a:r>
+            <a:r>
+              <a:rPr lang="en-US" err="1"/>
+              <a:t>thống</a:t>
+            </a:r>
+            <a:endParaRPr lang="en-US"/>
+          </a:p>
+        </p:txBody>
+      </p:sp>
+      <p:sp>
+        <p:nvSpPr>
+          <p:cNvPr id="26" name="Line 5"/>
+          <p:cNvSpPr>
+            <a:spLocks noChangeShapeType="1"/>
+          </p:cNvSpPr>
+          <p:nvPr/>
+        </p:nvSpPr>
+        <p:spPr bwMode="auto">
+          <a:xfrm>
+            <a:off x="5012647" y="4418389"/>
+            <a:ext cx="609600" cy="0"/>
+          </a:xfrm>
+          <a:prstGeom prst="line">
+            <a:avLst/>
+          </a:prstGeom>
+          <a:noFill/>
+          <a:ln w="12700" cap="rnd">
+            <a:solidFill>
+              <a:srgbClr val="003366"/>
+            </a:solidFill>
+            <a:prstDash val="sysDot"/>
+            <a:round/>
+            <a:headEnd/>
+            <a:tailEnd/>
+          </a:ln>
+          <a:effectLst/>
+        </p:spPr>
+        <p:txBody>
+          <a:bodyPr/>
+          <a:lstStyle/>
+          <a:p>
+            <a:endParaRPr lang="en-US"/>
+          </a:p>
+        </p:txBody>
+      </p:sp>
+      <p:sp>
+        <p:nvSpPr>
+          <p:cNvPr id="27" name="AutoShape 32"/>
+          <p:cNvSpPr>
+            <a:spLocks noChangeArrowheads="1"/>
+          </p:cNvSpPr>
+          <p:nvPr/>
+        </p:nvSpPr>
+        <p:spPr bwMode="gray">
+          <a:xfrm>
+            <a:off x="5615897" y="4231064"/>
+            <a:ext cx="5105400" cy="488950"/>
+          </a:xfrm>
+          <a:prstGeom prst="roundRect">
+            <a:avLst>
+              <a:gd name="adj" fmla="val 50000"/>
+            </a:avLst>
+          </a:prstGeom>
+          <a:gradFill rotWithShape="1">
+            <a:gsLst>
+              <a:gs pos="0">
+                <a:srgbClr val="F8F8F8"/>
+              </a:gs>
+              <a:gs pos="100000">
+                <a:srgbClr val="F8F8F8">
+                  <a:gamma/>
+                  <a:shade val="76471"/>
+                  <a:invGamma/>
+                </a:srgbClr>
+              </a:gs>
+            </a:gsLst>
+            <a:lin ang="5400000" scaled="1"/>
+          </a:gradFill>
+          <a:ln w="19050">
+            <a:solidFill>
+              <a:srgbClr val="C0C0C0"/>
+            </a:solidFill>
+            <a:round/>
+            <a:headEnd/>
+            <a:tailEnd/>
+          </a:ln>
+          <a:effectLst>
+            <a:outerShdw dist="53882" dir="2700000" algn="ctr" rotWithShape="0">
+              <a:srgbClr val="292929">
+                <a:alpha val="50000"/>
+              </a:srgbClr>
+            </a:outerShdw>
+          </a:effectLst>
+        </p:spPr>
+        <p:txBody>
+          <a:bodyPr wrap="none" anchor="ctr"/>
+          <a:lstStyle/>
+          <a:p>
+            <a:endParaRPr lang="en-US"/>
+          </a:p>
+        </p:txBody>
+      </p:sp>
+      <p:sp>
+        <p:nvSpPr>
+          <p:cNvPr id="28" name="Rectangle 33"/>
+          <p:cNvSpPr>
+            <a:spLocks noChangeArrowheads="1"/>
+          </p:cNvSpPr>
+          <p:nvPr/>
+        </p:nvSpPr>
+        <p:spPr bwMode="auto">
+          <a:xfrm>
+            <a:off x="6943181" y="4307264"/>
+            <a:ext cx="1158414" cy="369332"/>
+          </a:xfrm>
+          <a:prstGeom prst="rect">
+            <a:avLst/>
+          </a:prstGeom>
+          <a:noFill/>
+          <a:ln w="9525">
+            <a:noFill/>
+            <a:miter lim="800000"/>
+            <a:headEnd/>
+            <a:tailEnd/>
+          </a:ln>
+          <a:effectLst/>
+        </p:spPr>
+        <p:txBody>
+          <a:bodyPr wrap="square">
+            <a:spAutoFit/>
+          </a:bodyPr>
+          <a:lstStyle/>
+          <a:p>
+            <a:pPr eaLnBrk="0" hangingPunct="0"/>
+            <a:r>
+              <a:rPr lang="en-US" smtClean="0">
+                <a:solidFill>
+                  <a:srgbClr val="000000"/>
+                </a:solidFill>
+              </a:rPr>
+              <a:t>Demo</a:t>
+            </a:r>
+            <a:endParaRPr lang="en-US">
+              <a:solidFill>
+                <a:srgbClr val="000000"/>
+              </a:solidFill>
+            </a:endParaRPr>
+          </a:p>
+        </p:txBody>
+      </p:sp>
+      <p:sp>
+        <p:nvSpPr>
+          <p:cNvPr id="29" name="Oval 34"/>
+          <p:cNvSpPr>
+            <a:spLocks noChangeArrowheads="1"/>
+          </p:cNvSpPr>
+          <p:nvPr/>
+        </p:nvSpPr>
+        <p:spPr bwMode="gray">
+          <a:xfrm>
+            <a:off x="5539697" y="4364414"/>
+            <a:ext cx="228600" cy="228600"/>
+          </a:xfrm>
+          <a:prstGeom prst="ellipse">
+            <a:avLst/>
+          </a:prstGeom>
+          <a:solidFill>
+            <a:srgbClr val="00B0F0"/>
+          </a:solidFill>
+          <a:ln w="19050">
+            <a:solidFill>
+              <a:srgbClr val="FFFFFF"/>
+            </a:solidFill>
+            <a:round/>
+            <a:headEnd/>
+            <a:tailEnd/>
+          </a:ln>
+          <a:effectLst>
+            <a:outerShdw dist="63500" dir="2212194" algn="ctr" rotWithShape="0">
+              <a:schemeClr val="bg2">
+                <a:alpha val="50000"/>
+              </a:schemeClr>
+            </a:outerShdw>
+          </a:effectLst>
+        </p:spPr>
+        <p:txBody>
+          <a:bodyPr wrap="none" anchor="ctr"/>
+          <a:lstStyle/>
+          <a:p>
+            <a:endParaRPr lang="en-US"/>
+          </a:p>
+        </p:txBody>
+      </p:sp>
+      <p:sp>
+        <p:nvSpPr>
+          <p:cNvPr id="30" name="Line 3"/>
+          <p:cNvSpPr>
+            <a:spLocks noChangeShapeType="1"/>
+          </p:cNvSpPr>
+          <p:nvPr/>
+        </p:nvSpPr>
+        <p:spPr bwMode="auto">
+          <a:xfrm>
+            <a:off x="3942807" y="3558813"/>
+            <a:ext cx="1058862" cy="859576"/>
+          </a:xfrm>
+          <a:prstGeom prst="line">
+            <a:avLst/>
+          </a:prstGeom>
+          <a:noFill/>
+          <a:ln w="12700" cap="rnd">
+            <a:solidFill>
+              <a:srgbClr val="003366"/>
+            </a:solidFill>
+            <a:prstDash val="sysDot"/>
+            <a:round/>
+            <a:headEnd/>
+            <a:tailEnd/>
+          </a:ln>
+          <a:effectLst/>
+        </p:spPr>
+        <p:txBody>
+          <a:bodyPr/>
+          <a:lstStyle/>
+          <a:p>
+            <a:endParaRPr lang="en-US"/>
+          </a:p>
+        </p:txBody>
+      </p:sp>
+      <p:pic>
+        <p:nvPicPr>
+          <p:cNvPr id="41" name="Picture 40"/>
+          <p:cNvPicPr>
+            <a:picLocks noChangeAspect="1"/>
+          </p:cNvPicPr>
+          <p:nvPr/>
+        </p:nvPicPr>
+        <p:blipFill>
+          <a:blip r:embed="rId3"/>
+          <a:stretch>
+            <a:fillRect/>
+          </a:stretch>
+        </p:blipFill>
+        <p:spPr>
+          <a:xfrm>
+            <a:off x="2480639" y="935737"/>
+            <a:ext cx="2670279" cy="2670279"/>
+          </a:xfrm>
+          <a:prstGeom prst="rect">
+            <a:avLst/>
+          </a:prstGeom>
+        </p:spPr>
+      </p:pic>
+      <p:sp>
+        <p:nvSpPr>
+          <p:cNvPr id="31" name="Rectangle 21"/>
+          <p:cNvSpPr>
+            <a:spLocks noChangeArrowheads="1"/>
+          </p:cNvSpPr>
+          <p:nvPr/>
+        </p:nvSpPr>
+        <p:spPr bwMode="auto">
+          <a:xfrm>
+            <a:off x="2861837" y="1918311"/>
+            <a:ext cx="1868487" cy="584775"/>
+          </a:xfrm>
+          <a:prstGeom prst="rect">
+            <a:avLst/>
+          </a:prstGeom>
+          <a:noFill/>
+          <a:ln w="9525">
+            <a:noFill/>
+            <a:miter lim="800000"/>
+            <a:headEnd/>
+            <a:tailEnd/>
+          </a:ln>
+          <a:effectLst/>
+        </p:spPr>
+        <p:txBody>
+          <a:bodyPr wrap="square">
+            <a:spAutoFit/>
+          </a:bodyPr>
+          <a:lstStyle/>
+          <a:p>
+            <a:r>
+              <a:rPr lang="en-US" sz="3200" err="1"/>
+              <a:t>Nội</a:t>
+            </a:r>
+            <a:r>
+              <a:rPr lang="en-US" sz="3200"/>
+              <a:t> dung</a:t>
+            </a:r>
+          </a:p>
+        </p:txBody>
+      </p:sp>
+      <p:sp>
+        <p:nvSpPr>
+          <p:cNvPr id="42" name="AutoShape 32"/>
+          <p:cNvSpPr>
+            <a:spLocks noChangeArrowheads="1"/>
+          </p:cNvSpPr>
+          <p:nvPr/>
+        </p:nvSpPr>
+        <p:spPr bwMode="gray">
+          <a:xfrm>
+            <a:off x="5593222" y="4990766"/>
+            <a:ext cx="5105400" cy="488950"/>
+          </a:xfrm>
+          <a:prstGeom prst="roundRect">
+            <a:avLst>
+              <a:gd name="adj" fmla="val 50000"/>
+            </a:avLst>
+          </a:prstGeom>
+          <a:gradFill rotWithShape="1">
+            <a:gsLst>
+              <a:gs pos="0">
+                <a:srgbClr val="F8F8F8"/>
+              </a:gs>
+              <a:gs pos="100000">
+                <a:srgbClr val="F8F8F8">
+                  <a:gamma/>
+                  <a:shade val="76471"/>
+                  <a:invGamma/>
+                </a:srgbClr>
+              </a:gs>
+            </a:gsLst>
+            <a:lin ang="5400000" scaled="1"/>
+          </a:gradFill>
+          <a:ln w="19050">
+            <a:solidFill>
+              <a:srgbClr val="C0C0C0"/>
+            </a:solidFill>
+            <a:round/>
+            <a:headEnd/>
+            <a:tailEnd/>
+          </a:ln>
+          <a:effectLst>
+            <a:outerShdw dist="53882" dir="2700000" algn="ctr" rotWithShape="0">
+              <a:srgbClr val="292929">
+                <a:alpha val="50000"/>
+              </a:srgbClr>
+            </a:outerShdw>
+          </a:effectLst>
+        </p:spPr>
+        <p:txBody>
+          <a:bodyPr wrap="none" anchor="ctr"/>
+          <a:lstStyle/>
+          <a:p>
+            <a:endParaRPr lang="en-US"/>
+          </a:p>
+        </p:txBody>
+      </p:sp>
+      <p:sp>
+        <p:nvSpPr>
+          <p:cNvPr id="43" name="AutoShape 32"/>
+          <p:cNvSpPr>
+            <a:spLocks noChangeArrowheads="1"/>
+          </p:cNvSpPr>
+          <p:nvPr/>
+        </p:nvSpPr>
+        <p:spPr bwMode="gray">
+          <a:xfrm>
+            <a:off x="5615714" y="5750468"/>
+            <a:ext cx="5105400" cy="488950"/>
+          </a:xfrm>
+          <a:prstGeom prst="roundRect">
+            <a:avLst>
+              <a:gd name="adj" fmla="val 50000"/>
+            </a:avLst>
+          </a:prstGeom>
+          <a:gradFill rotWithShape="1">
+            <a:gsLst>
+              <a:gs pos="0">
+                <a:srgbClr val="F8F8F8"/>
+              </a:gs>
+              <a:gs pos="100000">
+                <a:srgbClr val="F8F8F8">
+                  <a:gamma/>
+                  <a:shade val="76471"/>
+                  <a:invGamma/>
+                </a:srgbClr>
+              </a:gs>
+            </a:gsLst>
+            <a:lin ang="5400000" scaled="1"/>
+          </a:gradFill>
+          <a:ln w="19050">
+            <a:solidFill>
+              <a:srgbClr val="C0C0C0"/>
+            </a:solidFill>
+            <a:round/>
+            <a:headEnd/>
+            <a:tailEnd/>
+          </a:ln>
+          <a:effectLst>
+            <a:outerShdw dist="53882" dir="2700000" algn="ctr" rotWithShape="0">
+              <a:srgbClr val="292929">
+                <a:alpha val="50000"/>
+              </a:srgbClr>
+            </a:outerShdw>
+          </a:effectLst>
+        </p:spPr>
+        <p:txBody>
+          <a:bodyPr wrap="none" anchor="ctr"/>
+          <a:lstStyle/>
+          <a:p>
+            <a:endParaRPr lang="en-US"/>
+          </a:p>
+        </p:txBody>
+      </p:sp>
+      <p:sp>
+        <p:nvSpPr>
+          <p:cNvPr id="44" name="Line 3"/>
+          <p:cNvSpPr>
+            <a:spLocks noChangeShapeType="1"/>
+          </p:cNvSpPr>
+          <p:nvPr/>
+        </p:nvSpPr>
+        <p:spPr bwMode="auto">
+          <a:xfrm>
+            <a:off x="3626919" y="3558813"/>
+            <a:ext cx="1103405" cy="1685926"/>
+          </a:xfrm>
+          <a:prstGeom prst="line">
+            <a:avLst/>
+          </a:prstGeom>
+          <a:noFill/>
+          <a:ln w="12700" cap="rnd">
+            <a:solidFill>
+              <a:srgbClr val="003366"/>
+            </a:solidFill>
+            <a:prstDash val="sysDot"/>
+            <a:round/>
+            <a:headEnd/>
+            <a:tailEnd/>
+          </a:ln>
+          <a:effectLst/>
+        </p:spPr>
+        <p:txBody>
+          <a:bodyPr/>
+          <a:lstStyle/>
+          <a:p>
+            <a:endParaRPr lang="en-US"/>
+          </a:p>
+        </p:txBody>
+      </p:sp>
+      <p:sp>
+        <p:nvSpPr>
+          <p:cNvPr id="45" name="Line 3"/>
+          <p:cNvSpPr>
+            <a:spLocks noChangeShapeType="1"/>
+          </p:cNvSpPr>
+          <p:nvPr/>
+        </p:nvSpPr>
+        <p:spPr bwMode="auto">
+          <a:xfrm>
+            <a:off x="3323731" y="3485660"/>
+            <a:ext cx="968191" cy="2549380"/>
+          </a:xfrm>
+          <a:prstGeom prst="line">
+            <a:avLst/>
+          </a:prstGeom>
+          <a:noFill/>
+          <a:ln w="12700" cap="rnd">
+            <a:solidFill>
+              <a:srgbClr val="003366"/>
+            </a:solidFill>
+            <a:prstDash val="sysDot"/>
+            <a:round/>
+            <a:headEnd/>
+            <a:tailEnd/>
+          </a:ln>
+          <a:effectLst/>
+        </p:spPr>
+        <p:txBody>
+          <a:bodyPr/>
+          <a:lstStyle/>
+          <a:p>
+            <a:endParaRPr lang="en-US"/>
+          </a:p>
+        </p:txBody>
+      </p:sp>
+      <p:sp>
+        <p:nvSpPr>
+          <p:cNvPr id="46" name="Line 5"/>
+          <p:cNvSpPr>
+            <a:spLocks noChangeShapeType="1"/>
+          </p:cNvSpPr>
+          <p:nvPr/>
+        </p:nvSpPr>
+        <p:spPr bwMode="auto">
+          <a:xfrm>
+            <a:off x="4730324" y="5244739"/>
+            <a:ext cx="965082" cy="0"/>
+          </a:xfrm>
+          <a:prstGeom prst="line">
+            <a:avLst/>
+          </a:prstGeom>
+          <a:noFill/>
+          <a:ln w="12700" cap="rnd">
+            <a:solidFill>
+              <a:srgbClr val="003366"/>
+            </a:solidFill>
+            <a:prstDash val="sysDot"/>
+            <a:round/>
+            <a:headEnd/>
+            <a:tailEnd/>
+          </a:ln>
+          <a:effectLst/>
+        </p:spPr>
+        <p:txBody>
+          <a:bodyPr/>
+          <a:lstStyle/>
+          <a:p>
+            <a:endParaRPr lang="en-US"/>
+          </a:p>
+        </p:txBody>
+      </p:sp>
+      <p:sp>
+        <p:nvSpPr>
+          <p:cNvPr id="47" name="Line 5"/>
+          <p:cNvSpPr>
+            <a:spLocks noChangeShapeType="1"/>
+          </p:cNvSpPr>
+          <p:nvPr/>
+        </p:nvSpPr>
+        <p:spPr bwMode="auto">
+          <a:xfrm>
+            <a:off x="4291922" y="6035040"/>
+            <a:ext cx="1330325" cy="0"/>
+          </a:xfrm>
+          <a:prstGeom prst="line">
+            <a:avLst/>
+          </a:prstGeom>
+          <a:noFill/>
+          <a:ln w="12700" cap="rnd">
+            <a:solidFill>
+              <a:srgbClr val="003366"/>
+            </a:solidFill>
+            <a:prstDash val="sysDot"/>
+            <a:round/>
+            <a:headEnd/>
+            <a:tailEnd/>
+          </a:ln>
+          <a:effectLst/>
+        </p:spPr>
+        <p:txBody>
+          <a:bodyPr/>
+          <a:lstStyle/>
+          <a:p>
+            <a:endParaRPr lang="en-US"/>
+          </a:p>
+        </p:txBody>
+      </p:sp>
+      <p:sp>
+        <p:nvSpPr>
+          <p:cNvPr id="48" name="Oval 34"/>
+          <p:cNvSpPr>
+            <a:spLocks noChangeArrowheads="1"/>
+          </p:cNvSpPr>
+          <p:nvPr/>
+        </p:nvSpPr>
+        <p:spPr bwMode="gray">
+          <a:xfrm>
+            <a:off x="5509217" y="5128740"/>
+            <a:ext cx="228600" cy="228600"/>
+          </a:xfrm>
+          <a:prstGeom prst="ellipse">
+            <a:avLst/>
+          </a:prstGeom>
+          <a:solidFill>
+            <a:srgbClr val="002060"/>
+          </a:solidFill>
+          <a:ln w="19050">
+            <a:solidFill>
+              <a:srgbClr val="FFFFFF"/>
+            </a:solidFill>
+            <a:round/>
+            <a:headEnd/>
+            <a:tailEnd/>
+          </a:ln>
+          <a:effectLst>
+            <a:outerShdw dist="63500" dir="2212194" algn="ctr" rotWithShape="0">
+              <a:schemeClr val="bg2">
+                <a:alpha val="50000"/>
+              </a:schemeClr>
+            </a:outerShdw>
+          </a:effectLst>
+        </p:spPr>
+        <p:txBody>
+          <a:bodyPr wrap="none" anchor="ctr"/>
+          <a:lstStyle/>
+          <a:p>
+            <a:endParaRPr lang="en-US"/>
+          </a:p>
+        </p:txBody>
+      </p:sp>
+      <p:sp>
+        <p:nvSpPr>
+          <p:cNvPr id="49" name="Oval 34"/>
+          <p:cNvSpPr>
+            <a:spLocks noChangeArrowheads="1"/>
+          </p:cNvSpPr>
+          <p:nvPr/>
+        </p:nvSpPr>
+        <p:spPr bwMode="gray">
+          <a:xfrm>
+            <a:off x="5539697" y="5903321"/>
+            <a:ext cx="228600" cy="228600"/>
+          </a:xfrm>
+          <a:prstGeom prst="ellipse">
+            <a:avLst/>
+          </a:prstGeom>
+          <a:solidFill>
+            <a:srgbClr val="92D050"/>
+          </a:solidFill>
+          <a:ln w="19050">
+            <a:solidFill>
+              <a:srgbClr val="FFFFFF"/>
+            </a:solidFill>
+            <a:round/>
+            <a:headEnd/>
+            <a:tailEnd/>
+          </a:ln>
+          <a:effectLst>
+            <a:outerShdw dist="63500" dir="2212194" algn="ctr" rotWithShape="0">
+              <a:schemeClr val="bg2">
+                <a:alpha val="50000"/>
+              </a:schemeClr>
+            </a:outerShdw>
+          </a:effectLst>
+        </p:spPr>
+        <p:txBody>
+          <a:bodyPr wrap="none" anchor="ctr"/>
+          <a:lstStyle/>
+          <a:p>
+            <a:endParaRPr lang="en-US"/>
+          </a:p>
+        </p:txBody>
+      </p:sp>
+      <p:sp>
+        <p:nvSpPr>
+          <p:cNvPr id="50" name="Rectangle 33"/>
+          <p:cNvSpPr>
+            <a:spLocks noChangeArrowheads="1"/>
+          </p:cNvSpPr>
+          <p:nvPr/>
+        </p:nvSpPr>
+        <p:spPr bwMode="auto">
+          <a:xfrm>
+            <a:off x="6934116" y="5055666"/>
+            <a:ext cx="2255603" cy="369332"/>
+          </a:xfrm>
+          <a:prstGeom prst="rect">
+            <a:avLst/>
+          </a:prstGeom>
+          <a:noFill/>
+          <a:ln w="9525">
+            <a:noFill/>
+            <a:miter lim="800000"/>
+            <a:headEnd/>
+            <a:tailEnd/>
+          </a:ln>
+          <a:effectLst/>
+        </p:spPr>
+        <p:txBody>
+          <a:bodyPr wrap="square">
+            <a:spAutoFit/>
+          </a:bodyPr>
+          <a:lstStyle/>
+          <a:p>
+            <a:pPr eaLnBrk="0" hangingPunct="0"/>
+            <a:r>
+              <a:rPr lang="en-US" smtClean="0">
+                <a:solidFill>
+                  <a:srgbClr val="000000"/>
+                </a:solidFill>
+              </a:rPr>
+              <a:t>Đánh giá hệ thống</a:t>
+            </a:r>
+            <a:endParaRPr lang="en-US">
+              <a:solidFill>
+                <a:srgbClr val="000000"/>
+              </a:solidFill>
+            </a:endParaRPr>
+          </a:p>
+        </p:txBody>
+      </p:sp>
+      <p:sp>
+        <p:nvSpPr>
+          <p:cNvPr id="51" name="Rectangle 33"/>
+          <p:cNvSpPr>
+            <a:spLocks noChangeArrowheads="1"/>
+          </p:cNvSpPr>
+          <p:nvPr/>
+        </p:nvSpPr>
+        <p:spPr bwMode="auto">
+          <a:xfrm>
+            <a:off x="6934117" y="5810277"/>
+            <a:ext cx="1158414" cy="369332"/>
+          </a:xfrm>
+          <a:prstGeom prst="rect">
+            <a:avLst/>
+          </a:prstGeom>
+          <a:noFill/>
+          <a:ln w="9525">
+            <a:noFill/>
+            <a:miter lim="800000"/>
+            <a:headEnd/>
+            <a:tailEnd/>
+          </a:ln>
+          <a:effectLst/>
+        </p:spPr>
+        <p:txBody>
+          <a:bodyPr wrap="square">
+            <a:spAutoFit/>
+          </a:bodyPr>
+          <a:lstStyle/>
+          <a:p>
+            <a:pPr eaLnBrk="0" hangingPunct="0"/>
+            <a:r>
+              <a:rPr lang="en-US" smtClean="0">
+                <a:solidFill>
+                  <a:srgbClr val="000000"/>
+                </a:solidFill>
+              </a:rPr>
+              <a:t>Tổng kết</a:t>
+            </a:r>
+            <a:endParaRPr lang="en-US">
+              <a:solidFill>
+                <a:srgbClr val="000000"/>
+              </a:solidFill>
+            </a:endParaRPr>
           </a:p>
         </p:txBody>
       </p:sp>
@@ -8491,4 +11110,265 @@
     </a:ext>
   </a:extLst>
 </a:theme>
+</file>
+
+<file path=ppt/theme/theme2.xml><?xml version="1.0" encoding="utf-8"?>
+<a:theme xmlns:a="http://schemas.openxmlformats.org/drawingml/2006/main" name="Office Theme">
+  <a:themeElements>
+    <a:clrScheme name="Office">
+      <a:dk1>
+        <a:sysClr val="windowText" lastClr="000000"/>
+      </a:dk1>
+      <a:lt1>
+        <a:sysClr val="window" lastClr="FFFFFF"/>
+      </a:lt1>
+      <a:dk2>
+        <a:srgbClr val="44546A"/>
+      </a:dk2>
+      <a:lt2>
+        <a:srgbClr val="E7E6E6"/>
+      </a:lt2>
+      <a:accent1>
+        <a:srgbClr val="5B9BD5"/>
+      </a:accent1>
+      <a:accent2>
+        <a:srgbClr val="ED7D31"/>
+      </a:accent2>
+      <a:accent3>
+        <a:srgbClr val="A5A5A5"/>
+      </a:accent3>
+      <a:accent4>
+        <a:srgbClr val="FFC000"/>
+      </a:accent4>
+      <a:accent5>
+        <a:srgbClr val="4472C4"/>
+      </a:accent5>
+      <a:accent6>
+        <a:srgbClr val="70AD47"/>
+      </a:accent6>
+      <a:hlink>
+        <a:srgbClr val="0563C1"/>
+      </a:hlink>
+      <a:folHlink>
+        <a:srgbClr val="954F72"/>
+      </a:folHlink>
+    </a:clrScheme>
+    <a:fontScheme name="Office">
+      <a:majorFont>
+        <a:latin typeface="Calibri Light" panose="020F0302020204030204"/>
+        <a:ea typeface=""/>
+        <a:cs typeface=""/>
+        <a:font script="Jpan" typeface="ＭＳ Ｐゴシック"/>
+        <a:font script="Hang" typeface="맑은 고딕"/>
+        <a:font script="Hans" typeface="宋体"/>
+        <a:font script="Hant" typeface="新細明體"/>
+        <a:font script="Arab" typeface="Times New Roman"/>
+        <a:font script="Hebr" typeface="Times New Roman"/>
+        <a:font script="Thai" typeface="Angsana New"/>
+        <a:font script="Ethi" typeface="Nyala"/>
+        <a:font script="Beng" typeface="Vrinda"/>
+        <a:font script="Gujr" typeface="Shruti"/>
+        <a:font script="Khmr" typeface="MoolBoran"/>
+        <a:font script="Knda" typeface="Tunga"/>
+        <a:font script="Guru" typeface="Raavi"/>
+        <a:font script="Cans" typeface="Euphemia"/>
+        <a:font script="Cher" typeface="Plantagenet Cherokee"/>
+        <a:font script="Yiii" typeface="Microsoft Yi Baiti"/>
+        <a:font script="Tibt" typeface="Microsoft Himalaya"/>
+        <a:font script="Thaa" typeface="MV Boli"/>
+        <a:font script="Deva" typeface="Mangal"/>
+        <a:font script="Telu" typeface="Gautami"/>
+        <a:font script="Taml" typeface="Latha"/>
+        <a:font script="Syrc" typeface="Estrangelo Edessa"/>
+        <a:font script="Orya" typeface="Kalinga"/>
+        <a:font script="Mlym" typeface="Kartika"/>
+        <a:font script="Laoo" typeface="DokChampa"/>
+        <a:font script="Sinh" typeface="Iskoola Pota"/>
+        <a:font script="Mong" typeface="Mongolian Baiti"/>
+        <a:font script="Viet" typeface="Times New Roman"/>
+        <a:font script="Uigh" typeface="Microsoft Uighur"/>
+        <a:font script="Geor" typeface="Sylfaen"/>
+      </a:majorFont>
+      <a:minorFont>
+        <a:latin typeface="Calibri" panose="020F0502020204030204"/>
+        <a:ea typeface=""/>
+        <a:cs typeface=""/>
+        <a:font script="Jpan" typeface="ＭＳ Ｐゴシック"/>
+        <a:font script="Hang" typeface="맑은 고딕"/>
+        <a:font script="Hans" typeface="宋体"/>
+        <a:font script="Hant" typeface="新細明體"/>
+        <a:font script="Arab" typeface="Arial"/>
+        <a:font script="Hebr" typeface="Arial"/>
+        <a:font script="Thai" typeface="Cordia New"/>
+        <a:font script="Ethi" typeface="Nyala"/>
+        <a:font script="Beng" typeface="Vrinda"/>
+        <a:font script="Gujr" typeface="Shruti"/>
+        <a:font script="Khmr" typeface="DaunPenh"/>
+        <a:font script="Knda" typeface="Tunga"/>
+        <a:font script="Guru" typeface="Raavi"/>
+        <a:font script="Cans" typeface="Euphemia"/>
+        <a:font script="Cher" typeface="Plantagenet Cherokee"/>
+        <a:font script="Yiii" typeface="Microsoft Yi Baiti"/>
+        <a:font script="Tibt" typeface="Microsoft Himalaya"/>
+        <a:font script="Thaa" typeface="MV Boli"/>
+        <a:font script="Deva" typeface="Mangal"/>
+        <a:font script="Telu" typeface="Gautami"/>
+        <a:font script="Taml" typeface="Latha"/>
+        <a:font script="Syrc" typeface="Estrangelo Edessa"/>
+        <a:font script="Orya" typeface="Kalinga"/>
+        <a:font script="Mlym" typeface="Kartika"/>
+        <a:font script="Laoo" typeface="DokChampa"/>
+        <a:font script="Sinh" typeface="Iskoola Pota"/>
+        <a:font script="Mong" typeface="Mongolian Baiti"/>
+        <a:font script="Viet" typeface="Arial"/>
+        <a:font script="Uigh" typeface="Microsoft Uighur"/>
+        <a:font script="Geor" typeface="Sylfaen"/>
+      </a:minorFont>
+    </a:fontScheme>
+    <a:fmtScheme name="Office">
+      <a:fillStyleLst>
+        <a:solidFill>
+          <a:schemeClr val="phClr"/>
+        </a:solidFill>
+        <a:gradFill rotWithShape="1">
+          <a:gsLst>
+            <a:gs pos="0">
+              <a:schemeClr val="phClr">
+                <a:lumMod val="110000"/>
+                <a:satMod val="105000"/>
+                <a:tint val="67000"/>
+              </a:schemeClr>
+            </a:gs>
+            <a:gs pos="50000">
+              <a:schemeClr val="phClr">
+                <a:lumMod val="105000"/>
+                <a:satMod val="103000"/>
+                <a:tint val="73000"/>
+              </a:schemeClr>
+            </a:gs>
+            <a:gs pos="100000">
+              <a:schemeClr val="phClr">
+                <a:lumMod val="105000"/>
+                <a:satMod val="109000"/>
+                <a:tint val="81000"/>
+              </a:schemeClr>
+            </a:gs>
+          </a:gsLst>
+          <a:lin ang="5400000" scaled="0"/>
+        </a:gradFill>
+        <a:gradFill rotWithShape="1">
+          <a:gsLst>
+            <a:gs pos="0">
+              <a:schemeClr val="phClr">
+                <a:satMod val="103000"/>
+                <a:lumMod val="102000"/>
+                <a:tint val="94000"/>
+              </a:schemeClr>
+            </a:gs>
+            <a:gs pos="50000">
+              <a:schemeClr val="phClr">
+                <a:satMod val="110000"/>
+                <a:lumMod val="100000"/>
+                <a:shade val="100000"/>
+              </a:schemeClr>
+            </a:gs>
+            <a:gs pos="100000">
+              <a:schemeClr val="phClr">
+                <a:lumMod val="99000"/>
+                <a:satMod val="120000"/>
+                <a:shade val="78000"/>
+              </a:schemeClr>
+            </a:gs>
+          </a:gsLst>
+          <a:lin ang="5400000" scaled="0"/>
+        </a:gradFill>
+      </a:fillStyleLst>
+      <a:lnStyleLst>
+        <a:ln w="6350" cap="flat" cmpd="sng" algn="ctr">
+          <a:solidFill>
+            <a:schemeClr val="phClr"/>
+          </a:solidFill>
+          <a:prstDash val="solid"/>
+          <a:miter lim="800000"/>
+        </a:ln>
+        <a:ln w="12700" cap="flat" cmpd="sng" algn="ctr">
+          <a:solidFill>
+            <a:schemeClr val="phClr"/>
+          </a:solidFill>
+          <a:prstDash val="solid"/>
+          <a:miter lim="800000"/>
+        </a:ln>
+        <a:ln w="19050" cap="flat" cmpd="sng" algn="ctr">
+          <a:solidFill>
+            <a:schemeClr val="phClr"/>
+          </a:solidFill>
+          <a:prstDash val="solid"/>
+          <a:miter lim="800000"/>
+        </a:ln>
+      </a:lnStyleLst>
+      <a:effectStyleLst>
+        <a:effectStyle>
+          <a:effectLst/>
+        </a:effectStyle>
+        <a:effectStyle>
+          <a:effectLst/>
+        </a:effectStyle>
+        <a:effectStyle>
+          <a:effectLst>
+            <a:outerShdw blurRad="57150" dist="19050" dir="5400000" algn="ctr" rotWithShape="0">
+              <a:srgbClr val="000000">
+                <a:alpha val="63000"/>
+              </a:srgbClr>
+            </a:outerShdw>
+          </a:effectLst>
+        </a:effectStyle>
+      </a:effectStyleLst>
+      <a:bgFillStyleLst>
+        <a:solidFill>
+          <a:schemeClr val="phClr"/>
+        </a:solidFill>
+        <a:solidFill>
+          <a:schemeClr val="phClr">
+            <a:tint val="95000"/>
+            <a:satMod val="170000"/>
+          </a:schemeClr>
+        </a:solidFill>
+        <a:gradFill rotWithShape="1">
+          <a:gsLst>
+            <a:gs pos="0">
+              <a:schemeClr val="phClr">
+                <a:tint val="93000"/>
+                <a:satMod val="150000"/>
+                <a:shade val="98000"/>
+                <a:lumMod val="102000"/>
+              </a:schemeClr>
+            </a:gs>
+            <a:gs pos="50000">
+              <a:schemeClr val="phClr">
+                <a:tint val="98000"/>
+                <a:satMod val="130000"/>
+                <a:shade val="90000"/>
+                <a:lumMod val="103000"/>
+              </a:schemeClr>
+            </a:gs>
+            <a:gs pos="100000">
+              <a:schemeClr val="phClr">
+                <a:shade val="63000"/>
+                <a:satMod val="120000"/>
+              </a:schemeClr>
+            </a:gs>
+          </a:gsLst>
+          <a:lin ang="5400000" scaled="0"/>
+        </a:gradFill>
+      </a:bgFillStyleLst>
+    </a:fmtScheme>
+  </a:themeElements>
+  <a:objectDefaults/>
+  <a:extraClrSchemeLst/>
+  <a:extLst>
+    <a:ext uri="{05A4C25C-085E-4340-85A3-A5531E510DB2}">
+      <thm15:themeFamily xmlns:thm15="http://schemas.microsoft.com/office/thememl/2012/main" name="Office Theme" id="{62F939B6-93AF-4DB8-9C6B-D6C7DFDC589F}" vid="{4A3C46E8-61CC-4603-A589-7422A47A8E4A}"/>
+    </a:ext>
+  </a:extLst>
+</a:theme>
 </file>
</xml_diff>

<commit_message>
Add icon & update draft-slide-file
</commit_message>
<xml_diff>
--- a/docs/slide trình cô - bản 1.pptx
+++ b/docs/slide trình cô - bản 1.pptx
@@ -116,6 +116,14 @@
       </a:defRPr>
     </a:lvl9pPr>
   </p:defaultTextStyle>
+  <p:extLst>
+    <p:ext uri="{EFAFB233-063F-42B5-8137-9DF3F51BA10A}">
+      <p15:sldGuideLst xmlns:p15="http://schemas.microsoft.com/office/powerpoint/2012/main"/>
+    </p:ext>
+    <p:ext uri="{2D200454-40CA-4A62-9FC3-DE9A4176ACB9}">
+      <p15:notesGuideLst xmlns:p15="http://schemas.microsoft.com/office/powerpoint/2012/main"/>
+    </p:ext>
+  </p:extLst>
 </p:presentation>
 </file>
 
@@ -680,28 +688,12 @@
               <a:t>: </a:t>
             </a:r>
             <a:r>
-              <a:rPr lang="en-US" baseline="0" err="1" smtClean="0"/>
-              <a:t>chủ</a:t>
-            </a:r>
-            <a:r>
               <a:rPr lang="en-US" baseline="0" smtClean="0"/>
-              <a:t> </a:t>
-            </a:r>
-            <a:r>
-              <a:rPr lang="en-US" baseline="0" err="1" smtClean="0"/>
-              <a:t>yếu</a:t>
+              <a:t>show </a:t>
             </a:r>
             <a:r>
               <a:rPr lang="en-US" baseline="0" smtClean="0"/>
-              <a:t> show </a:t>
-            </a:r>
-            <a:r>
-              <a:rPr lang="en-US" baseline="0" err="1" smtClean="0"/>
-              <a:t>ra</a:t>
-            </a:r>
-            <a:r>
-              <a:rPr lang="en-US" baseline="0" smtClean="0"/>
-              <a:t> flow chart.</a:t>
+              <a:t>flow chart.</a:t>
             </a:r>
           </a:p>
           <a:p>
@@ -1257,7 +1249,11 @@
             </a:pPr>
             <a:r>
               <a:rPr lang="en-US" baseline="0" smtClean="0"/>
-              <a:t>chủ yếu show ra flow chart.</a:t>
+              <a:t>show flow </a:t>
+            </a:r>
+            <a:r>
+              <a:rPr lang="en-US" baseline="0" smtClean="0"/>
+              <a:t>chart.</a:t>
             </a:r>
           </a:p>
           <a:p>
@@ -9369,177 +9365,301 @@
           <a:lstStyle/>
           <a:p>
             <a:r>
-              <a:rPr lang="en-US" err="1"/>
+              <a:rPr lang="en-US" sz="3600" err="1"/>
               <a:t>Đề</a:t>
             </a:r>
             <a:r>
-              <a:rPr lang="en-US"/>
+              <a:rPr lang="en-US" sz="3600"/>
               <a:t> </a:t>
             </a:r>
             <a:r>
-              <a:rPr lang="en-US" err="1"/>
+              <a:rPr lang="en-US" sz="3600" err="1"/>
               <a:t>tài</a:t>
             </a:r>
             <a:r>
-              <a:rPr lang="en-US"/>
+              <a:rPr lang="en-US" sz="3600"/>
               <a:t> </a:t>
             </a:r>
             <a:r>
-              <a:rPr lang="en-US" err="1"/>
+              <a:rPr lang="en-US" sz="3600" err="1"/>
               <a:t>luận</a:t>
             </a:r>
             <a:r>
-              <a:rPr lang="en-US"/>
+              <a:rPr lang="en-US" sz="3600"/>
               <a:t> </a:t>
             </a:r>
             <a:r>
-              <a:rPr lang="en-US" err="1"/>
+              <a:rPr lang="en-US" sz="3600" err="1"/>
               <a:t>văn</a:t>
             </a:r>
             <a:r>
-              <a:rPr lang="en-US"/>
+              <a:rPr lang="en-US" sz="3600"/>
               <a:t> </a:t>
             </a:r>
             <a:r>
-              <a:rPr lang="en-US" err="1"/>
+              <a:rPr lang="en-US" sz="3600" err="1"/>
               <a:t>số</a:t>
             </a:r>
             <a:r>
-              <a:rPr lang="en-US"/>
+              <a:rPr lang="en-US" sz="3600"/>
               <a:t> 31</a:t>
             </a:r>
             <a:r>
-              <a:rPr lang="en-US" smtClean="0"/>
+              <a:rPr lang="en-US" sz="3600" smtClean="0"/>
               <a:t>:</a:t>
             </a:r>
             <a:br>
-              <a:rPr lang="en-US" smtClean="0"/>
+              <a:rPr lang="en-US" sz="3600" smtClean="0"/>
             </a:br>
             <a:r>
               <a:rPr lang="en-US" smtClean="0"/>
               <a:t>	</a:t>
             </a:r>
             <a:r>
-              <a:rPr lang="en-US" sz="4400" err="1" smtClean="0"/>
+              <a:rPr lang="en-US" sz="4400" i="1" err="1" smtClean="0">
+                <a:solidFill>
+                  <a:srgbClr val="0070C0"/>
+                </a:solidFill>
+              </a:rPr>
               <a:t>Xây</a:t>
             </a:r>
             <a:r>
-              <a:rPr lang="en-US" sz="4400" smtClean="0"/>
+              <a:rPr lang="en-US" sz="4400" i="1" smtClean="0">
+                <a:solidFill>
+                  <a:srgbClr val="0070C0"/>
+                </a:solidFill>
+              </a:rPr>
               <a:t> </a:t>
             </a:r>
             <a:r>
-              <a:rPr lang="en-US" sz="4400" err="1"/>
+              <a:rPr lang="en-US" sz="4400" i="1" err="1">
+                <a:solidFill>
+                  <a:srgbClr val="0070C0"/>
+                </a:solidFill>
+              </a:rPr>
               <a:t>dựng</a:t>
             </a:r>
             <a:r>
-              <a:rPr lang="en-US" sz="4400"/>
+              <a:rPr lang="en-US" sz="4400" i="1">
+                <a:solidFill>
+                  <a:srgbClr val="0070C0"/>
+                </a:solidFill>
+              </a:rPr>
               <a:t> </a:t>
             </a:r>
             <a:r>
-              <a:rPr lang="en-US" sz="4400" err="1"/>
+              <a:rPr lang="en-US" sz="4400" i="1" err="1">
+                <a:solidFill>
+                  <a:srgbClr val="0070C0"/>
+                </a:solidFill>
+              </a:rPr>
               <a:t>hệ</a:t>
             </a:r>
             <a:r>
-              <a:rPr lang="en-US" sz="4400"/>
+              <a:rPr lang="en-US" sz="4400" i="1">
+                <a:solidFill>
+                  <a:srgbClr val="0070C0"/>
+                </a:solidFill>
+              </a:rPr>
               <a:t> </a:t>
             </a:r>
             <a:r>
-              <a:rPr lang="en-US" sz="4400" err="1"/>
+              <a:rPr lang="en-US" sz="4400" i="1" err="1">
+                <a:solidFill>
+                  <a:srgbClr val="0070C0"/>
+                </a:solidFill>
+              </a:rPr>
               <a:t>thống</a:t>
             </a:r>
             <a:r>
-              <a:rPr lang="en-US" sz="4400"/>
+              <a:rPr lang="en-US" sz="4400" i="1">
+                <a:solidFill>
+                  <a:srgbClr val="0070C0"/>
+                </a:solidFill>
+              </a:rPr>
               <a:t> </a:t>
             </a:r>
             <a:r>
-              <a:rPr lang="en-US" sz="4400" err="1"/>
+              <a:rPr lang="en-US" sz="4400" i="1" err="1">
+                <a:solidFill>
+                  <a:srgbClr val="0070C0"/>
+                </a:solidFill>
+              </a:rPr>
               <a:t>quản</a:t>
             </a:r>
             <a:r>
-              <a:rPr lang="en-US" sz="4400"/>
+              <a:rPr lang="en-US" sz="4400" i="1">
+                <a:solidFill>
+                  <a:srgbClr val="0070C0"/>
+                </a:solidFill>
+              </a:rPr>
               <a:t> </a:t>
             </a:r>
             <a:r>
-              <a:rPr lang="en-US" sz="4400" err="1"/>
+              <a:rPr lang="en-US" sz="4400" i="1" err="1">
+                <a:solidFill>
+                  <a:srgbClr val="0070C0"/>
+                </a:solidFill>
+              </a:rPr>
               <a:t>lý</a:t>
             </a:r>
             <a:r>
-              <a:rPr lang="en-US" sz="4400"/>
+              <a:rPr lang="en-US" sz="4400" i="1">
+                <a:solidFill>
+                  <a:srgbClr val="0070C0"/>
+                </a:solidFill>
+              </a:rPr>
               <a:t> </a:t>
             </a:r>
             <a:r>
-              <a:rPr lang="en-US" sz="4400" err="1"/>
+              <a:rPr lang="en-US" sz="4400" i="1" err="1">
+                <a:solidFill>
+                  <a:srgbClr val="0070C0"/>
+                </a:solidFill>
+              </a:rPr>
               <a:t>thông</a:t>
             </a:r>
             <a:r>
-              <a:rPr lang="en-US" sz="4400"/>
+              <a:rPr lang="en-US" sz="4400" i="1">
+                <a:solidFill>
+                  <a:srgbClr val="0070C0"/>
+                </a:solidFill>
+              </a:rPr>
               <a:t> tin </a:t>
             </a:r>
             <a:r>
-              <a:rPr lang="en-US" sz="4400" err="1" smtClean="0"/>
+              <a:rPr lang="en-US" sz="4400" i="1" err="1" smtClean="0">
+                <a:solidFill>
+                  <a:srgbClr val="0070C0"/>
+                </a:solidFill>
+              </a:rPr>
               <a:t>bán</a:t>
             </a:r>
             <a:r>
-              <a:rPr lang="en-US" sz="4400" smtClean="0"/>
+              <a:rPr lang="en-US" sz="4400" i="1" smtClean="0">
+                <a:solidFill>
+                  <a:srgbClr val="0070C0"/>
+                </a:solidFill>
+              </a:rPr>
               <a:t> </a:t>
             </a:r>
             <a:r>
-              <a:rPr lang="en-US" sz="4400" err="1"/>
+              <a:rPr lang="en-US" sz="4400" i="1" err="1">
+                <a:solidFill>
+                  <a:srgbClr val="0070C0"/>
+                </a:solidFill>
+              </a:rPr>
               <a:t>hàng</a:t>
             </a:r>
             <a:r>
-              <a:rPr lang="en-US" sz="4400"/>
+              <a:rPr lang="en-US" sz="4400" i="1">
+                <a:solidFill>
+                  <a:srgbClr val="0070C0"/>
+                </a:solidFill>
+              </a:rPr>
               <a:t> </a:t>
             </a:r>
             <a:r>
-              <a:rPr lang="en-US" sz="4400" err="1"/>
+              <a:rPr lang="en-US" sz="4400" i="1" err="1">
+                <a:solidFill>
+                  <a:srgbClr val="0070C0"/>
+                </a:solidFill>
+              </a:rPr>
               <a:t>cho</a:t>
             </a:r>
             <a:r>
-              <a:rPr lang="en-US" sz="4400"/>
+              <a:rPr lang="en-US" sz="4400" i="1">
+                <a:solidFill>
+                  <a:srgbClr val="0070C0"/>
+                </a:solidFill>
+              </a:rPr>
               <a:t> </a:t>
             </a:r>
             <a:r>
-              <a:rPr lang="en-US" sz="4400" err="1"/>
+              <a:rPr lang="en-US" sz="4400" i="1" err="1">
+                <a:solidFill>
+                  <a:srgbClr val="0070C0"/>
+                </a:solidFill>
+              </a:rPr>
               <a:t>doanh</a:t>
             </a:r>
             <a:r>
-              <a:rPr lang="en-US" sz="4400"/>
+              <a:rPr lang="en-US" sz="4400" i="1">
+                <a:solidFill>
+                  <a:srgbClr val="0070C0"/>
+                </a:solidFill>
+              </a:rPr>
               <a:t> </a:t>
             </a:r>
             <a:r>
-              <a:rPr lang="en-US" sz="4400" err="1"/>
+              <a:rPr lang="en-US" sz="4400" i="1" err="1">
+                <a:solidFill>
+                  <a:srgbClr val="0070C0"/>
+                </a:solidFill>
+              </a:rPr>
               <a:t>nghiệp</a:t>
             </a:r>
             <a:r>
-              <a:rPr lang="en-US" sz="4400"/>
+              <a:rPr lang="en-US" sz="4400" i="1">
+                <a:solidFill>
+                  <a:srgbClr val="0070C0"/>
+                </a:solidFill>
+              </a:rPr>
               <a:t> </a:t>
             </a:r>
             <a:r>
-              <a:rPr lang="en-US" sz="4400" err="1"/>
+              <a:rPr lang="en-US" sz="4400" i="1" err="1">
+                <a:solidFill>
+                  <a:srgbClr val="0070C0"/>
+                </a:solidFill>
+              </a:rPr>
               <a:t>sản</a:t>
             </a:r>
             <a:r>
-              <a:rPr lang="en-US" sz="4400"/>
+              <a:rPr lang="en-US" sz="4400" i="1">
+                <a:solidFill>
+                  <a:srgbClr val="0070C0"/>
+                </a:solidFill>
+              </a:rPr>
               <a:t> </a:t>
             </a:r>
             <a:r>
-              <a:rPr lang="en-US" sz="4400" err="1"/>
+              <a:rPr lang="en-US" sz="4400" i="1" err="1">
+                <a:solidFill>
+                  <a:srgbClr val="0070C0"/>
+                </a:solidFill>
+              </a:rPr>
               <a:t>xuất</a:t>
             </a:r>
             <a:r>
-              <a:rPr lang="en-US" sz="4400"/>
+              <a:rPr lang="en-US" sz="4400" i="1">
+                <a:solidFill>
+                  <a:srgbClr val="0070C0"/>
+                </a:solidFill>
+              </a:rPr>
               <a:t> </a:t>
             </a:r>
             <a:r>
-              <a:rPr lang="en-US" sz="4400" err="1"/>
+              <a:rPr lang="en-US" sz="4400" i="1" err="1">
+                <a:solidFill>
+                  <a:srgbClr val="0070C0"/>
+                </a:solidFill>
+              </a:rPr>
               <a:t>vải</a:t>
             </a:r>
             <a:r>
-              <a:rPr lang="en-US" sz="4400"/>
+              <a:rPr lang="en-US" sz="4400" i="1">
+                <a:solidFill>
+                  <a:srgbClr val="0070C0"/>
+                </a:solidFill>
+              </a:rPr>
               <a:t>.</a:t>
             </a:r>
-            <a:endParaRPr lang="en-US"/>
+            <a:endParaRPr lang="en-US" i="1">
+              <a:solidFill>
+                <a:srgbClr val="0070C0"/>
+              </a:solidFill>
+            </a:endParaRPr>
           </a:p>
         </p:txBody>
       </p:sp>
@@ -9567,7 +9687,11 @@
           <a:p>
             <a:r>
               <a:rPr lang="en-US" smtClean="0"/>
-              <a:t>GVHD: </a:t>
+              <a:t>- GVHD</a:t>
+            </a:r>
+            <a:r>
+              <a:rPr lang="en-US" smtClean="0"/>
+              <a:t>: </a:t>
             </a:r>
             <a:r>
               <a:rPr lang="en-US" err="1" smtClean="0"/>
@@ -9610,7 +9734,11 @@
           <a:p>
             <a:r>
               <a:rPr lang="en-US" smtClean="0"/>
-              <a:t>GVPB: </a:t>
+              <a:t>- GVPB</a:t>
+            </a:r>
+            <a:r>
+              <a:rPr lang="en-US" smtClean="0"/>
+              <a:t>: </a:t>
             </a:r>
             <a:r>
               <a:rPr lang="en-US" err="1" smtClean="0"/>
@@ -9651,9 +9779,16 @@
             <a:endParaRPr lang="en-US" smtClean="0"/>
           </a:p>
           <a:p>
+            <a:endParaRPr lang="en-US" smtClean="0"/>
+          </a:p>
+          <a:p>
+            <a:r>
+              <a:rPr lang="en-US" smtClean="0"/>
+              <a:t>Danh </a:t>
+            </a:r>
             <a:r>
               <a:rPr lang="en-US" err="1" smtClean="0"/>
-              <a:t>Danh</a:t>
+              <a:t>sách</a:t>
             </a:r>
             <a:r>
               <a:rPr lang="en-US" smtClean="0"/>
@@ -9661,7 +9796,7 @@
             </a:r>
             <a:r>
               <a:rPr lang="en-US" err="1" smtClean="0"/>
-              <a:t>sách</a:t>
+              <a:t>nhóm</a:t>
             </a:r>
             <a:r>
               <a:rPr lang="en-US" smtClean="0"/>
@@ -9669,7 +9804,7 @@
             </a:r>
             <a:r>
               <a:rPr lang="en-US" err="1" smtClean="0"/>
-              <a:t>nhóm</a:t>
+              <a:t>thực</a:t>
             </a:r>
             <a:r>
               <a:rPr lang="en-US" smtClean="0"/>
@@ -9677,7 +9812,25 @@
             </a:r>
             <a:r>
               <a:rPr lang="en-US" err="1" smtClean="0"/>
-              <a:t>thực</a:t>
+              <a:t>hiện</a:t>
+            </a:r>
+            <a:r>
+              <a:rPr lang="en-US" smtClean="0"/>
+              <a:t>:</a:t>
+            </a:r>
+          </a:p>
+          <a:p>
+            <a:r>
+              <a:rPr lang="en-US"/>
+              <a:t>	</a:t>
+            </a:r>
+            <a:r>
+              <a:rPr lang="en-US" smtClean="0"/>
+              <a:t>1. </a:t>
+            </a:r>
+            <a:r>
+              <a:rPr lang="en-US" err="1" smtClean="0"/>
+              <a:t>Vũ</a:t>
             </a:r>
             <a:r>
               <a:rPr lang="en-US" smtClean="0"/>
@@ -9685,12 +9838,17 @@
             </a:r>
             <a:r>
               <a:rPr lang="en-US" err="1" smtClean="0"/>
-              <a:t>hiện</a:t>
+              <a:t>Duy</a:t>
             </a:r>
             <a:r>
               <a:rPr lang="en-US" smtClean="0"/>
-              <a:t>:</a:t>
-            </a:r>
+              <a:t> </a:t>
+            </a:r>
+            <a:r>
+              <a:rPr lang="en-US" err="1" smtClean="0"/>
+              <a:t>Trúc</a:t>
+            </a:r>
+            <a:endParaRPr lang="en-US" smtClean="0"/>
           </a:p>
           <a:p>
             <a:r>
@@ -9699,38 +9857,7 @@
             </a:r>
             <a:r>
               <a:rPr lang="en-US" smtClean="0"/>
-              <a:t>- </a:t>
-            </a:r>
-            <a:r>
-              <a:rPr lang="en-US" err="1" smtClean="0"/>
-              <a:t>Vũ</a:t>
-            </a:r>
-            <a:r>
-              <a:rPr lang="en-US" smtClean="0"/>
-              <a:t> </a:t>
-            </a:r>
-            <a:r>
-              <a:rPr lang="en-US" err="1" smtClean="0"/>
-              <a:t>Duy</a:t>
-            </a:r>
-            <a:r>
-              <a:rPr lang="en-US" smtClean="0"/>
-              <a:t> </a:t>
-            </a:r>
-            <a:r>
-              <a:rPr lang="en-US" err="1" smtClean="0"/>
-              <a:t>Trúc</a:t>
-            </a:r>
-            <a:endParaRPr lang="en-US" smtClean="0"/>
-          </a:p>
-          <a:p>
-            <a:r>
-              <a:rPr lang="en-US"/>
-              <a:t>	</a:t>
-            </a:r>
-            <a:r>
-              <a:rPr lang="en-US" smtClean="0"/>
-              <a:t>- </a:t>
+              <a:t>2. </a:t>
             </a:r>
             <a:r>
               <a:rPr lang="en-US" err="1" smtClean="0"/>
@@ -10206,30 +10333,58 @@
           <a:lstStyle/>
           <a:p>
             <a:r>
-              <a:rPr lang="en-US" smtClean="0"/>
+              <a:rPr lang="en-US" smtClean="0">
+                <a:solidFill>
+                  <a:srgbClr val="C00000"/>
+                </a:solidFill>
+              </a:rPr>
               <a:t>1. Giới </a:t>
             </a:r>
             <a:r>
-              <a:rPr lang="en-US" err="1"/>
+              <a:rPr lang="en-US" err="1">
+                <a:solidFill>
+                  <a:srgbClr val="C00000"/>
+                </a:solidFill>
+              </a:rPr>
               <a:t>thiệu</a:t>
             </a:r>
             <a:r>
-              <a:rPr lang="en-US"/>
+              <a:rPr lang="en-US">
+                <a:solidFill>
+                  <a:srgbClr val="C00000"/>
+                </a:solidFill>
+              </a:rPr>
               <a:t> </a:t>
             </a:r>
             <a:r>
-              <a:rPr lang="en-US" err="1"/>
+              <a:rPr lang="en-US" err="1">
+                <a:solidFill>
+                  <a:srgbClr val="C00000"/>
+                </a:solidFill>
+              </a:rPr>
               <a:t>đề</a:t>
             </a:r>
             <a:r>
-              <a:rPr lang="en-US"/>
+              <a:rPr lang="en-US">
+                <a:solidFill>
+                  <a:srgbClr val="C00000"/>
+                </a:solidFill>
+              </a:rPr>
               <a:t> </a:t>
             </a:r>
             <a:r>
-              <a:rPr lang="en-US" err="1"/>
+              <a:rPr lang="en-US" err="1">
+                <a:solidFill>
+                  <a:srgbClr val="C00000"/>
+                </a:solidFill>
+              </a:rPr>
               <a:t>tài</a:t>
             </a:r>
-            <a:endParaRPr lang="en-US"/>
+            <a:endParaRPr lang="en-US">
+              <a:solidFill>
+                <a:srgbClr val="C00000"/>
+              </a:solidFill>
+            </a:endParaRPr>
           </a:p>
         </p:txBody>
       </p:sp>
@@ -10322,30 +10477,58 @@
           <a:lstStyle/>
           <a:p>
             <a:r>
-              <a:rPr lang="en-US" smtClean="0"/>
+              <a:rPr lang="en-US" smtClean="0">
+                <a:solidFill>
+                  <a:srgbClr val="C00000"/>
+                </a:solidFill>
+              </a:rPr>
               <a:t>2. Mô </a:t>
             </a:r>
             <a:r>
-              <a:rPr lang="en-US" err="1" smtClean="0"/>
+              <a:rPr lang="en-US" err="1" smtClean="0">
+                <a:solidFill>
+                  <a:srgbClr val="C00000"/>
+                </a:solidFill>
+              </a:rPr>
               <a:t>tả</a:t>
             </a:r>
             <a:r>
-              <a:rPr lang="en-US" smtClean="0"/>
+              <a:rPr lang="en-US" smtClean="0">
+                <a:solidFill>
+                  <a:srgbClr val="C00000"/>
+                </a:solidFill>
+              </a:rPr>
               <a:t> </a:t>
             </a:r>
             <a:r>
-              <a:rPr lang="en-US" err="1" smtClean="0"/>
+              <a:rPr lang="en-US" err="1" smtClean="0">
+                <a:solidFill>
+                  <a:srgbClr val="C00000"/>
+                </a:solidFill>
+              </a:rPr>
               <a:t>nghiệp</a:t>
             </a:r>
             <a:r>
-              <a:rPr lang="en-US" smtClean="0"/>
+              <a:rPr lang="en-US" smtClean="0">
+                <a:solidFill>
+                  <a:srgbClr val="C00000"/>
+                </a:solidFill>
+              </a:rPr>
               <a:t> </a:t>
             </a:r>
             <a:r>
-              <a:rPr lang="en-US" err="1" smtClean="0"/>
+              <a:rPr lang="en-US" err="1" smtClean="0">
+                <a:solidFill>
+                  <a:srgbClr val="C00000"/>
+                </a:solidFill>
+              </a:rPr>
               <a:t>vụ</a:t>
             </a:r>
-            <a:endParaRPr lang="en-US"/>
+            <a:endParaRPr lang="en-US">
+              <a:solidFill>
+                <a:srgbClr val="C00000"/>
+              </a:solidFill>
+            </a:endParaRPr>
           </a:p>
         </p:txBody>
       </p:sp>
@@ -10439,32 +10622,56 @@
           <a:p>
             <a:pPr eaLnBrk="0" hangingPunct="0"/>
             <a:r>
-              <a:rPr lang="en-US" smtClean="0"/>
+              <a:rPr lang="en-US" smtClean="0">
+                <a:solidFill>
+                  <a:srgbClr val="C00000"/>
+                </a:solidFill>
+              </a:rPr>
               <a:t>3. Phân </a:t>
             </a:r>
             <a:r>
-              <a:rPr lang="en-US" err="1" smtClean="0"/>
+              <a:rPr lang="en-US" err="1" smtClean="0">
+                <a:solidFill>
+                  <a:srgbClr val="C00000"/>
+                </a:solidFill>
+              </a:rPr>
               <a:t>tích</a:t>
             </a:r>
             <a:r>
-              <a:rPr lang="en-US" smtClean="0"/>
+              <a:rPr lang="en-US" smtClean="0">
+                <a:solidFill>
+                  <a:srgbClr val="C00000"/>
+                </a:solidFill>
+              </a:rPr>
               <a:t> </a:t>
             </a:r>
             <a:r>
-              <a:rPr lang="en-US" err="1" smtClean="0"/>
+              <a:rPr lang="en-US" err="1" smtClean="0">
+                <a:solidFill>
+                  <a:srgbClr val="C00000"/>
+                </a:solidFill>
+              </a:rPr>
               <a:t>yêu</a:t>
             </a:r>
             <a:r>
-              <a:rPr lang="en-US" smtClean="0"/>
+              <a:rPr lang="en-US" smtClean="0">
+                <a:solidFill>
+                  <a:srgbClr val="C00000"/>
+                </a:solidFill>
+              </a:rPr>
               <a:t> </a:t>
             </a:r>
             <a:r>
-              <a:rPr lang="en-US" err="1" smtClean="0"/>
+              <a:rPr lang="en-US" err="1" smtClean="0">
+                <a:solidFill>
+                  <a:srgbClr val="C00000"/>
+                </a:solidFill>
+              </a:rPr>
               <a:t>cầu</a:t>
             </a:r>
             <a:endParaRPr lang="en-US">
               <a:solidFill>
-                <a:srgbClr val="000000"/>
+                <a:srgbClr val="C00000"/>
               </a:solidFill>
             </a:endParaRPr>
           </a:p>
@@ -10847,22 +11054,14 @@
             <a:r>
               <a:rPr lang="en-US" smtClean="0">
                 <a:solidFill>
-                  <a:srgbClr val="000000"/>
+                  <a:srgbClr val="C00000"/>
                 </a:solidFill>
               </a:rPr>
-              <a:t>5. Hiện </a:t>
-            </a:r>
-            <a:r>
-              <a:rPr lang="en-US" smtClean="0">
-                <a:solidFill>
-                  <a:srgbClr val="000000"/>
-                </a:solidFill>
-              </a:rPr>
-              <a:t>thực hệ thống	</a:t>
+              <a:t>5. Hiện thực hệ thống	</a:t>
             </a:r>
             <a:endParaRPr lang="en-US">
               <a:solidFill>
-                <a:srgbClr val="000000"/>
+                <a:srgbClr val="C00000"/>
               </a:solidFill>
             </a:endParaRPr>
           </a:p>
@@ -10944,30 +11143,58 @@
           <a:p>
             <a:pPr eaLnBrk="0" hangingPunct="0"/>
             <a:r>
-              <a:rPr lang="en-US" smtClean="0"/>
+              <a:rPr lang="en-US" smtClean="0">
+                <a:solidFill>
+                  <a:srgbClr val="C00000"/>
+                </a:solidFill>
+              </a:rPr>
               <a:t>4. Thiết </a:t>
             </a:r>
             <a:r>
-              <a:rPr lang="en-US" err="1"/>
+              <a:rPr lang="en-US" err="1">
+                <a:solidFill>
+                  <a:srgbClr val="C00000"/>
+                </a:solidFill>
+              </a:rPr>
               <a:t>kế</a:t>
             </a:r>
             <a:r>
-              <a:rPr lang="en-US"/>
+              <a:rPr lang="en-US">
+                <a:solidFill>
+                  <a:srgbClr val="C00000"/>
+                </a:solidFill>
+              </a:rPr>
               <a:t> </a:t>
             </a:r>
             <a:r>
-              <a:rPr lang="en-US" err="1"/>
+              <a:rPr lang="en-US" err="1">
+                <a:solidFill>
+                  <a:srgbClr val="C00000"/>
+                </a:solidFill>
+              </a:rPr>
               <a:t>hệ</a:t>
             </a:r>
             <a:r>
-              <a:rPr lang="en-US"/>
+              <a:rPr lang="en-US">
+                <a:solidFill>
+                  <a:srgbClr val="C00000"/>
+                </a:solidFill>
+              </a:rPr>
               <a:t> </a:t>
             </a:r>
             <a:r>
-              <a:rPr lang="en-US" err="1"/>
+              <a:rPr lang="en-US" err="1">
+                <a:solidFill>
+                  <a:srgbClr val="C00000"/>
+                </a:solidFill>
+              </a:rPr>
               <a:t>thống</a:t>
             </a:r>
-            <a:endParaRPr lang="en-US"/>
+            <a:endParaRPr lang="en-US">
+              <a:solidFill>
+                <a:srgbClr val="C00000"/>
+              </a:solidFill>
+            </a:endParaRPr>
           </a:p>
         </p:txBody>
       </p:sp>
@@ -11099,14 +11326,14 @@
             <a:r>
               <a:rPr lang="en-US" smtClean="0">
                 <a:solidFill>
-                  <a:srgbClr val="000000"/>
+                  <a:srgbClr val="C00000"/>
                 </a:solidFill>
               </a:rPr>
               <a:t>6. Demo</a:t>
             </a:r>
             <a:endParaRPr lang="en-US">
               <a:solidFill>
-                <a:srgbClr val="000000"/>
+                <a:srgbClr val="C00000"/>
               </a:solidFill>
             </a:endParaRPr>
           </a:p>
@@ -11570,14 +11797,14 @@
             <a:r>
               <a:rPr lang="en-US" smtClean="0">
                 <a:solidFill>
-                  <a:srgbClr val="000000"/>
+                  <a:srgbClr val="C00000"/>
                 </a:solidFill>
               </a:rPr>
               <a:t>7. Đánh giá hệ thống</a:t>
             </a:r>
             <a:endParaRPr lang="en-US">
               <a:solidFill>
-                <a:srgbClr val="000000"/>
+                <a:srgbClr val="C00000"/>
               </a:solidFill>
             </a:endParaRPr>
           </a:p>
@@ -11618,14 +11845,14 @@
             <a:r>
               <a:rPr lang="en-US" smtClean="0">
                 <a:solidFill>
-                  <a:srgbClr val="000000"/>
+                  <a:srgbClr val="C00000"/>
                 </a:solidFill>
               </a:rPr>
               <a:t>8. Tổng kết</a:t>
             </a:r>
             <a:endParaRPr lang="en-US">
               <a:solidFill>
-                <a:srgbClr val="000000"/>
+                <a:srgbClr val="C00000"/>
               </a:solidFill>
             </a:endParaRPr>
           </a:p>
@@ -11687,11 +11914,19 @@
           <a:lstStyle/>
           <a:p>
             <a:r>
-              <a:rPr lang="en-US" sz="3200" err="1"/>
+              <a:rPr lang="en-US" sz="3200" i="1" err="1">
+                <a:solidFill>
+                  <a:srgbClr val="00B050"/>
+                </a:solidFill>
+              </a:rPr>
               <a:t>Nội</a:t>
             </a:r>
             <a:r>
-              <a:rPr lang="en-US" sz="3200"/>
+              <a:rPr lang="en-US" sz="3200" i="1">
+                <a:solidFill>
+                  <a:srgbClr val="00B050"/>
+                </a:solidFill>
+              </a:rPr>
               <a:t> dung</a:t>
             </a:r>
           </a:p>
@@ -11769,20 +12004,34 @@
         </p:nvSpPr>
         <p:spPr/>
         <p:txBody>
-          <a:bodyPr/>
-          <a:lstStyle/>
-          <a:p>
-            <a:r>
-              <a:rPr lang="en-US" smtClean="0"/>
-              <a:t>Đề tài của nhóm là gì?</a:t>
-            </a:r>
-          </a:p>
-          <a:p>
-            <a:r>
-              <a:rPr lang="en-US" smtClean="0"/>
+          <a:bodyPr>
+            <a:normAutofit/>
+          </a:bodyPr>
+          <a:lstStyle/>
+          <a:p>
+            <a:endParaRPr lang="en-US" sz="3200" smtClean="0"/>
+          </a:p>
+          <a:p>
+            <a:r>
+              <a:rPr lang="en-US" sz="3200" smtClean="0"/>
+              <a:t>Đề </a:t>
+            </a:r>
+            <a:r>
+              <a:rPr lang="en-US" sz="3200" smtClean="0"/>
+              <a:t>tài của nhóm là gì</a:t>
+            </a:r>
+            <a:r>
+              <a:rPr lang="en-US" sz="3200" smtClean="0"/>
+              <a:t>?</a:t>
+            </a:r>
+            <a:endParaRPr lang="en-US" sz="3200" smtClean="0"/>
+          </a:p>
+          <a:p>
+            <a:r>
+              <a:rPr lang="en-US" sz="3200" smtClean="0"/>
               <a:t>Tại sao nhóm lại lựa chọn đề tài này?</a:t>
             </a:r>
-            <a:endParaRPr lang="en-US"/>
+            <a:endParaRPr lang="en-US" sz="3200"/>
           </a:p>
         </p:txBody>
       </p:sp>
@@ -11796,6 +12045,13 @@
   <p:clrMapOvr>
     <a:masterClrMapping/>
   </p:clrMapOvr>
+  <p:timing>
+    <p:tnLst>
+      <p:par>
+        <p:cTn id="1" dur="indefinite" restart="never" nodeType="tmRoot"/>
+      </p:par>
+    </p:tnLst>
+  </p:timing>
 </p:sld>
 </file>
 
@@ -11826,7 +12082,12 @@
             <p:ph type="title"/>
           </p:nvPr>
         </p:nvSpPr>
-        <p:spPr/>
+        <p:spPr>
+          <a:xfrm>
+            <a:off x="2540643" y="688183"/>
+            <a:ext cx="8911687" cy="867514"/>
+          </a:xfrm>
+        </p:spPr>
         <p:txBody>
           <a:bodyPr/>
           <a:lstStyle/>
@@ -11841,23 +12102,1397 @@
       </p:sp>
       <p:sp>
         <p:nvSpPr>
-          <p:cNvPr id="3" name="Content Placeholder 2"/>
-          <p:cNvSpPr>
-            <a:spLocks noGrp="1"/>
-          </p:cNvSpPr>
-          <p:nvPr>
-            <p:ph idx="1"/>
-          </p:nvPr>
-        </p:nvSpPr>
-        <p:spPr/>
-        <p:txBody>
-          <a:bodyPr/>
-          <a:lstStyle/>
-          <a:p>
+          <p:cNvPr id="25" name="Down Arrow 24"/>
+          <p:cNvSpPr/>
+          <p:nvPr/>
+        </p:nvSpPr>
+        <p:spPr>
+          <a:xfrm>
+            <a:off x="1326202" y="4357078"/>
+            <a:ext cx="230778" cy="669208"/>
+          </a:xfrm>
+          <a:prstGeom prst="downArrow">
+            <a:avLst/>
+          </a:prstGeom>
+          <a:solidFill>
+            <a:schemeClr val="accent6">
+              <a:lumMod val="40000"/>
+              <a:lumOff val="60000"/>
+            </a:schemeClr>
+          </a:solidFill>
+        </p:spPr>
+        <p:style>
+          <a:lnRef idx="2">
+            <a:schemeClr val="accent1">
+              <a:shade val="50000"/>
+            </a:schemeClr>
+          </a:lnRef>
+          <a:fillRef idx="1">
+            <a:schemeClr val="accent1"/>
+          </a:fillRef>
+          <a:effectRef idx="0">
+            <a:schemeClr val="accent1"/>
+          </a:effectRef>
+          <a:fontRef idx="minor">
+            <a:schemeClr val="lt1"/>
+          </a:fontRef>
+        </p:style>
+        <p:txBody>
+          <a:bodyPr rtlCol="0" anchor="ctr"/>
+          <a:lstStyle/>
+          <a:p>
+            <a:pPr algn="ctr"/>
             <a:endParaRPr lang="en-US"/>
           </a:p>
         </p:txBody>
       </p:sp>
+      <p:sp>
+        <p:nvSpPr>
+          <p:cNvPr id="26" name="Right Arrow 25"/>
+          <p:cNvSpPr/>
+          <p:nvPr/>
+        </p:nvSpPr>
+        <p:spPr>
+          <a:xfrm>
+            <a:off x="2075578" y="5496567"/>
+            <a:ext cx="1011609" cy="280909"/>
+          </a:xfrm>
+          <a:prstGeom prst="rightArrow">
+            <a:avLst/>
+          </a:prstGeom>
+          <a:solidFill>
+            <a:schemeClr val="accent6">
+              <a:lumMod val="40000"/>
+              <a:lumOff val="60000"/>
+            </a:schemeClr>
+          </a:solidFill>
+        </p:spPr>
+        <p:style>
+          <a:lnRef idx="2">
+            <a:schemeClr val="accent1">
+              <a:shade val="50000"/>
+            </a:schemeClr>
+          </a:lnRef>
+          <a:fillRef idx="1">
+            <a:schemeClr val="accent1"/>
+          </a:fillRef>
+          <a:effectRef idx="0">
+            <a:schemeClr val="accent1"/>
+          </a:effectRef>
+          <a:fontRef idx="minor">
+            <a:schemeClr val="lt1"/>
+          </a:fontRef>
+        </p:style>
+        <p:txBody>
+          <a:bodyPr rtlCol="0" anchor="ctr"/>
+          <a:lstStyle/>
+          <a:p>
+            <a:pPr algn="ctr"/>
+            <a:endParaRPr lang="en-US"/>
+          </a:p>
+        </p:txBody>
+      </p:sp>
+      <p:sp>
+        <p:nvSpPr>
+          <p:cNvPr id="27" name="Up Arrow 26"/>
+          <p:cNvSpPr/>
+          <p:nvPr/>
+        </p:nvSpPr>
+        <p:spPr>
+          <a:xfrm>
+            <a:off x="3542280" y="4772744"/>
+            <a:ext cx="242303" cy="723823"/>
+          </a:xfrm>
+          <a:prstGeom prst="upArrow">
+            <a:avLst/>
+          </a:prstGeom>
+          <a:solidFill>
+            <a:schemeClr val="accent6">
+              <a:lumMod val="40000"/>
+              <a:lumOff val="60000"/>
+            </a:schemeClr>
+          </a:solidFill>
+        </p:spPr>
+        <p:style>
+          <a:lnRef idx="2">
+            <a:schemeClr val="accent1">
+              <a:shade val="50000"/>
+            </a:schemeClr>
+          </a:lnRef>
+          <a:fillRef idx="1">
+            <a:schemeClr val="accent1"/>
+          </a:fillRef>
+          <a:effectRef idx="0">
+            <a:schemeClr val="accent1"/>
+          </a:effectRef>
+          <a:fontRef idx="minor">
+            <a:schemeClr val="lt1"/>
+          </a:fontRef>
+        </p:style>
+        <p:txBody>
+          <a:bodyPr rtlCol="0" anchor="ctr"/>
+          <a:lstStyle/>
+          <a:p>
+            <a:pPr algn="ctr"/>
+            <a:endParaRPr lang="en-US"/>
+          </a:p>
+        </p:txBody>
+      </p:sp>
+      <p:sp>
+        <p:nvSpPr>
+          <p:cNvPr id="36" name="TextBox 35"/>
+          <p:cNvSpPr txBox="1"/>
+          <p:nvPr/>
+        </p:nvSpPr>
+        <p:spPr>
+          <a:xfrm>
+            <a:off x="565163" y="6001673"/>
+            <a:ext cx="2101857" cy="369332"/>
+          </a:xfrm>
+          <a:prstGeom prst="rect">
+            <a:avLst/>
+          </a:prstGeom>
+          <a:noFill/>
+        </p:spPr>
+        <p:txBody>
+          <a:bodyPr wrap="none" rtlCol="0">
+            <a:spAutoFit/>
+          </a:bodyPr>
+          <a:lstStyle/>
+          <a:p>
+            <a:r>
+              <a:rPr lang="en-US" b="1" smtClean="0">
+                <a:solidFill>
+                  <a:srgbClr val="FF0000"/>
+                </a:solidFill>
+              </a:rPr>
+              <a:t>Đơn hàng công ty</a:t>
+            </a:r>
+            <a:endParaRPr lang="en-US" b="1">
+              <a:solidFill>
+                <a:srgbClr val="FF0000"/>
+              </a:solidFill>
+            </a:endParaRPr>
+          </a:p>
+        </p:txBody>
+      </p:sp>
+      <p:sp>
+        <p:nvSpPr>
+          <p:cNvPr id="38" name="TextBox 37"/>
+          <p:cNvSpPr txBox="1"/>
+          <p:nvPr/>
+        </p:nvSpPr>
+        <p:spPr>
+          <a:xfrm>
+            <a:off x="3431205" y="2039036"/>
+            <a:ext cx="706756" cy="369332"/>
+          </a:xfrm>
+          <a:prstGeom prst="rect">
+            <a:avLst/>
+          </a:prstGeom>
+          <a:noFill/>
+        </p:spPr>
+        <p:txBody>
+          <a:bodyPr wrap="square" rtlCol="0">
+            <a:spAutoFit/>
+          </a:bodyPr>
+          <a:lstStyle/>
+          <a:p>
+            <a:r>
+              <a:rPr lang="en-US" b="1" smtClean="0">
+                <a:solidFill>
+                  <a:srgbClr val="00B050"/>
+                </a:solidFill>
+              </a:rPr>
+              <a:t>Dệt</a:t>
+            </a:r>
+            <a:endParaRPr lang="en-US" b="1">
+              <a:solidFill>
+                <a:srgbClr val="00B050"/>
+              </a:solidFill>
+            </a:endParaRPr>
+          </a:p>
+        </p:txBody>
+      </p:sp>
+      <p:sp>
+        <p:nvSpPr>
+          <p:cNvPr id="39" name="Up Arrow 38"/>
+          <p:cNvSpPr/>
+          <p:nvPr/>
+        </p:nvSpPr>
+        <p:spPr>
+          <a:xfrm>
+            <a:off x="3542280" y="2408368"/>
+            <a:ext cx="242303" cy="729545"/>
+          </a:xfrm>
+          <a:prstGeom prst="upArrow">
+            <a:avLst/>
+          </a:prstGeom>
+          <a:solidFill>
+            <a:schemeClr val="accent6">
+              <a:lumMod val="40000"/>
+              <a:lumOff val="60000"/>
+            </a:schemeClr>
+          </a:solidFill>
+        </p:spPr>
+        <p:style>
+          <a:lnRef idx="2">
+            <a:schemeClr val="accent1">
+              <a:shade val="50000"/>
+            </a:schemeClr>
+          </a:lnRef>
+          <a:fillRef idx="1">
+            <a:schemeClr val="accent1"/>
+          </a:fillRef>
+          <a:effectRef idx="0">
+            <a:schemeClr val="accent1"/>
+          </a:effectRef>
+          <a:fontRef idx="minor">
+            <a:schemeClr val="lt1"/>
+          </a:fontRef>
+        </p:style>
+        <p:txBody>
+          <a:bodyPr rtlCol="0" anchor="ctr"/>
+          <a:lstStyle/>
+          <a:p>
+            <a:pPr algn="ctr"/>
+            <a:endParaRPr lang="en-US"/>
+          </a:p>
+        </p:txBody>
+      </p:sp>
+      <p:sp>
+        <p:nvSpPr>
+          <p:cNvPr id="40" name="TextBox 39"/>
+          <p:cNvSpPr txBox="1"/>
+          <p:nvPr/>
+        </p:nvSpPr>
+        <p:spPr>
+          <a:xfrm>
+            <a:off x="5343354" y="2496908"/>
+            <a:ext cx="1293926" cy="369332"/>
+          </a:xfrm>
+          <a:prstGeom prst="rect">
+            <a:avLst/>
+          </a:prstGeom>
+          <a:noFill/>
+        </p:spPr>
+        <p:txBody>
+          <a:bodyPr wrap="square" rtlCol="0">
+            <a:spAutoFit/>
+          </a:bodyPr>
+          <a:lstStyle/>
+          <a:p>
+            <a:r>
+              <a:rPr lang="en-US" b="1" smtClean="0">
+                <a:solidFill>
+                  <a:srgbClr val="00B050"/>
+                </a:solidFill>
+              </a:rPr>
+              <a:t>Cây mộc</a:t>
+            </a:r>
+            <a:endParaRPr lang="en-US" b="1">
+              <a:solidFill>
+                <a:srgbClr val="00B050"/>
+              </a:solidFill>
+            </a:endParaRPr>
+          </a:p>
+        </p:txBody>
+      </p:sp>
+      <p:sp>
+        <p:nvSpPr>
+          <p:cNvPr id="41" name="Right Arrow 40"/>
+          <p:cNvSpPr/>
+          <p:nvPr/>
+        </p:nvSpPr>
+        <p:spPr>
+          <a:xfrm>
+            <a:off x="4269518" y="2088034"/>
+            <a:ext cx="883725" cy="255876"/>
+          </a:xfrm>
+          <a:prstGeom prst="rightArrow">
+            <a:avLst/>
+          </a:prstGeom>
+          <a:solidFill>
+            <a:schemeClr val="accent6">
+              <a:lumMod val="40000"/>
+              <a:lumOff val="60000"/>
+            </a:schemeClr>
+          </a:solidFill>
+        </p:spPr>
+        <p:style>
+          <a:lnRef idx="2">
+            <a:schemeClr val="accent1">
+              <a:shade val="50000"/>
+            </a:schemeClr>
+          </a:lnRef>
+          <a:fillRef idx="1">
+            <a:schemeClr val="accent1"/>
+          </a:fillRef>
+          <a:effectRef idx="0">
+            <a:schemeClr val="accent1"/>
+          </a:effectRef>
+          <a:fontRef idx="minor">
+            <a:schemeClr val="lt1"/>
+          </a:fontRef>
+        </p:style>
+        <p:txBody>
+          <a:bodyPr rtlCol="0" anchor="ctr"/>
+          <a:lstStyle/>
+          <a:p>
+            <a:pPr algn="ctr"/>
+            <a:endParaRPr lang="en-US"/>
+          </a:p>
+        </p:txBody>
+      </p:sp>
+      <p:sp>
+        <p:nvSpPr>
+          <p:cNvPr id="42" name="Down Arrow 41"/>
+          <p:cNvSpPr/>
+          <p:nvPr/>
+        </p:nvSpPr>
+        <p:spPr>
+          <a:xfrm>
+            <a:off x="5765611" y="2896931"/>
+            <a:ext cx="283966" cy="440027"/>
+          </a:xfrm>
+          <a:prstGeom prst="downArrow">
+            <a:avLst/>
+          </a:prstGeom>
+          <a:solidFill>
+            <a:schemeClr val="accent6">
+              <a:lumMod val="40000"/>
+              <a:lumOff val="60000"/>
+            </a:schemeClr>
+          </a:solidFill>
+        </p:spPr>
+        <p:style>
+          <a:lnRef idx="2">
+            <a:schemeClr val="accent1">
+              <a:shade val="50000"/>
+            </a:schemeClr>
+          </a:lnRef>
+          <a:fillRef idx="1">
+            <a:schemeClr val="accent1"/>
+          </a:fillRef>
+          <a:effectRef idx="0">
+            <a:schemeClr val="accent1"/>
+          </a:effectRef>
+          <a:fontRef idx="minor">
+            <a:schemeClr val="lt1"/>
+          </a:fontRef>
+        </p:style>
+        <p:txBody>
+          <a:bodyPr rtlCol="0" anchor="ctr"/>
+          <a:lstStyle/>
+          <a:p>
+            <a:pPr algn="ctr"/>
+            <a:endParaRPr lang="en-US"/>
+          </a:p>
+        </p:txBody>
+      </p:sp>
+      <p:sp>
+        <p:nvSpPr>
+          <p:cNvPr id="44" name="TextBox 43"/>
+          <p:cNvSpPr txBox="1"/>
+          <p:nvPr/>
+        </p:nvSpPr>
+        <p:spPr>
+          <a:xfrm>
+            <a:off x="5360586" y="4402628"/>
+            <a:ext cx="1457242" cy="369332"/>
+          </a:xfrm>
+          <a:prstGeom prst="rect">
+            <a:avLst/>
+          </a:prstGeom>
+          <a:noFill/>
+        </p:spPr>
+        <p:txBody>
+          <a:bodyPr wrap="square" rtlCol="0">
+            <a:spAutoFit/>
+          </a:bodyPr>
+          <a:lstStyle/>
+          <a:p>
+            <a:r>
+              <a:rPr lang="en-US" b="1" smtClean="0">
+                <a:solidFill>
+                  <a:schemeClr val="accent2"/>
+                </a:solidFill>
+              </a:rPr>
+              <a:t>Kho mộc</a:t>
+            </a:r>
+            <a:endParaRPr lang="en-US" b="1">
+              <a:solidFill>
+                <a:schemeClr val="accent2"/>
+              </a:solidFill>
+            </a:endParaRPr>
+          </a:p>
+        </p:txBody>
+      </p:sp>
+      <p:sp>
+        <p:nvSpPr>
+          <p:cNvPr id="48" name="TextBox 47"/>
+          <p:cNvSpPr txBox="1"/>
+          <p:nvPr/>
+        </p:nvSpPr>
+        <p:spPr>
+          <a:xfrm>
+            <a:off x="7584347" y="6488668"/>
+            <a:ext cx="2033508" cy="369332"/>
+          </a:xfrm>
+          <a:prstGeom prst="rect">
+            <a:avLst/>
+          </a:prstGeom>
+          <a:noFill/>
+        </p:spPr>
+        <p:txBody>
+          <a:bodyPr wrap="square" rtlCol="0">
+            <a:spAutoFit/>
+          </a:bodyPr>
+          <a:lstStyle/>
+          <a:p>
+            <a:r>
+              <a:rPr lang="en-US" b="1" smtClean="0">
+                <a:solidFill>
+                  <a:srgbClr val="00B050"/>
+                </a:solidFill>
+              </a:rPr>
+              <a:t>Vải thành phẩm</a:t>
+            </a:r>
+            <a:endParaRPr lang="en-US" b="1">
+              <a:solidFill>
+                <a:srgbClr val="00B050"/>
+              </a:solidFill>
+            </a:endParaRPr>
+          </a:p>
+        </p:txBody>
+      </p:sp>
+      <p:sp>
+        <p:nvSpPr>
+          <p:cNvPr id="51" name="TextBox 50"/>
+          <p:cNvSpPr txBox="1"/>
+          <p:nvPr/>
+        </p:nvSpPr>
+        <p:spPr>
+          <a:xfrm>
+            <a:off x="7401324" y="2324694"/>
+            <a:ext cx="2542684" cy="369332"/>
+          </a:xfrm>
+          <a:prstGeom prst="rect">
+            <a:avLst/>
+          </a:prstGeom>
+          <a:noFill/>
+        </p:spPr>
+        <p:txBody>
+          <a:bodyPr wrap="none" rtlCol="0">
+            <a:spAutoFit/>
+          </a:bodyPr>
+          <a:lstStyle/>
+          <a:p>
+            <a:r>
+              <a:rPr lang="en-US" b="1" smtClean="0">
+                <a:solidFill>
+                  <a:srgbClr val="FF0000"/>
+                </a:solidFill>
+              </a:rPr>
+              <a:t>Đơn hàng khách hàng</a:t>
+            </a:r>
+            <a:endParaRPr lang="en-US" b="1">
+              <a:solidFill>
+                <a:srgbClr val="FF0000"/>
+              </a:solidFill>
+            </a:endParaRPr>
+          </a:p>
+        </p:txBody>
+      </p:sp>
+      <p:sp>
+        <p:nvSpPr>
+          <p:cNvPr id="52" name="Right Arrow 51"/>
+          <p:cNvSpPr/>
+          <p:nvPr/>
+        </p:nvSpPr>
+        <p:spPr>
+          <a:xfrm>
+            <a:off x="9115730" y="1688053"/>
+            <a:ext cx="1269242" cy="219069"/>
+          </a:xfrm>
+          <a:prstGeom prst="rightArrow">
+            <a:avLst/>
+          </a:prstGeom>
+          <a:solidFill>
+            <a:schemeClr val="accent6">
+              <a:lumMod val="40000"/>
+              <a:lumOff val="60000"/>
+            </a:schemeClr>
+          </a:solidFill>
+        </p:spPr>
+        <p:style>
+          <a:lnRef idx="2">
+            <a:schemeClr val="accent1">
+              <a:shade val="50000"/>
+            </a:schemeClr>
+          </a:lnRef>
+          <a:fillRef idx="1">
+            <a:schemeClr val="accent1"/>
+          </a:fillRef>
+          <a:effectRef idx="0">
+            <a:schemeClr val="accent1"/>
+          </a:effectRef>
+          <a:fontRef idx="minor">
+            <a:schemeClr val="lt1"/>
+          </a:fontRef>
+        </p:style>
+        <p:txBody>
+          <a:bodyPr rtlCol="0" anchor="ctr"/>
+          <a:lstStyle/>
+          <a:p>
+            <a:pPr algn="ctr"/>
+            <a:endParaRPr lang="en-US"/>
+          </a:p>
+        </p:txBody>
+      </p:sp>
+      <p:sp>
+        <p:nvSpPr>
+          <p:cNvPr id="54" name="Down Arrow 53"/>
+          <p:cNvSpPr/>
+          <p:nvPr/>
+        </p:nvSpPr>
+        <p:spPr>
+          <a:xfrm>
+            <a:off x="11189246" y="2003651"/>
+            <a:ext cx="266879" cy="1252449"/>
+          </a:xfrm>
+          <a:prstGeom prst="downArrow">
+            <a:avLst/>
+          </a:prstGeom>
+          <a:solidFill>
+            <a:schemeClr val="accent6">
+              <a:lumMod val="40000"/>
+              <a:lumOff val="60000"/>
+            </a:schemeClr>
+          </a:solidFill>
+        </p:spPr>
+        <p:style>
+          <a:lnRef idx="2">
+            <a:schemeClr val="accent1">
+              <a:shade val="50000"/>
+            </a:schemeClr>
+          </a:lnRef>
+          <a:fillRef idx="1">
+            <a:schemeClr val="accent1"/>
+          </a:fillRef>
+          <a:effectRef idx="0">
+            <a:schemeClr val="accent1"/>
+          </a:effectRef>
+          <a:fontRef idx="minor">
+            <a:schemeClr val="lt1"/>
+          </a:fontRef>
+        </p:style>
+        <p:txBody>
+          <a:bodyPr rtlCol="0" anchor="ctr"/>
+          <a:lstStyle/>
+          <a:p>
+            <a:pPr algn="ctr"/>
+            <a:endParaRPr lang="en-US"/>
+          </a:p>
+        </p:txBody>
+      </p:sp>
+      <p:pic>
+        <p:nvPicPr>
+          <p:cNvPr id="55" name="Picture 54"/>
+          <p:cNvPicPr>
+            <a:picLocks noChangeAspect="1"/>
+          </p:cNvPicPr>
+          <p:nvPr/>
+        </p:nvPicPr>
+        <p:blipFill>
+          <a:blip r:embed="rId3">
+            <a:extLst>
+              <a:ext uri="{28A0092B-C50C-407E-A947-70E740481C1C}">
+                <a14:useLocalDpi xmlns:a14="http://schemas.microsoft.com/office/drawing/2010/main" val="0"/>
+              </a:ext>
+            </a:extLst>
+          </a:blip>
+          <a:stretch>
+            <a:fillRect/>
+          </a:stretch>
+        </p:blipFill>
+        <p:spPr>
+          <a:xfrm>
+            <a:off x="760048" y="2706387"/>
+            <a:ext cx="1214455" cy="1214455"/>
+          </a:xfrm>
+          <a:prstGeom prst="rect">
+            <a:avLst/>
+          </a:prstGeom>
+        </p:spPr>
+      </p:pic>
+      <p:sp>
+        <p:nvSpPr>
+          <p:cNvPr id="56" name="TextBox 55"/>
+          <p:cNvSpPr txBox="1"/>
+          <p:nvPr/>
+        </p:nvSpPr>
+        <p:spPr>
+          <a:xfrm>
+            <a:off x="603177" y="3946968"/>
+            <a:ext cx="1772671" cy="369332"/>
+          </a:xfrm>
+          <a:prstGeom prst="rect">
+            <a:avLst/>
+          </a:prstGeom>
+          <a:noFill/>
+        </p:spPr>
+        <p:txBody>
+          <a:bodyPr wrap="square" rtlCol="0">
+            <a:spAutoFit/>
+          </a:bodyPr>
+          <a:lstStyle/>
+          <a:p>
+            <a:r>
+              <a:rPr lang="en-US" b="1" smtClean="0">
+                <a:solidFill>
+                  <a:schemeClr val="accent2"/>
+                </a:solidFill>
+              </a:rPr>
+              <a:t>Nhà cung cấp</a:t>
+            </a:r>
+            <a:endParaRPr lang="en-US" b="1">
+              <a:solidFill>
+                <a:schemeClr val="accent2"/>
+              </a:solidFill>
+            </a:endParaRPr>
+          </a:p>
+        </p:txBody>
+      </p:sp>
+      <p:pic>
+        <p:nvPicPr>
+          <p:cNvPr id="57" name="Picture 56"/>
+          <p:cNvPicPr>
+            <a:picLocks noChangeAspect="1"/>
+          </p:cNvPicPr>
+          <p:nvPr/>
+        </p:nvPicPr>
+        <p:blipFill>
+          <a:blip r:embed="rId4">
+            <a:extLst>
+              <a:ext uri="{28A0092B-C50C-407E-A947-70E740481C1C}">
+                <a14:useLocalDpi xmlns:a14="http://schemas.microsoft.com/office/drawing/2010/main" val="0"/>
+              </a:ext>
+            </a:extLst>
+          </a:blip>
+          <a:stretch>
+            <a:fillRect/>
+          </a:stretch>
+        </p:blipFill>
+        <p:spPr>
+          <a:xfrm>
+            <a:off x="857398" y="5079281"/>
+            <a:ext cx="956952" cy="956952"/>
+          </a:xfrm>
+          <a:prstGeom prst="rect">
+            <a:avLst/>
+          </a:prstGeom>
+        </p:spPr>
+      </p:pic>
+      <p:sp>
+        <p:nvSpPr>
+          <p:cNvPr id="58" name="TextBox 57"/>
+          <p:cNvSpPr txBox="1"/>
+          <p:nvPr/>
+        </p:nvSpPr>
+        <p:spPr>
+          <a:xfrm>
+            <a:off x="3095997" y="5496567"/>
+            <a:ext cx="1827005" cy="369332"/>
+          </a:xfrm>
+          <a:prstGeom prst="rect">
+            <a:avLst/>
+          </a:prstGeom>
+          <a:noFill/>
+        </p:spPr>
+        <p:txBody>
+          <a:bodyPr wrap="square" rtlCol="0">
+            <a:spAutoFit/>
+          </a:bodyPr>
+          <a:lstStyle/>
+          <a:p>
+            <a:r>
+              <a:rPr lang="en-US" b="1" smtClean="0">
+                <a:solidFill>
+                  <a:srgbClr val="FF0000"/>
+                </a:solidFill>
+              </a:rPr>
+              <a:t>Hóa đơn nhập</a:t>
+            </a:r>
+            <a:endParaRPr lang="en-US" b="1">
+              <a:solidFill>
+                <a:srgbClr val="FF0000"/>
+              </a:solidFill>
+            </a:endParaRPr>
+          </a:p>
+        </p:txBody>
+      </p:sp>
+      <p:pic>
+        <p:nvPicPr>
+          <p:cNvPr id="59" name="Picture 58"/>
+          <p:cNvPicPr>
+            <a:picLocks noChangeAspect="1"/>
+          </p:cNvPicPr>
+          <p:nvPr/>
+        </p:nvPicPr>
+        <p:blipFill rotWithShape="1">
+          <a:blip r:embed="rId5">
+            <a:extLst>
+              <a:ext uri="{28A0092B-C50C-407E-A947-70E740481C1C}">
+                <a14:useLocalDpi xmlns:a14="http://schemas.microsoft.com/office/drawing/2010/main" val="0"/>
+              </a:ext>
+            </a:extLst>
+          </a:blip>
+          <a:srcRect l="15674" t="10620" r="15608" b="9638"/>
+          <a:stretch/>
+        </p:blipFill>
+        <p:spPr>
+          <a:xfrm>
+            <a:off x="3058832" y="3256100"/>
+            <a:ext cx="1341846" cy="1123406"/>
+          </a:xfrm>
+          <a:prstGeom prst="rect">
+            <a:avLst/>
+          </a:prstGeom>
+        </p:spPr>
+      </p:pic>
+      <p:sp>
+        <p:nvSpPr>
+          <p:cNvPr id="60" name="TextBox 59"/>
+          <p:cNvSpPr txBox="1"/>
+          <p:nvPr/>
+        </p:nvSpPr>
+        <p:spPr>
+          <a:xfrm>
+            <a:off x="3182067" y="4403410"/>
+            <a:ext cx="1238818" cy="369332"/>
+          </a:xfrm>
+          <a:prstGeom prst="rect">
+            <a:avLst/>
+          </a:prstGeom>
+          <a:noFill/>
+        </p:spPr>
+        <p:txBody>
+          <a:bodyPr wrap="square" rtlCol="0">
+            <a:spAutoFit/>
+          </a:bodyPr>
+          <a:lstStyle/>
+          <a:p>
+            <a:r>
+              <a:rPr lang="en-US" b="1" smtClean="0">
+                <a:solidFill>
+                  <a:schemeClr val="accent2"/>
+                </a:solidFill>
+              </a:rPr>
+              <a:t>Kho sợi</a:t>
+            </a:r>
+            <a:endParaRPr lang="en-US" b="1">
+              <a:solidFill>
+                <a:schemeClr val="accent2"/>
+              </a:solidFill>
+            </a:endParaRPr>
+          </a:p>
+        </p:txBody>
+      </p:sp>
+      <p:pic>
+        <p:nvPicPr>
+          <p:cNvPr id="61" name="Picture 60"/>
+          <p:cNvPicPr>
+            <a:picLocks noChangeAspect="1"/>
+          </p:cNvPicPr>
+          <p:nvPr/>
+        </p:nvPicPr>
+        <p:blipFill>
+          <a:blip r:embed="rId6">
+            <a:extLst>
+              <a:ext uri="{28A0092B-C50C-407E-A947-70E740481C1C}">
+                <a14:useLocalDpi xmlns:a14="http://schemas.microsoft.com/office/drawing/2010/main" val="0"/>
+              </a:ext>
+            </a:extLst>
+          </a:blip>
+          <a:stretch>
+            <a:fillRect/>
+          </a:stretch>
+        </p:blipFill>
+        <p:spPr>
+          <a:xfrm>
+            <a:off x="5280671" y="1595903"/>
+            <a:ext cx="1306507" cy="950187"/>
+          </a:xfrm>
+          <a:prstGeom prst="rect">
+            <a:avLst/>
+          </a:prstGeom>
+        </p:spPr>
+      </p:pic>
+      <p:pic>
+        <p:nvPicPr>
+          <p:cNvPr id="62" name="Picture 61"/>
+          <p:cNvPicPr>
+            <a:picLocks noChangeAspect="1"/>
+          </p:cNvPicPr>
+          <p:nvPr/>
+        </p:nvPicPr>
+        <p:blipFill>
+          <a:blip r:embed="rId7">
+            <a:extLst>
+              <a:ext uri="{28A0092B-C50C-407E-A947-70E740481C1C}">
+                <a14:useLocalDpi xmlns:a14="http://schemas.microsoft.com/office/drawing/2010/main" val="0"/>
+              </a:ext>
+            </a:extLst>
+          </a:blip>
+          <a:stretch>
+            <a:fillRect/>
+          </a:stretch>
+        </p:blipFill>
+        <p:spPr>
+          <a:xfrm>
+            <a:off x="5244568" y="3437095"/>
+            <a:ext cx="1474406" cy="966315"/>
+          </a:xfrm>
+          <a:prstGeom prst="rect">
+            <a:avLst/>
+          </a:prstGeom>
+        </p:spPr>
+      </p:pic>
+      <p:sp>
+        <p:nvSpPr>
+          <p:cNvPr id="63" name="TextBox 62"/>
+          <p:cNvSpPr txBox="1"/>
+          <p:nvPr/>
+        </p:nvSpPr>
+        <p:spPr>
+          <a:xfrm>
+            <a:off x="5447131" y="5278003"/>
+            <a:ext cx="992857" cy="369332"/>
+          </a:xfrm>
+          <a:prstGeom prst="rect">
+            <a:avLst/>
+          </a:prstGeom>
+          <a:noFill/>
+        </p:spPr>
+        <p:txBody>
+          <a:bodyPr wrap="square" rtlCol="0">
+            <a:spAutoFit/>
+          </a:bodyPr>
+          <a:lstStyle/>
+          <a:p>
+            <a:r>
+              <a:rPr lang="en-US" b="1" smtClean="0">
+                <a:solidFill>
+                  <a:srgbClr val="00B050"/>
+                </a:solidFill>
+              </a:rPr>
+              <a:t>Nhuộm</a:t>
+            </a:r>
+            <a:endParaRPr lang="en-US" b="1">
+              <a:solidFill>
+                <a:srgbClr val="00B050"/>
+              </a:solidFill>
+            </a:endParaRPr>
+          </a:p>
+        </p:txBody>
+      </p:sp>
+      <p:sp>
+        <p:nvSpPr>
+          <p:cNvPr id="64" name="TextBox 63"/>
+          <p:cNvSpPr txBox="1"/>
+          <p:nvPr/>
+        </p:nvSpPr>
+        <p:spPr>
+          <a:xfrm>
+            <a:off x="5368537" y="6121120"/>
+            <a:ext cx="1150043" cy="369332"/>
+          </a:xfrm>
+          <a:prstGeom prst="rect">
+            <a:avLst/>
+          </a:prstGeom>
+          <a:noFill/>
+        </p:spPr>
+        <p:txBody>
+          <a:bodyPr wrap="square" rtlCol="0">
+            <a:spAutoFit/>
+          </a:bodyPr>
+          <a:lstStyle/>
+          <a:p>
+            <a:r>
+              <a:rPr lang="en-US" b="1" smtClean="0">
+                <a:solidFill>
+                  <a:srgbClr val="00B050"/>
+                </a:solidFill>
+              </a:rPr>
+              <a:t>Căng vải</a:t>
+            </a:r>
+            <a:endParaRPr lang="en-US" b="1">
+              <a:solidFill>
+                <a:srgbClr val="00B050"/>
+              </a:solidFill>
+            </a:endParaRPr>
+          </a:p>
+        </p:txBody>
+      </p:sp>
+      <p:sp>
+        <p:nvSpPr>
+          <p:cNvPr id="65" name="Down Arrow 64"/>
+          <p:cNvSpPr/>
+          <p:nvPr/>
+        </p:nvSpPr>
+        <p:spPr>
+          <a:xfrm>
+            <a:off x="5792205" y="4743386"/>
+            <a:ext cx="202248" cy="551029"/>
+          </a:xfrm>
+          <a:prstGeom prst="downArrow">
+            <a:avLst/>
+          </a:prstGeom>
+          <a:solidFill>
+            <a:schemeClr val="accent6">
+              <a:lumMod val="40000"/>
+              <a:lumOff val="60000"/>
+            </a:schemeClr>
+          </a:solidFill>
+        </p:spPr>
+        <p:style>
+          <a:lnRef idx="2">
+            <a:schemeClr val="accent1">
+              <a:shade val="50000"/>
+            </a:schemeClr>
+          </a:lnRef>
+          <a:fillRef idx="1">
+            <a:schemeClr val="accent1"/>
+          </a:fillRef>
+          <a:effectRef idx="0">
+            <a:schemeClr val="accent1"/>
+          </a:effectRef>
+          <a:fontRef idx="minor">
+            <a:schemeClr val="lt1"/>
+          </a:fontRef>
+        </p:style>
+        <p:txBody>
+          <a:bodyPr rtlCol="0" anchor="ctr"/>
+          <a:lstStyle/>
+          <a:p>
+            <a:pPr algn="ctr"/>
+            <a:endParaRPr lang="en-US"/>
+          </a:p>
+        </p:txBody>
+      </p:sp>
+      <p:sp>
+        <p:nvSpPr>
+          <p:cNvPr id="66" name="Down Arrow 65"/>
+          <p:cNvSpPr/>
+          <p:nvPr/>
+        </p:nvSpPr>
+        <p:spPr>
+          <a:xfrm>
+            <a:off x="5779523" y="5621973"/>
+            <a:ext cx="214930" cy="551029"/>
+          </a:xfrm>
+          <a:prstGeom prst="downArrow">
+            <a:avLst/>
+          </a:prstGeom>
+          <a:solidFill>
+            <a:schemeClr val="accent6">
+              <a:lumMod val="40000"/>
+              <a:lumOff val="60000"/>
+            </a:schemeClr>
+          </a:solidFill>
+        </p:spPr>
+        <p:style>
+          <a:lnRef idx="2">
+            <a:schemeClr val="accent1">
+              <a:shade val="50000"/>
+            </a:schemeClr>
+          </a:lnRef>
+          <a:fillRef idx="1">
+            <a:schemeClr val="accent1"/>
+          </a:fillRef>
+          <a:effectRef idx="0">
+            <a:schemeClr val="accent1"/>
+          </a:effectRef>
+          <a:fontRef idx="minor">
+            <a:schemeClr val="lt1"/>
+          </a:fontRef>
+        </p:style>
+        <p:txBody>
+          <a:bodyPr rtlCol="0" anchor="ctr"/>
+          <a:lstStyle/>
+          <a:p>
+            <a:pPr algn="ctr"/>
+            <a:endParaRPr lang="en-US"/>
+          </a:p>
+        </p:txBody>
+      </p:sp>
+      <p:pic>
+        <p:nvPicPr>
+          <p:cNvPr id="67" name="Picture 66"/>
+          <p:cNvPicPr>
+            <a:picLocks noChangeAspect="1"/>
+          </p:cNvPicPr>
+          <p:nvPr/>
+        </p:nvPicPr>
+        <p:blipFill>
+          <a:blip r:embed="rId8">
+            <a:extLst>
+              <a:ext uri="{28A0092B-C50C-407E-A947-70E740481C1C}">
+                <a14:useLocalDpi xmlns:a14="http://schemas.microsoft.com/office/drawing/2010/main" val="0"/>
+              </a:ext>
+            </a:extLst>
+          </a:blip>
+          <a:stretch>
+            <a:fillRect/>
+          </a:stretch>
+        </p:blipFill>
+        <p:spPr>
+          <a:xfrm>
+            <a:off x="7683386" y="5500074"/>
+            <a:ext cx="1667476" cy="1001664"/>
+          </a:xfrm>
+          <a:prstGeom prst="rect">
+            <a:avLst/>
+          </a:prstGeom>
+        </p:spPr>
+      </p:pic>
+      <p:sp>
+        <p:nvSpPr>
+          <p:cNvPr id="68" name="Right Arrow 67"/>
+          <p:cNvSpPr/>
+          <p:nvPr/>
+        </p:nvSpPr>
+        <p:spPr>
+          <a:xfrm>
+            <a:off x="6511379" y="6182309"/>
+            <a:ext cx="785187" cy="246954"/>
+          </a:xfrm>
+          <a:prstGeom prst="rightArrow">
+            <a:avLst/>
+          </a:prstGeom>
+          <a:solidFill>
+            <a:schemeClr val="accent6">
+              <a:lumMod val="40000"/>
+              <a:lumOff val="60000"/>
+            </a:schemeClr>
+          </a:solidFill>
+        </p:spPr>
+        <p:style>
+          <a:lnRef idx="2">
+            <a:schemeClr val="accent1">
+              <a:shade val="50000"/>
+            </a:schemeClr>
+          </a:lnRef>
+          <a:fillRef idx="1">
+            <a:schemeClr val="accent1"/>
+          </a:fillRef>
+          <a:effectRef idx="0">
+            <a:schemeClr val="accent1"/>
+          </a:effectRef>
+          <a:fontRef idx="minor">
+            <a:schemeClr val="lt1"/>
+          </a:fontRef>
+        </p:style>
+        <p:txBody>
+          <a:bodyPr rtlCol="0" anchor="ctr"/>
+          <a:lstStyle/>
+          <a:p>
+            <a:pPr algn="ctr"/>
+            <a:endParaRPr lang="en-US"/>
+          </a:p>
+        </p:txBody>
+      </p:sp>
+      <p:pic>
+        <p:nvPicPr>
+          <p:cNvPr id="69" name="Picture 68"/>
+          <p:cNvPicPr>
+            <a:picLocks noChangeAspect="1"/>
+          </p:cNvPicPr>
+          <p:nvPr/>
+        </p:nvPicPr>
+        <p:blipFill rotWithShape="1">
+          <a:blip r:embed="rId9">
+            <a:extLst>
+              <a:ext uri="{28A0092B-C50C-407E-A947-70E740481C1C}">
+                <a14:useLocalDpi xmlns:a14="http://schemas.microsoft.com/office/drawing/2010/main" val="0"/>
+              </a:ext>
+            </a:extLst>
+          </a:blip>
+          <a:srcRect t="22730"/>
+          <a:stretch/>
+        </p:blipFill>
+        <p:spPr>
+          <a:xfrm>
+            <a:off x="7726616" y="3492883"/>
+            <a:ext cx="1748970" cy="924892"/>
+          </a:xfrm>
+          <a:prstGeom prst="rect">
+            <a:avLst/>
+          </a:prstGeom>
+        </p:spPr>
+      </p:pic>
+      <p:sp>
+        <p:nvSpPr>
+          <p:cNvPr id="70" name="TextBox 69"/>
+          <p:cNvSpPr txBox="1"/>
+          <p:nvPr/>
+        </p:nvSpPr>
+        <p:spPr>
+          <a:xfrm>
+            <a:off x="7994470" y="4415186"/>
+            <a:ext cx="1356392" cy="369332"/>
+          </a:xfrm>
+          <a:prstGeom prst="rect">
+            <a:avLst/>
+          </a:prstGeom>
+          <a:noFill/>
+        </p:spPr>
+        <p:txBody>
+          <a:bodyPr wrap="square" rtlCol="0">
+            <a:spAutoFit/>
+          </a:bodyPr>
+          <a:lstStyle/>
+          <a:p>
+            <a:r>
+              <a:rPr lang="en-US" b="1" smtClean="0">
+                <a:solidFill>
+                  <a:schemeClr val="accent2"/>
+                </a:solidFill>
+              </a:rPr>
+              <a:t>Kho vải</a:t>
+            </a:r>
+          </a:p>
+        </p:txBody>
+      </p:sp>
+      <p:sp>
+        <p:nvSpPr>
+          <p:cNvPr id="71" name="Up Arrow 70"/>
+          <p:cNvSpPr/>
+          <p:nvPr/>
+        </p:nvSpPr>
+        <p:spPr>
+          <a:xfrm>
+            <a:off x="8430363" y="4784518"/>
+            <a:ext cx="269502" cy="636641"/>
+          </a:xfrm>
+          <a:prstGeom prst="upArrow">
+            <a:avLst/>
+          </a:prstGeom>
+          <a:solidFill>
+            <a:schemeClr val="accent6">
+              <a:lumMod val="40000"/>
+              <a:lumOff val="60000"/>
+            </a:schemeClr>
+          </a:solidFill>
+        </p:spPr>
+        <p:style>
+          <a:lnRef idx="2">
+            <a:schemeClr val="accent1">
+              <a:shade val="50000"/>
+            </a:schemeClr>
+          </a:lnRef>
+          <a:fillRef idx="1">
+            <a:schemeClr val="accent1"/>
+          </a:fillRef>
+          <a:effectRef idx="0">
+            <a:schemeClr val="accent1"/>
+          </a:effectRef>
+          <a:fontRef idx="minor">
+            <a:schemeClr val="lt1"/>
+          </a:fontRef>
+        </p:style>
+        <p:txBody>
+          <a:bodyPr rtlCol="0" anchor="ctr"/>
+          <a:lstStyle/>
+          <a:p>
+            <a:pPr algn="ctr"/>
+            <a:endParaRPr lang="en-US"/>
+          </a:p>
+        </p:txBody>
+      </p:sp>
+      <p:sp>
+        <p:nvSpPr>
+          <p:cNvPr id="72" name="Up Arrow 71"/>
+          <p:cNvSpPr/>
+          <p:nvPr/>
+        </p:nvSpPr>
+        <p:spPr>
+          <a:xfrm>
+            <a:off x="8391973" y="2713272"/>
+            <a:ext cx="242303" cy="723823"/>
+          </a:xfrm>
+          <a:prstGeom prst="upArrow">
+            <a:avLst/>
+          </a:prstGeom>
+          <a:solidFill>
+            <a:schemeClr val="accent6">
+              <a:lumMod val="40000"/>
+              <a:lumOff val="60000"/>
+            </a:schemeClr>
+          </a:solidFill>
+        </p:spPr>
+        <p:style>
+          <a:lnRef idx="2">
+            <a:schemeClr val="accent1">
+              <a:shade val="50000"/>
+            </a:schemeClr>
+          </a:lnRef>
+          <a:fillRef idx="1">
+            <a:schemeClr val="accent1"/>
+          </a:fillRef>
+          <a:effectRef idx="0">
+            <a:schemeClr val="accent1"/>
+          </a:effectRef>
+          <a:fontRef idx="minor">
+            <a:schemeClr val="lt1"/>
+          </a:fontRef>
+        </p:style>
+        <p:txBody>
+          <a:bodyPr rtlCol="0" anchor="ctr"/>
+          <a:lstStyle/>
+          <a:p>
+            <a:pPr algn="ctr"/>
+            <a:endParaRPr lang="en-US"/>
+          </a:p>
+        </p:txBody>
+      </p:sp>
+      <p:sp>
+        <p:nvSpPr>
+          <p:cNvPr id="73" name="TextBox 72"/>
+          <p:cNvSpPr txBox="1"/>
+          <p:nvPr/>
+        </p:nvSpPr>
+        <p:spPr>
+          <a:xfrm>
+            <a:off x="10503907" y="1598878"/>
+            <a:ext cx="1694862" cy="369332"/>
+          </a:xfrm>
+          <a:prstGeom prst="rect">
+            <a:avLst/>
+          </a:prstGeom>
+          <a:noFill/>
+        </p:spPr>
+        <p:txBody>
+          <a:bodyPr wrap="square" rtlCol="0">
+            <a:spAutoFit/>
+          </a:bodyPr>
+          <a:lstStyle/>
+          <a:p>
+            <a:r>
+              <a:rPr lang="en-US" b="1" smtClean="0">
+                <a:solidFill>
+                  <a:srgbClr val="FF0000"/>
+                </a:solidFill>
+              </a:rPr>
+              <a:t>Hóa đơn xuất</a:t>
+            </a:r>
+            <a:endParaRPr lang="en-US" b="1">
+              <a:solidFill>
+                <a:srgbClr val="FF0000"/>
+              </a:solidFill>
+            </a:endParaRPr>
+          </a:p>
+        </p:txBody>
+      </p:sp>
+      <p:pic>
+        <p:nvPicPr>
+          <p:cNvPr id="74" name="Picture 73"/>
+          <p:cNvPicPr>
+            <a:picLocks noChangeAspect="1"/>
+          </p:cNvPicPr>
+          <p:nvPr/>
+        </p:nvPicPr>
+        <p:blipFill>
+          <a:blip r:embed="rId10">
+            <a:extLst>
+              <a:ext uri="{28A0092B-C50C-407E-A947-70E740481C1C}">
+                <a14:useLocalDpi xmlns:a14="http://schemas.microsoft.com/office/drawing/2010/main" val="0"/>
+              </a:ext>
+            </a:extLst>
+          </a:blip>
+          <a:stretch>
+            <a:fillRect/>
+          </a:stretch>
+        </p:blipFill>
+        <p:spPr>
+          <a:xfrm>
+            <a:off x="7874679" y="1111625"/>
+            <a:ext cx="1343839" cy="1343839"/>
+          </a:xfrm>
+          <a:prstGeom prst="rect">
+            <a:avLst/>
+          </a:prstGeom>
+        </p:spPr>
+      </p:pic>
+      <p:sp>
+        <p:nvSpPr>
+          <p:cNvPr id="76" name="TextBox 75"/>
+          <p:cNvSpPr txBox="1"/>
+          <p:nvPr/>
+        </p:nvSpPr>
+        <p:spPr>
+          <a:xfrm>
+            <a:off x="10543665" y="4649568"/>
+            <a:ext cx="1772671" cy="369332"/>
+          </a:xfrm>
+          <a:prstGeom prst="rect">
+            <a:avLst/>
+          </a:prstGeom>
+          <a:noFill/>
+        </p:spPr>
+        <p:txBody>
+          <a:bodyPr wrap="square" rtlCol="0">
+            <a:spAutoFit/>
+          </a:bodyPr>
+          <a:lstStyle/>
+          <a:p>
+            <a:r>
+              <a:rPr lang="en-US" b="1" smtClean="0">
+                <a:solidFill>
+                  <a:schemeClr val="accent2"/>
+                </a:solidFill>
+              </a:rPr>
+              <a:t>Khách hàng</a:t>
+            </a:r>
+            <a:endParaRPr lang="en-US" b="1">
+              <a:solidFill>
+                <a:schemeClr val="accent2"/>
+              </a:solidFill>
+            </a:endParaRPr>
+          </a:p>
+        </p:txBody>
+      </p:sp>
+      <p:pic>
+        <p:nvPicPr>
+          <p:cNvPr id="77" name="Picture 76"/>
+          <p:cNvPicPr>
+            <a:picLocks noChangeAspect="1"/>
+          </p:cNvPicPr>
+          <p:nvPr/>
+        </p:nvPicPr>
+        <p:blipFill>
+          <a:blip r:embed="rId11">
+            <a:extLst>
+              <a:ext uri="{28A0092B-C50C-407E-A947-70E740481C1C}">
+                <a14:useLocalDpi xmlns:a14="http://schemas.microsoft.com/office/drawing/2010/main" val="0"/>
+              </a:ext>
+            </a:extLst>
+          </a:blip>
+          <a:stretch>
+            <a:fillRect/>
+          </a:stretch>
+        </p:blipFill>
+        <p:spPr>
+          <a:xfrm>
+            <a:off x="10501039" y="3214481"/>
+            <a:ext cx="1589179" cy="1589179"/>
+          </a:xfrm>
+          <a:prstGeom prst="rect">
+            <a:avLst/>
+          </a:prstGeom>
+        </p:spPr>
+      </p:pic>
     </p:spTree>
     <p:extLst>
       <p:ext uri="{BB962C8B-B14F-4D97-AF65-F5344CB8AC3E}">
@@ -11868,6 +13503,13 @@
   <p:clrMapOvr>
     <a:masterClrMapping/>
   </p:clrMapOvr>
+  <p:timing>
+    <p:tnLst>
+      <p:par>
+        <p:cTn id="1" dur="indefinite" restart="never" nodeType="tmRoot"/>
+      </p:par>
+    </p:tnLst>
+  </p:timing>
 </p:sld>
 </file>
 
@@ -11926,6 +13568,97 @@
           <a:bodyPr/>
           <a:lstStyle/>
           <a:p>
+            <a:pPr lvl="0"/>
+            <a:r>
+              <a:rPr lang="en-US"/>
+              <a:t>Đọc hiểu nghiệp vụ sản xuất và bán hàng sẵn </a:t>
+            </a:r>
+            <a:r>
+              <a:rPr lang="en-US"/>
+              <a:t>có</a:t>
+            </a:r>
+            <a:r>
+              <a:rPr lang="en-US" smtClean="0"/>
+              <a:t>.</a:t>
+            </a:r>
+            <a:endParaRPr lang="en-US"/>
+          </a:p>
+          <a:p>
+            <a:pPr lvl="0"/>
+            <a:r>
+              <a:rPr lang="en-US"/>
+              <a:t>Dựa trên ứng dụng quản lý thông tin sẵn có của doanh nghiệp, </a:t>
+            </a:r>
+            <a:r>
+              <a:rPr lang="en-US">
+                <a:solidFill>
+                  <a:schemeClr val="tx1"/>
+                </a:solidFill>
+              </a:rPr>
+              <a:t>tích hợp thêm các chức năng </a:t>
+            </a:r>
+            <a:r>
+              <a:rPr lang="en-US"/>
+              <a:t>phục vụ cho quy trình </a:t>
+            </a:r>
+            <a:r>
+              <a:rPr lang="en-US" b="1" i="1"/>
+              <a:t>mua bán hàng hóa, quản lý công nợ, thống kê</a:t>
+            </a:r>
+            <a:r>
+              <a:rPr lang="en-US" b="1"/>
+              <a:t> </a:t>
+            </a:r>
+            <a:r>
+              <a:rPr lang="en-US"/>
+              <a:t>dữ liệu.</a:t>
+            </a:r>
+          </a:p>
+          <a:p>
+            <a:pPr lvl="0"/>
+            <a:r>
+              <a:rPr lang="en-US"/>
+              <a:t>Giải quyết một số ngoại lệ của </a:t>
+            </a:r>
+            <a:r>
+              <a:rPr lang="en-US"/>
+              <a:t>hệ </a:t>
+            </a:r>
+            <a:r>
+              <a:rPr lang="en-US" smtClean="0"/>
+              <a:t>thống.</a:t>
+            </a:r>
+            <a:endParaRPr lang="en-US"/>
+          </a:p>
+          <a:p>
+            <a:pPr lvl="0"/>
+            <a:r>
+              <a:rPr lang="en-US"/>
+              <a:t>Xây dựng ứng dụng </a:t>
+            </a:r>
+            <a:r>
+              <a:rPr lang="en-US"/>
+              <a:t>hoàn </a:t>
+            </a:r>
+            <a:r>
+              <a:rPr lang="en-US" smtClean="0"/>
+              <a:t>chỉnh.</a:t>
+            </a:r>
+            <a:endParaRPr lang="en-US"/>
+          </a:p>
+          <a:p>
+            <a:r>
+              <a:rPr lang="en-US"/>
+              <a:t>Đánh giá tính hiệu quả của </a:t>
+            </a:r>
+            <a:r>
+              <a:rPr lang="en-US"/>
+              <a:t>hệ </a:t>
+            </a:r>
+            <a:r>
+              <a:rPr lang="en-US" smtClean="0"/>
+              <a:t>thống.</a:t>
+            </a:r>
             <a:endParaRPr lang="en-US"/>
           </a:p>
         </p:txBody>
@@ -11940,6 +13673,13 @@
   <p:clrMapOvr>
     <a:masterClrMapping/>
   </p:clrMapOvr>
+  <p:timing>
+    <p:tnLst>
+      <p:par>
+        <p:cTn id="1" dur="indefinite" restart="never" nodeType="tmRoot"/>
+      </p:par>
+    </p:tnLst>
+  </p:timing>
 </p:sld>
 </file>
 
@@ -12012,6 +13752,13 @@
   <p:clrMapOvr>
     <a:masterClrMapping/>
   </p:clrMapOvr>
+  <p:timing>
+    <p:tnLst>
+      <p:par>
+        <p:cTn id="1" dur="indefinite" restart="never" nodeType="tmRoot"/>
+      </p:par>
+    </p:tnLst>
+  </p:timing>
 </p:sld>
 </file>
 

</xml_diff>

<commit_message>
update draft slide file
</commit_message>
<xml_diff>
--- a/docs/slide trình cô - bản 1.pptx
+++ b/docs/slide trình cô - bản 1.pptx
@@ -687,15 +687,7 @@
             </a:r>
             <a:r>
               <a:rPr lang="en-US" baseline="0" smtClean="0"/>
-              <a:t>: </a:t>
-            </a:r>
-            <a:r>
-              <a:rPr lang="en-US" baseline="0" smtClean="0"/>
-              <a:t>show </a:t>
-            </a:r>
-            <a:r>
-              <a:rPr lang="en-US" baseline="0" smtClean="0"/>
-              <a:t>flow chart.</a:t>
+              <a:t>: show flow chart.</a:t>
             </a:r>
           </a:p>
           <a:p>
@@ -816,8 +808,12 @@
               <a:t> </a:t>
             </a:r>
             <a:r>
+              <a:rPr lang="en-US" baseline="0" smtClean="0"/>
+              <a:t>luận </a:t>
+            </a:r>
+            <a:r>
               <a:rPr lang="en-US" baseline="0" err="1" smtClean="0"/>
-              <a:t>luân</a:t>
+              <a:t>văn</a:t>
             </a:r>
             <a:r>
               <a:rPr lang="en-US" baseline="0" smtClean="0"/>
@@ -825,7 +821,7 @@
             </a:r>
             <a:r>
               <a:rPr lang="en-US" baseline="0" err="1" smtClean="0"/>
-              <a:t>văn</a:t>
+              <a:t>lần</a:t>
             </a:r>
             <a:r>
               <a:rPr lang="en-US" baseline="0" smtClean="0"/>
@@ -833,14 +829,6 @@
             </a:r>
             <a:r>
               <a:rPr lang="en-US" baseline="0" err="1" smtClean="0"/>
-              <a:t>lần</a:t>
-            </a:r>
-            <a:r>
-              <a:rPr lang="en-US" baseline="0" smtClean="0"/>
-              <a:t> </a:t>
-            </a:r>
-            <a:r>
-              <a:rPr lang="en-US" baseline="0" err="1" smtClean="0"/>
               <a:t>này</a:t>
             </a:r>
             <a:r>
@@ -851,43 +839,14 @@
           <a:p>
             <a:r>
               <a:rPr lang="en-US" baseline="0" smtClean="0"/>
-              <a:t>4. </a:t>
-            </a:r>
+              <a:t>4. Công nghệ sử dụng: chỉ ra đã chọn lựa framework gì? Tại sao có rất nhiều framework nhưng lại lựa chọn nó mà không phải là những cái khác?</a:t>
+            </a:r>
+          </a:p>
+          <a:p>
             <a:r>
               <a:rPr lang="en-US" baseline="0" smtClean="0"/>
-              <a:t>Công nghệ sử dụng: </a:t>
-            </a:r>
-            <a:r>
-              <a:rPr lang="en-US" baseline="0" smtClean="0"/>
-              <a:t>chỉ ra đã chọn lựa framework gì? Tại sao có rất nhiều framework nhưng lại lựa chọn nó mà không phải là những cái khác?</a:t>
-            </a:r>
-          </a:p>
-          <a:p>
-            <a:r>
-              <a:rPr lang="en-US" baseline="0" smtClean="0"/>
-              <a:t>5. </a:t>
-            </a:r>
-            <a:r>
-              <a:rPr lang="en-US" baseline="0" smtClean="0"/>
-              <a:t>Thiết kế </a:t>
-            </a:r>
-            <a:r>
-              <a:rPr lang="en-US" baseline="0" smtClean="0"/>
-              <a:t>hệ thống: </a:t>
-            </a:r>
-            <a:r>
-              <a:rPr lang="en-US" baseline="0" smtClean="0"/>
-              <a:t>thiết </a:t>
-            </a:r>
-            <a:r>
-              <a:rPr lang="en-US" baseline="0" smtClean="0"/>
-              <a:t>kế </a:t>
-            </a:r>
-            <a:r>
-              <a:rPr lang="en-US" baseline="0" smtClean="0"/>
-              <a:t>ERD, kiến trúc</a:t>
-            </a:r>
-            <a:endParaRPr lang="en-US" baseline="0" smtClean="0"/>
+              <a:t>5. Thiết kế hệ thống: thiết kế ERD, kiến trúc</a:t>
+            </a:r>
           </a:p>
           <a:p>
             <a:r>
@@ -1458,7 +1417,11 @@
             </a:pPr>
             <a:r>
               <a:rPr lang="en-US" baseline="0" smtClean="0"/>
-              <a:t>Chỉ ra nghiệp vụ chính của phần mềm là quản lý nhập xuất kho:</a:t>
+              <a:t>Chỉ </a:t>
+            </a:r>
+            <a:r>
+              <a:rPr lang="en-US" baseline="0" smtClean="0"/>
+              <a:t>ra nghiệp vụ chính của phần mềm là quản lý nhập xuất kho:</a:t>
             </a:r>
           </a:p>
           <a:p>
@@ -1683,8 +1646,17 @@
           <a:p>
             <a:r>
               <a:rPr lang="en-US" baseline="0" smtClean="0"/>
-              <a:t>Nhấn mạnh hệ thống cũ đã làm gì, nhiệm vụ của luân văn lần này.</a:t>
-            </a:r>
+              <a:t>Nhiệm vụ luận văn là đọc hiểu nghiệp vụ, và ứng dụng quản lý đã sẵn có trước đó của doanh nghiệp.</a:t>
+            </a:r>
+          </a:p>
+          <a:p>
+            <a:r>
+              <a:rPr lang="en-US" baseline="0" smtClean="0"/>
+              <a:t>Rồi sau đó tích hợp thêm các chức năng mua bán hàng hóa, quản lý công nợ, thống kê, và giải quyết một số ngoại lệ của hệ thống.</a:t>
+            </a:r>
+          </a:p>
+          <a:p>
+            <a:endParaRPr lang="en-US" baseline="0" smtClean="0"/>
           </a:p>
         </p:txBody>
       </p:sp>
@@ -1770,8 +1742,38 @@
           <a:p>
             <a:r>
               <a:rPr lang="en-US" baseline="0" smtClean="0"/>
-              <a:t>chỉ ra đã chọn lựa framework gì? Tại sao có rất nhiều framework nhưng lại lựa chọn nó mà không phải là những cái khác?</a:t>
-            </a:r>
+              <a:t>Có rất nhiều framework hỗ trợ việc viết web, nhóm đã quyết định chon laravel vì những lý do sau:</a:t>
+            </a:r>
+          </a:p>
+          <a:p>
+            <a:endParaRPr lang="en-US" baseline="0" smtClean="0"/>
+          </a:p>
+          <a:p>
+            <a:r>
+              <a:rPr lang="en-US" baseline="0" smtClean="0"/>
+              <a:t>1. Là PHP framework – các thành viên của nhóm đã quen với ngôn ngữ PHP từ trước thông qua các môn được học -&gt; thời gian chi phí cho việc học mới ngôn ngữ sẽ được rút xuống mức tối thiểu. Cả MySQL, HTML, jQuery, Bootstrap cũng đã có thời gian làm quen từ trước.</a:t>
+            </a:r>
+          </a:p>
+          <a:p>
+            <a:endParaRPr lang="en-US" baseline="0" smtClean="0"/>
+          </a:p>
+          <a:p>
+            <a:r>
+              <a:rPr lang="en-US" baseline="0" smtClean="0"/>
+              <a:t>2. Bên cạnh đó, tất cả những công nghệ nhóm chọn đều có lịch sử lâu, tài liệu đầy đủ, cộng đồng sử dụng đông đảo, hầu hết những nhu cầu thiết yếu đều đã được hỗ trợ rất tốt và dễ dàng tích hợp nhanh chóng.</a:t>
+            </a:r>
+          </a:p>
+          <a:p>
+            <a:endParaRPr lang="en-US" baseline="0" smtClean="0"/>
+          </a:p>
+          <a:p>
+            <a:r>
+              <a:rPr lang="en-US" baseline="0" smtClean="0"/>
+              <a:t>3. Đặc biệt quan trọng tất cả những công nghệ nêu trên đều miễn phí, một số là mã nguồn mở. Điều đó giúp tiết kiệm chi phí rất nhiều phù hợp với nhu cầu khi đưa vào sử dụng thực tế, chỉ tốn phí duy trì host và domain.</a:t>
+            </a:r>
+          </a:p>
+          <a:p>
+            <a:endParaRPr lang="en-US" baseline="0" smtClean="0"/>
           </a:p>
         </p:txBody>
       </p:sp>
@@ -1857,17 +1859,8 @@
           <a:p>
             <a:r>
               <a:rPr lang="en-US" baseline="0" smtClean="0"/>
-              <a:t>thiết </a:t>
-            </a:r>
-            <a:r>
-              <a:rPr lang="en-US" baseline="0" smtClean="0"/>
-              <a:t>kế </a:t>
-            </a:r>
-            <a:r>
-              <a:rPr lang="en-US" baseline="0" smtClean="0"/>
-              <a:t>ERD, kiến trúc hệ thống</a:t>
-            </a:r>
-            <a:endParaRPr lang="en-US" baseline="0" smtClean="0"/>
+              <a:t>thiết kế ERD, kiến trúc hệ thống</a:t>
+            </a:r>
           </a:p>
           <a:p>
             <a:endParaRPr lang="en-US" baseline="0" smtClean="0"/>
@@ -9705,8 +9698,8 @@
         </p:nvSpPr>
         <p:spPr>
           <a:xfrm>
-            <a:off x="2018805" y="804552"/>
-            <a:ext cx="9604561" cy="2262781"/>
+            <a:off x="1754837" y="804552"/>
+            <a:ext cx="10132496" cy="2262781"/>
           </a:xfrm>
         </p:spPr>
         <p:txBody>
@@ -9946,16 +9939,6 @@
               <a:t> tin </a:t>
             </a:r>
             <a:r>
-              <a:rPr lang="en-US" sz="4400" i="1" err="1" smtClean="0">
-                <a:solidFill>
-                  <a:srgbClr val="0070C0"/>
-                </a:solidFill>
-                <a:latin typeface="Arial" panose="020B0604020202020204" pitchFamily="34" charset="0"/>
-                <a:cs typeface="Arial" panose="020B0604020202020204" pitchFamily="34" charset="0"/>
-              </a:rPr>
-              <a:t>bán</a:t>
-            </a:r>
-            <a:r>
               <a:rPr lang="en-US" sz="4400" i="1" smtClean="0">
                 <a:solidFill>
                   <a:srgbClr val="0070C0"/>
@@ -9963,7 +9946,7 @@
                 <a:latin typeface="Arial" panose="020B0604020202020204" pitchFamily="34" charset="0"/>
                 <a:cs typeface="Arial" panose="020B0604020202020204" pitchFamily="34" charset="0"/>
               </a:rPr>
-              <a:t> </a:t>
+              <a:t>	bán </a:t>
             </a:r>
             <a:r>
               <a:rPr lang="en-US" sz="4400" i="1" err="1">
@@ -10127,7 +10110,7 @@
         </p:nvSpPr>
         <p:spPr>
           <a:xfrm>
-            <a:off x="7218908" y="3930734"/>
+            <a:off x="2676598" y="4149395"/>
             <a:ext cx="4144487" cy="2483568"/>
           </a:xfrm>
         </p:spPr>
@@ -10142,14 +10125,7 @@
                 <a:latin typeface="Arial" panose="020B0604020202020204" pitchFamily="34" charset="0"/>
                 <a:cs typeface="Arial" panose="020B0604020202020204" pitchFamily="34" charset="0"/>
               </a:rPr>
-              <a:t>- GVHD</a:t>
-            </a:r>
-            <a:r>
-              <a:rPr lang="en-US" smtClean="0">
-                <a:latin typeface="Arial" panose="020B0604020202020204" pitchFamily="34" charset="0"/>
-                <a:cs typeface="Arial" panose="020B0604020202020204" pitchFamily="34" charset="0"/>
-              </a:rPr>
-              <a:t>: </a:t>
+              <a:t>- GVHD: </a:t>
             </a:r>
             <a:r>
               <a:rPr lang="en-US" err="1" smtClean="0">
@@ -10225,21 +10201,28 @@
                 <a:latin typeface="Arial" panose="020B0604020202020204" pitchFamily="34" charset="0"/>
                 <a:cs typeface="Arial" panose="020B0604020202020204" pitchFamily="34" charset="0"/>
               </a:rPr>
-              <a:t>- GVPB</a:t>
+              <a:t>- GVPB: </a:t>
+            </a:r>
+            <a:r>
+              <a:rPr lang="en-US" err="1" smtClean="0">
+                <a:latin typeface="Arial" panose="020B0604020202020204" pitchFamily="34" charset="0"/>
+                <a:cs typeface="Arial" panose="020B0604020202020204" pitchFamily="34" charset="0"/>
+              </a:rPr>
+              <a:t>ThS</a:t>
             </a:r>
             <a:r>
               <a:rPr lang="en-US" smtClean="0">
                 <a:latin typeface="Arial" panose="020B0604020202020204" pitchFamily="34" charset="0"/>
                 <a:cs typeface="Arial" panose="020B0604020202020204" pitchFamily="34" charset="0"/>
               </a:rPr>
-              <a:t>: </a:t>
+              <a:t> </a:t>
             </a:r>
             <a:r>
               <a:rPr lang="en-US" err="1" smtClean="0">
                 <a:latin typeface="Arial" panose="020B0604020202020204" pitchFamily="34" charset="0"/>
                 <a:cs typeface="Arial" panose="020B0604020202020204" pitchFamily="34" charset="0"/>
               </a:rPr>
-              <a:t>ThS</a:t>
+              <a:t>Trần</a:t>
             </a:r>
             <a:r>
               <a:rPr lang="en-US" smtClean="0">
@@ -10253,7 +10236,7 @@
                 <a:latin typeface="Arial" panose="020B0604020202020204" pitchFamily="34" charset="0"/>
                 <a:cs typeface="Arial" panose="020B0604020202020204" pitchFamily="34" charset="0"/>
               </a:rPr>
-              <a:t>Trần</a:t>
+              <a:t>Thị</a:t>
             </a:r>
             <a:r>
               <a:rPr lang="en-US" smtClean="0">
@@ -10267,46 +10250,15 @@
                 <a:latin typeface="Arial" panose="020B0604020202020204" pitchFamily="34" charset="0"/>
                 <a:cs typeface="Arial" panose="020B0604020202020204" pitchFamily="34" charset="0"/>
               </a:rPr>
-              <a:t>Thị</a:t>
+              <a:t>Quế</a:t>
             </a:r>
             <a:r>
               <a:rPr lang="en-US" smtClean="0">
                 <a:latin typeface="Arial" panose="020B0604020202020204" pitchFamily="34" charset="0"/>
                 <a:cs typeface="Arial" panose="020B0604020202020204" pitchFamily="34" charset="0"/>
               </a:rPr>
-              <a:t> </a:t>
-            </a:r>
-            <a:r>
-              <a:rPr lang="en-US" err="1" smtClean="0">
-                <a:latin typeface="Arial" panose="020B0604020202020204" pitchFamily="34" charset="0"/>
-                <a:cs typeface="Arial" panose="020B0604020202020204" pitchFamily="34" charset="0"/>
-              </a:rPr>
-              <a:t>Quế</a:t>
-            </a:r>
-            <a:r>
-              <a:rPr lang="en-US" smtClean="0">
-                <a:latin typeface="Arial" panose="020B0604020202020204" pitchFamily="34" charset="0"/>
-                <a:cs typeface="Arial" panose="020B0604020202020204" pitchFamily="34" charset="0"/>
-              </a:rPr>
-              <a:t> </a:t>
-            </a:r>
-            <a:r>
-              <a:rPr lang="en-US" err="1" smtClean="0">
-                <a:latin typeface="Arial" panose="020B0604020202020204" pitchFamily="34" charset="0"/>
-                <a:cs typeface="Arial" panose="020B0604020202020204" pitchFamily="34" charset="0"/>
-              </a:rPr>
-              <a:t>Nguyệt</a:t>
-            </a:r>
-            <a:endParaRPr lang="en-US" smtClean="0">
-              <a:latin typeface="Arial" panose="020B0604020202020204" pitchFamily="34" charset="0"/>
-              <a:cs typeface="Arial" panose="020B0604020202020204" pitchFamily="34" charset="0"/>
-            </a:endParaRPr>
-          </a:p>
-          <a:p>
-            <a:endParaRPr lang="en-US" smtClean="0">
-              <a:latin typeface="Arial" panose="020B0604020202020204" pitchFamily="34" charset="0"/>
-              <a:cs typeface="Arial" panose="020B0604020202020204" pitchFamily="34" charset="0"/>
-            </a:endParaRPr>
+              <a:t> Nguyệt</a:t>
+            </a:r>
           </a:p>
           <a:p>
             <a:r>
@@ -10782,10 +10734,6 @@
               </a:rPr>
               <a:t>- Chưa hỗ trợ tốt cho nhu cầu thực tế của người sử dụng.</a:t>
             </a:r>
-            <a:endParaRPr lang="en-US" sz="2800" i="1" smtClean="0">
-              <a:latin typeface="Arial" panose="020B0604020202020204" pitchFamily="34" charset="0"/>
-              <a:cs typeface="Arial" panose="020B0604020202020204" pitchFamily="34" charset="0"/>
-            </a:endParaRPr>
           </a:p>
         </p:txBody>
       </p:sp>
@@ -10867,10 +10815,85 @@
         </p:nvSpPr>
         <p:spPr/>
         <p:txBody>
-          <a:bodyPr/>
-          <a:lstStyle/>
-          <a:p>
-            <a:endParaRPr lang="en-US">
+          <a:bodyPr>
+            <a:noAutofit/>
+          </a:bodyPr>
+          <a:lstStyle/>
+          <a:p>
+            <a:pPr marL="0" indent="0">
+              <a:buNone/>
+            </a:pPr>
+            <a:r>
+              <a:rPr lang="en-US" sz="3200" i="1" smtClean="0">
+                <a:latin typeface="Arial" panose="020B0604020202020204" pitchFamily="34" charset="0"/>
+                <a:cs typeface="Arial" panose="020B0604020202020204" pitchFamily="34" charset="0"/>
+              </a:rPr>
+              <a:t>Kiến thức học được qua luận văn:</a:t>
+            </a:r>
+          </a:p>
+          <a:p>
+            <a:pPr marL="0" indent="0">
+              <a:buNone/>
+            </a:pPr>
+            <a:endParaRPr lang="en-US" sz="3200" i="1" smtClean="0">
+              <a:latin typeface="Arial" panose="020B0604020202020204" pitchFamily="34" charset="0"/>
+              <a:cs typeface="Arial" panose="020B0604020202020204" pitchFamily="34" charset="0"/>
+            </a:endParaRPr>
+          </a:p>
+          <a:p>
+            <a:r>
+              <a:rPr lang="en-US" sz="2400" smtClean="0">
+                <a:latin typeface="Arial" panose="020B0604020202020204" pitchFamily="34" charset="0"/>
+                <a:cs typeface="Arial" panose="020B0604020202020204" pitchFamily="34" charset="0"/>
+              </a:rPr>
+              <a:t>Cách học hiểu, phân tích yêu cầu và thu thập, làm rõ yêu cầu.</a:t>
+            </a:r>
+          </a:p>
+          <a:p>
+            <a:r>
+              <a:rPr lang="en-US" sz="2400" smtClean="0">
+                <a:latin typeface="Arial" panose="020B0604020202020204" pitchFamily="34" charset="0"/>
+                <a:cs typeface="Arial" panose="020B0604020202020204" pitchFamily="34" charset="0"/>
+              </a:rPr>
+              <a:t>Kỹ năng làm việc nhóm.</a:t>
+            </a:r>
+          </a:p>
+          <a:p>
+            <a:r>
+              <a:rPr lang="en-US" sz="2400" smtClean="0">
+                <a:latin typeface="Arial" panose="020B0604020202020204" pitchFamily="34" charset="0"/>
+                <a:cs typeface="Arial" panose="020B0604020202020204" pitchFamily="34" charset="0"/>
+              </a:rPr>
+              <a:t>Kỹ năng sử dụng source control.</a:t>
+            </a:r>
+          </a:p>
+          <a:p>
+            <a:r>
+              <a:rPr lang="en-US" sz="2400" smtClean="0">
+                <a:latin typeface="Arial" panose="020B0604020202020204" pitchFamily="34" charset="0"/>
+                <a:cs typeface="Arial" panose="020B0604020202020204" pitchFamily="34" charset="0"/>
+              </a:rPr>
+              <a:t>Kiến thức về framework Laravel cũng như ngôn ngữ PHP, và kĩ thuật thiết kế front-end</a:t>
+            </a:r>
+          </a:p>
+          <a:p>
+            <a:r>
+              <a:rPr lang="en-US" sz="2400" smtClean="0">
+                <a:latin typeface="Arial" panose="020B0604020202020204" pitchFamily="34" charset="0"/>
+                <a:cs typeface="Arial" panose="020B0604020202020204" pitchFamily="34" charset="0"/>
+              </a:rPr>
+              <a:t>Kỹ năng viết tài liệu theo đúng quy chuẩn.</a:t>
+            </a:r>
+          </a:p>
+          <a:p>
+            <a:r>
+              <a:rPr lang="en-US" sz="2400" smtClean="0">
+                <a:latin typeface="Arial" panose="020B0604020202020204" pitchFamily="34" charset="0"/>
+                <a:cs typeface="Arial" panose="020B0604020202020204" pitchFamily="34" charset="0"/>
+              </a:rPr>
+              <a:t>Kỹ năng thuyết trình, báo cáo.</a:t>
+            </a:r>
+            <a:endParaRPr lang="en-US" sz="2400">
               <a:latin typeface="Arial" panose="020B0604020202020204" pitchFamily="34" charset="0"/>
               <a:cs typeface="Arial" panose="020B0604020202020204" pitchFamily="34" charset="0"/>
             </a:endParaRPr>
@@ -12071,17 +12094,7 @@
                 <a:latin typeface="Arial" panose="020B0604020202020204" pitchFamily="34" charset="0"/>
                 <a:cs typeface="Arial" panose="020B0604020202020204" pitchFamily="34" charset="0"/>
               </a:rPr>
-              <a:t>5. Thiết kế hệ </a:t>
-            </a:r>
-            <a:r>
-              <a:rPr lang="en-US" sz="2000" smtClean="0">
-                <a:solidFill>
-                  <a:srgbClr val="C00000"/>
-                </a:solidFill>
-                <a:latin typeface="Arial" panose="020B0604020202020204" pitchFamily="34" charset="0"/>
-                <a:cs typeface="Arial" panose="020B0604020202020204" pitchFamily="34" charset="0"/>
-              </a:rPr>
-              <a:t>thống	</a:t>
+              <a:t>5. Thiết kế hệ thống	</a:t>
             </a:r>
             <a:endParaRPr lang="en-US" sz="2000">
               <a:solidFill>
@@ -12179,17 +12192,7 @@
                 <a:latin typeface="Arial" panose="020B0604020202020204" pitchFamily="34" charset="0"/>
                 <a:cs typeface="Arial" panose="020B0604020202020204" pitchFamily="34" charset="0"/>
               </a:rPr>
-              <a:t>4. </a:t>
-            </a:r>
-            <a:r>
-              <a:rPr lang="en-US" sz="2000" smtClean="0">
-                <a:solidFill>
-                  <a:srgbClr val="C00000"/>
-                </a:solidFill>
-                <a:latin typeface="Arial" panose="020B0604020202020204" pitchFamily="34" charset="0"/>
-                <a:cs typeface="Arial" panose="020B0604020202020204" pitchFamily="34" charset="0"/>
-              </a:rPr>
-              <a:t>Công nghệ sử dụng</a:t>
+              <a:t>4. Công nghệ sử dụng</a:t>
             </a:r>
             <a:endParaRPr lang="en-US" sz="2000">
               <a:solidFill>
@@ -13081,26 +13084,8 @@
                 <a:latin typeface="Arial" panose="020B0604020202020204" pitchFamily="34" charset="0"/>
                 <a:cs typeface="Arial" panose="020B0604020202020204" pitchFamily="34" charset="0"/>
               </a:rPr>
-              <a:t>Đề </a:t>
-            </a:r>
-            <a:r>
-              <a:rPr lang="en-US" sz="3200" smtClean="0">
-                <a:latin typeface="Arial" panose="020B0604020202020204" pitchFamily="34" charset="0"/>
-                <a:cs typeface="Arial" panose="020B0604020202020204" pitchFamily="34" charset="0"/>
-              </a:rPr>
-              <a:t>tài của nhóm là gì</a:t>
-            </a:r>
-            <a:r>
-              <a:rPr lang="en-US" sz="3200" smtClean="0">
-                <a:latin typeface="Arial" panose="020B0604020202020204" pitchFamily="34" charset="0"/>
-                <a:cs typeface="Arial" panose="020B0604020202020204" pitchFamily="34" charset="0"/>
-              </a:rPr>
-              <a:t>?</a:t>
-            </a:r>
-            <a:endParaRPr lang="en-US" sz="3200" smtClean="0">
-              <a:latin typeface="Arial" panose="020B0604020202020204" pitchFamily="34" charset="0"/>
-              <a:cs typeface="Arial" panose="020B0604020202020204" pitchFamily="34" charset="0"/>
-            </a:endParaRPr>
+              <a:t>Đề tài của nhóm là gì?</a:t>
+            </a:r>
           </a:p>
           <a:p>
             <a:r>
@@ -13976,35 +13961,6 @@
           </a:p>
         </p:txBody>
       </p:sp>
-      <p:pic>
-        <p:nvPicPr>
-          <p:cNvPr id="59" name="Picture 58"/>
-          <p:cNvPicPr>
-            <a:picLocks noChangeAspect="1"/>
-          </p:cNvPicPr>
-          <p:nvPr/>
-        </p:nvPicPr>
-        <p:blipFill rotWithShape="1">
-          <a:blip r:embed="rId5">
-            <a:extLst>
-              <a:ext uri="{28A0092B-C50C-407E-A947-70E740481C1C}">
-                <a14:useLocalDpi xmlns:a14="http://schemas.microsoft.com/office/drawing/2010/main" val="0"/>
-              </a:ext>
-            </a:extLst>
-          </a:blip>
-          <a:srcRect l="15674" t="10620" r="15608" b="9638"/>
-          <a:stretch/>
-        </p:blipFill>
-        <p:spPr>
-          <a:xfrm>
-            <a:off x="3058832" y="3256100"/>
-            <a:ext cx="1341846" cy="1123406"/>
-          </a:xfrm>
-          <a:prstGeom prst="rect">
-            <a:avLst/>
-          </a:prstGeom>
-        </p:spPr>
-      </p:pic>
       <p:sp>
         <p:nvSpPr>
           <p:cNvPr id="60" name="TextBox 59"/>
@@ -14056,7 +14012,7 @@
           <p:nvPr/>
         </p:nvPicPr>
         <p:blipFill>
-          <a:blip r:embed="rId6">
+          <a:blip r:embed="rId5">
             <a:extLst>
               <a:ext uri="{28A0092B-C50C-407E-A947-70E740481C1C}">
                 <a14:useLocalDpi xmlns:a14="http://schemas.microsoft.com/office/drawing/2010/main" val="0"/>
@@ -14071,36 +14027,6 @@
           <a:xfrm>
             <a:off x="5300549" y="1576025"/>
             <a:ext cx="1306507" cy="950187"/>
-          </a:xfrm>
-          <a:prstGeom prst="rect">
-            <a:avLst/>
-          </a:prstGeom>
-        </p:spPr>
-      </p:pic>
-      <p:pic>
-        <p:nvPicPr>
-          <p:cNvPr id="62" name="Picture 61"/>
-          <p:cNvPicPr>
-            <a:picLocks noChangeAspect="1"/>
-          </p:cNvPicPr>
-          <p:nvPr/>
-        </p:nvPicPr>
-        <p:blipFill>
-          <a:blip r:embed="rId7">
-            <a:extLst>
-              <a:ext uri="{28A0092B-C50C-407E-A947-70E740481C1C}">
-                <a14:useLocalDpi xmlns:a14="http://schemas.microsoft.com/office/drawing/2010/main" val="0"/>
-              </a:ext>
-            </a:extLst>
-          </a:blip>
-          <a:stretch>
-            <a:fillRect/>
-          </a:stretch>
-        </p:blipFill>
-        <p:spPr>
-          <a:xfrm>
-            <a:off x="5244568" y="3437095"/>
-            <a:ext cx="1474406" cy="966315"/>
           </a:xfrm>
           <a:prstGeom prst="rect">
             <a:avLst/>
@@ -14298,7 +14224,7 @@
           <p:nvPr/>
         </p:nvPicPr>
         <p:blipFill>
-          <a:blip r:embed="rId8">
+          <a:blip r:embed="rId6">
             <a:extLst>
               <a:ext uri="{28A0092B-C50C-407E-A947-70E740481C1C}">
                 <a14:useLocalDpi xmlns:a14="http://schemas.microsoft.com/office/drawing/2010/main" val="0"/>
@@ -14368,35 +14294,6 @@
           </a:p>
         </p:txBody>
       </p:sp>
-      <p:pic>
-        <p:nvPicPr>
-          <p:cNvPr id="69" name="Picture 68"/>
-          <p:cNvPicPr>
-            <a:picLocks noChangeAspect="1"/>
-          </p:cNvPicPr>
-          <p:nvPr/>
-        </p:nvPicPr>
-        <p:blipFill rotWithShape="1">
-          <a:blip r:embed="rId9">
-            <a:extLst>
-              <a:ext uri="{28A0092B-C50C-407E-A947-70E740481C1C}">
-                <a14:useLocalDpi xmlns:a14="http://schemas.microsoft.com/office/drawing/2010/main" val="0"/>
-              </a:ext>
-            </a:extLst>
-          </a:blip>
-          <a:srcRect t="22730"/>
-          <a:stretch/>
-        </p:blipFill>
-        <p:spPr>
-          <a:xfrm>
-            <a:off x="7726616" y="3492883"/>
-            <a:ext cx="1748970" cy="924892"/>
-          </a:xfrm>
-          <a:prstGeom prst="rect">
-            <a:avLst/>
-          </a:prstGeom>
-        </p:spPr>
-      </p:pic>
       <p:sp>
         <p:nvSpPr>
           <p:cNvPr id="70" name="TextBox 69"/>
@@ -14490,7 +14387,7 @@
         <p:spPr>
           <a:xfrm>
             <a:off x="8391973" y="2713272"/>
-            <a:ext cx="242303" cy="723823"/>
+            <a:ext cx="226335" cy="501209"/>
           </a:xfrm>
           <a:prstGeom prst="upArrow">
             <a:avLst/>
@@ -14581,7 +14478,7 @@
           <p:nvPr/>
         </p:nvPicPr>
         <p:blipFill>
-          <a:blip r:embed="rId10">
+          <a:blip r:embed="rId7">
             <a:extLst>
               <a:ext uri="{28A0092B-C50C-407E-A947-70E740481C1C}">
                 <a14:useLocalDpi xmlns:a14="http://schemas.microsoft.com/office/drawing/2010/main" val="0"/>
@@ -14653,7 +14550,7 @@
           <p:nvPr/>
         </p:nvPicPr>
         <p:blipFill>
-          <a:blip r:embed="rId11">
+          <a:blip r:embed="rId8">
             <a:extLst>
               <a:ext uri="{28A0092B-C50C-407E-A947-70E740481C1C}">
                 <a14:useLocalDpi xmlns:a14="http://schemas.microsoft.com/office/drawing/2010/main" val="0"/>
@@ -14668,6 +14565,96 @@
           <a:xfrm>
             <a:off x="10501039" y="3214481"/>
             <a:ext cx="1589179" cy="1589179"/>
+          </a:xfrm>
+          <a:prstGeom prst="rect">
+            <a:avLst/>
+          </a:prstGeom>
+        </p:spPr>
+      </p:pic>
+      <p:pic>
+        <p:nvPicPr>
+          <p:cNvPr id="3" name="Picture 2"/>
+          <p:cNvPicPr>
+            <a:picLocks noChangeAspect="1"/>
+          </p:cNvPicPr>
+          <p:nvPr/>
+        </p:nvPicPr>
+        <p:blipFill>
+          <a:blip r:embed="rId9">
+            <a:extLst>
+              <a:ext uri="{28A0092B-C50C-407E-A947-70E740481C1C}">
+                <a14:useLocalDpi xmlns:a14="http://schemas.microsoft.com/office/drawing/2010/main" val="0"/>
+              </a:ext>
+            </a:extLst>
+          </a:blip>
+          <a:stretch>
+            <a:fillRect/>
+          </a:stretch>
+        </p:blipFill>
+        <p:spPr>
+          <a:xfrm>
+            <a:off x="3159051" y="3336124"/>
+            <a:ext cx="1047571" cy="1047571"/>
+          </a:xfrm>
+          <a:prstGeom prst="rect">
+            <a:avLst/>
+          </a:prstGeom>
+        </p:spPr>
+      </p:pic>
+      <p:pic>
+        <p:nvPicPr>
+          <p:cNvPr id="43" name="Picture 42"/>
+          <p:cNvPicPr>
+            <a:picLocks noChangeAspect="1"/>
+          </p:cNvPicPr>
+          <p:nvPr/>
+        </p:nvPicPr>
+        <p:blipFill>
+          <a:blip r:embed="rId9">
+            <a:extLst>
+              <a:ext uri="{28A0092B-C50C-407E-A947-70E740481C1C}">
+                <a14:useLocalDpi xmlns:a14="http://schemas.microsoft.com/office/drawing/2010/main" val="0"/>
+              </a:ext>
+            </a:extLst>
+          </a:blip>
+          <a:stretch>
+            <a:fillRect/>
+          </a:stretch>
+        </p:blipFill>
+        <p:spPr>
+          <a:xfrm>
+            <a:off x="5383349" y="3376037"/>
+            <a:ext cx="1047571" cy="1047571"/>
+          </a:xfrm>
+          <a:prstGeom prst="rect">
+            <a:avLst/>
+          </a:prstGeom>
+        </p:spPr>
+      </p:pic>
+      <p:pic>
+        <p:nvPicPr>
+          <p:cNvPr id="45" name="Picture 44"/>
+          <p:cNvPicPr>
+            <a:picLocks noChangeAspect="1"/>
+          </p:cNvPicPr>
+          <p:nvPr/>
+        </p:nvPicPr>
+        <p:blipFill>
+          <a:blip r:embed="rId9">
+            <a:extLst>
+              <a:ext uri="{28A0092B-C50C-407E-A947-70E740481C1C}">
+                <a14:useLocalDpi xmlns:a14="http://schemas.microsoft.com/office/drawing/2010/main" val="0"/>
+              </a:ext>
+            </a:extLst>
+          </a:blip>
+          <a:stretch>
+            <a:fillRect/>
+          </a:stretch>
+        </p:blipFill>
+        <p:spPr>
+          <a:xfrm>
+            <a:off x="7989338" y="3315780"/>
+            <a:ext cx="1047571" cy="1047571"/>
           </a:xfrm>
           <a:prstGeom prst="rect">
             <a:avLst/>
@@ -14763,14 +14750,7 @@
                 <a:latin typeface="Arial" panose="020B0604020202020204" pitchFamily="34" charset="0"/>
                 <a:cs typeface="Arial" panose="020B0604020202020204" pitchFamily="34" charset="0"/>
               </a:rPr>
-              <a:t>Đọc hiểu nghiệp vụ sản xuất và bán hàng sẵn </a:t>
-            </a:r>
-            <a:r>
-              <a:rPr lang="en-US" sz="2400">
-                <a:latin typeface="Arial" panose="020B0604020202020204" pitchFamily="34" charset="0"/>
-                <a:cs typeface="Arial" panose="020B0604020202020204" pitchFamily="34" charset="0"/>
-              </a:rPr>
-              <a:t>có</a:t>
+              <a:t>Đọc hiểu nghiệp vụ sản xuất và bán hàng sẵn có</a:t>
             </a:r>
             <a:r>
               <a:rPr lang="en-US" sz="2400" smtClean="0">
@@ -14839,14 +14819,7 @@
                 <a:latin typeface="Arial" panose="020B0604020202020204" pitchFamily="34" charset="0"/>
                 <a:cs typeface="Arial" panose="020B0604020202020204" pitchFamily="34" charset="0"/>
               </a:rPr>
-              <a:t>Giải quyết một số ngoại lệ của </a:t>
-            </a:r>
-            <a:r>
-              <a:rPr lang="en-US" sz="2400">
-                <a:latin typeface="Arial" panose="020B0604020202020204" pitchFamily="34" charset="0"/>
-                <a:cs typeface="Arial" panose="020B0604020202020204" pitchFamily="34" charset="0"/>
-              </a:rPr>
-              <a:t>hệ </a:t>
+              <a:t>Giải quyết một số ngoại lệ của hệ </a:t>
             </a:r>
             <a:r>
               <a:rPr lang="en-US" sz="2400" smtClean="0">
@@ -14867,14 +14840,7 @@
                 <a:latin typeface="Arial" panose="020B0604020202020204" pitchFamily="34" charset="0"/>
                 <a:cs typeface="Arial" panose="020B0604020202020204" pitchFamily="34" charset="0"/>
               </a:rPr>
-              <a:t>Xây dựng ứng dụng </a:t>
-            </a:r>
-            <a:r>
-              <a:rPr lang="en-US" sz="2400">
-                <a:latin typeface="Arial" panose="020B0604020202020204" pitchFamily="34" charset="0"/>
-                <a:cs typeface="Arial" panose="020B0604020202020204" pitchFamily="34" charset="0"/>
-              </a:rPr>
-              <a:t>hoàn </a:t>
+              <a:t>Xây dựng ứng dụng hoàn </a:t>
             </a:r>
             <a:r>
               <a:rPr lang="en-US" sz="2400" smtClean="0">
@@ -14894,14 +14860,7 @@
                 <a:latin typeface="Arial" panose="020B0604020202020204" pitchFamily="34" charset="0"/>
                 <a:cs typeface="Arial" panose="020B0604020202020204" pitchFamily="34" charset="0"/>
               </a:rPr>
-              <a:t>Đánh giá tính hiệu quả của </a:t>
-            </a:r>
-            <a:r>
-              <a:rPr lang="en-US" sz="2400">
-                <a:latin typeface="Arial" panose="020B0604020202020204" pitchFamily="34" charset="0"/>
-                <a:cs typeface="Arial" panose="020B0604020202020204" pitchFamily="34" charset="0"/>
-              </a:rPr>
-              <a:t>hệ </a:t>
+              <a:t>Đánh giá tính hiệu quả của hệ </a:t>
             </a:r>
             <a:r>
               <a:rPr lang="en-US" sz="2400" smtClean="0">
@@ -14974,14 +14933,7 @@
                 <a:latin typeface="Arial" panose="020B0604020202020204" pitchFamily="34" charset="0"/>
                 <a:cs typeface="Arial" panose="020B0604020202020204" pitchFamily="34" charset="0"/>
               </a:rPr>
-              <a:t>4. </a:t>
-            </a:r>
-            <a:r>
-              <a:rPr lang="en-US" smtClean="0">
-                <a:latin typeface="Arial" panose="020B0604020202020204" pitchFamily="34" charset="0"/>
-                <a:cs typeface="Arial" panose="020B0604020202020204" pitchFamily="34" charset="0"/>
-              </a:rPr>
-              <a:t>Công nghệ sử dụng</a:t>
+              <a:t>4. Công nghệ sử dụng</a:t>
             </a:r>
             <a:endParaRPr lang="en-US">
               <a:latin typeface="Arial" panose="020B0604020202020204" pitchFamily="34" charset="0"/>
@@ -15012,8 +14964,12 @@
                 <a:latin typeface="Arial" panose="020B0604020202020204" pitchFamily="34" charset="0"/>
                 <a:cs typeface="Arial" panose="020B0604020202020204" pitchFamily="34" charset="0"/>
               </a:rPr>
-              <a:t>Laravel</a:t>
-            </a:r>
+              <a:t>Framework: Laravel - PHP</a:t>
+            </a:r>
+            <a:endParaRPr lang="en-US" sz="3200" smtClean="0">
+              <a:latin typeface="Arial" panose="020B0604020202020204" pitchFamily="34" charset="0"/>
+              <a:cs typeface="Arial" panose="020B0604020202020204" pitchFamily="34" charset="0"/>
+            </a:endParaRPr>
           </a:p>
           <a:p>
             <a:r>
@@ -15021,8 +14977,12 @@
                 <a:latin typeface="Arial" panose="020B0604020202020204" pitchFamily="34" charset="0"/>
                 <a:cs typeface="Arial" panose="020B0604020202020204" pitchFamily="34" charset="0"/>
               </a:rPr>
-              <a:t>MySQL</a:t>
-            </a:r>
+              <a:t>Database: MySQL</a:t>
+            </a:r>
+            <a:endParaRPr lang="en-US" sz="3200" smtClean="0">
+              <a:latin typeface="Arial" panose="020B0604020202020204" pitchFamily="34" charset="0"/>
+              <a:cs typeface="Arial" panose="020B0604020202020204" pitchFamily="34" charset="0"/>
+            </a:endParaRPr>
           </a:p>
           <a:p>
             <a:r>
@@ -15030,8 +14990,12 @@
                 <a:latin typeface="Arial" panose="020B0604020202020204" pitchFamily="34" charset="0"/>
                 <a:cs typeface="Arial" panose="020B0604020202020204" pitchFamily="34" charset="0"/>
               </a:rPr>
-              <a:t>Apache</a:t>
-            </a:r>
+              <a:t>Server: Apache</a:t>
+            </a:r>
+            <a:endParaRPr lang="en-US" sz="3200" smtClean="0">
+              <a:latin typeface="Arial" panose="020B0604020202020204" pitchFamily="34" charset="0"/>
+              <a:cs typeface="Arial" panose="020B0604020202020204" pitchFamily="34" charset="0"/>
+            </a:endParaRPr>
           </a:p>
           <a:p>
             <a:r>
@@ -15039,20 +15003,29 @@
                 <a:latin typeface="Arial" panose="020B0604020202020204" pitchFamily="34" charset="0"/>
                 <a:cs typeface="Arial" panose="020B0604020202020204" pitchFamily="34" charset="0"/>
               </a:rPr>
-              <a:t>jQuery</a:t>
-            </a:r>
-          </a:p>
-          <a:p>
+              <a:t>Client: HTML + </a:t>
+            </a:r>
             <a:r>
               <a:rPr lang="en-US" sz="3200" smtClean="0">
                 <a:latin typeface="Arial" panose="020B0604020202020204" pitchFamily="34" charset="0"/>
                 <a:cs typeface="Arial" panose="020B0604020202020204" pitchFamily="34" charset="0"/>
               </a:rPr>
-              <a:t>Bootstrap</a:t>
-            </a:r>
-          </a:p>
-          <a:p>
+              <a:t>jQuery + Bootstrap</a:t>
+            </a:r>
             <a:endParaRPr lang="en-US" sz="3200">
+              <a:latin typeface="Arial" panose="020B0604020202020204" pitchFamily="34" charset="0"/>
+              <a:cs typeface="Arial" panose="020B0604020202020204" pitchFamily="34" charset="0"/>
+            </a:endParaRPr>
+          </a:p>
+          <a:p>
+            <a:r>
+              <a:rPr lang="en-US" sz="3200" smtClean="0">
+                <a:latin typeface="Arial" panose="020B0604020202020204" pitchFamily="34" charset="0"/>
+                <a:cs typeface="Arial" panose="020B0604020202020204" pitchFamily="34" charset="0"/>
+              </a:rPr>
+              <a:t>Source control: Atlassian SourceTree - GIT</a:t>
+            </a:r>
+            <a:endParaRPr lang="en-US" sz="3200" smtClean="0">
               <a:latin typeface="Arial" panose="020B0604020202020204" pitchFamily="34" charset="0"/>
               <a:cs typeface="Arial" panose="020B0604020202020204" pitchFamily="34" charset="0"/>
             </a:endParaRPr>
@@ -15125,10 +15098,6 @@
               </a:rPr>
               <a:t>Thiết kế hệ thống</a:t>
             </a:r>
-            <a:endParaRPr lang="en-US">
-              <a:latin typeface="Arial" panose="020B0604020202020204" pitchFamily="34" charset="0"/>
-              <a:cs typeface="Arial" panose="020B0604020202020204" pitchFamily="34" charset="0"/>
-            </a:endParaRPr>
           </a:p>
         </p:txBody>
       </p:sp>

</xml_diff>